<commit_message>
updated mocks and logbook
</commit_message>
<xml_diff>
--- a/UIMocks/Third Mock Iteration/Dennis/AutoSys WindowsMocks.pptx
+++ b/UIMocks/Third Mock Iteration/Dennis/AutoSys WindowsMocks.pptx
@@ -2,17 +2,20 @@
 <file path=ppt/presentation.xml><?xml version="1.0" encoding="utf-8"?>
 <p:presentation xmlns:a="http://schemas.openxmlformats.org/drawingml/2006/main" xmlns:r="http://schemas.openxmlformats.org/officeDocument/2006/relationships" xmlns:p="http://schemas.openxmlformats.org/presentationml/2006/main" removePersonalInfoOnSave="1" saveSubsetFonts="1">
   <p:sldMasterIdLst>
-    <p:sldMasterId id="2147483672" r:id="rId101"/>
+    <p:sldMasterId id="2147483672" r:id="rId99"/>
   </p:sldMasterIdLst>
+  <p:notesMasterIdLst>
+    <p:notesMasterId r:id="rId108"/>
+  </p:notesMasterIdLst>
   <p:sldIdLst>
-    <p:sldId id="270" r:id="rId102"/>
-    <p:sldId id="272" r:id="rId103"/>
-    <p:sldId id="273" r:id="rId104"/>
-    <p:sldId id="274" r:id="rId105"/>
-    <p:sldId id="275" r:id="rId106"/>
-    <p:sldId id="276" r:id="rId107"/>
-    <p:sldId id="277" r:id="rId108"/>
-    <p:sldId id="278" r:id="rId109"/>
+    <p:sldId id="270" r:id="rId100"/>
+    <p:sldId id="272" r:id="rId101"/>
+    <p:sldId id="273" r:id="rId102"/>
+    <p:sldId id="274" r:id="rId103"/>
+    <p:sldId id="275" r:id="rId104"/>
+    <p:sldId id="276" r:id="rId105"/>
+    <p:sldId id="277" r:id="rId106"/>
+    <p:sldId id="278" r:id="rId107"/>
   </p:sldIdLst>
   <p:sldSz cx="17346613" cy="9756775"/>
   <p:notesSz cx="6858000" cy="9144000"/>
@@ -153,6 +156,1027 @@
     </p:ext>
   </p:extLst>
 </p:presentation>
+</file>
+
+<file path=ppt/notesMasters/notesMaster1.xml><?xml version="1.0" encoding="utf-8"?>
+<p:notesMaster xmlns:a="http://schemas.openxmlformats.org/drawingml/2006/main" xmlns:r="http://schemas.openxmlformats.org/officeDocument/2006/relationships" xmlns:p="http://schemas.openxmlformats.org/presentationml/2006/main">
+  <p:cSld>
+    <p:bg>
+      <p:bgRef idx="1001">
+        <a:schemeClr val="bg1"/>
+      </p:bgRef>
+    </p:bg>
+    <p:spTree>
+      <p:nvGrpSpPr>
+        <p:cNvPr id="1" name=""/>
+        <p:cNvGrpSpPr/>
+        <p:nvPr/>
+      </p:nvGrpSpPr>
+      <p:grpSpPr>
+        <a:xfrm>
+          <a:off x="0" y="0"/>
+          <a:ext cx="0" cy="0"/>
+          <a:chOff x="0" y="0"/>
+          <a:chExt cx="0" cy="0"/>
+        </a:xfrm>
+      </p:grpSpPr>
+      <p:sp>
+        <p:nvSpPr>
+          <p:cNvPr id="2" name="Header Placeholder 1"/>
+          <p:cNvSpPr>
+            <a:spLocks noGrp="1"/>
+          </p:cNvSpPr>
+          <p:nvPr>
+            <p:ph type="hdr" sz="quarter"/>
+          </p:nvPr>
+        </p:nvSpPr>
+        <p:spPr>
+          <a:xfrm>
+            <a:off x="0" y="0"/>
+            <a:ext cx="2971800" cy="458788"/>
+          </a:xfrm>
+          <a:prstGeom prst="rect">
+            <a:avLst/>
+          </a:prstGeom>
+        </p:spPr>
+        <p:txBody>
+          <a:bodyPr vert="horz" lIns="91440" tIns="45720" rIns="91440" bIns="45720" rtlCol="0"/>
+          <a:lstStyle>
+            <a:lvl1pPr algn="l">
+              <a:defRPr sz="1200"/>
+            </a:lvl1pPr>
+          </a:lstStyle>
+          <a:p>
+            <a:endParaRPr lang="en-US"/>
+          </a:p>
+        </p:txBody>
+      </p:sp>
+      <p:sp>
+        <p:nvSpPr>
+          <p:cNvPr id="3" name="Date Placeholder 2"/>
+          <p:cNvSpPr>
+            <a:spLocks noGrp="1"/>
+          </p:cNvSpPr>
+          <p:nvPr>
+            <p:ph type="dt" idx="1"/>
+          </p:nvPr>
+        </p:nvSpPr>
+        <p:spPr>
+          <a:xfrm>
+            <a:off x="3884613" y="0"/>
+            <a:ext cx="2971800" cy="458788"/>
+          </a:xfrm>
+          <a:prstGeom prst="rect">
+            <a:avLst/>
+          </a:prstGeom>
+        </p:spPr>
+        <p:txBody>
+          <a:bodyPr vert="horz" lIns="91440" tIns="45720" rIns="91440" bIns="45720" rtlCol="0"/>
+          <a:lstStyle>
+            <a:lvl1pPr algn="r">
+              <a:defRPr sz="1200"/>
+            </a:lvl1pPr>
+          </a:lstStyle>
+          <a:p>
+            <a:fld id="{9A1A8820-82DB-48D9-A915-C870303C0BCE}" type="datetimeFigureOut">
+              <a:rPr lang="en-US"/>
+              <a:t>12/10/2015</a:t>
+            </a:fld>
+            <a:endParaRPr lang="en-US"/>
+          </a:p>
+        </p:txBody>
+      </p:sp>
+      <p:sp>
+        <p:nvSpPr>
+          <p:cNvPr id="4" name="Slide Image Placeholder 3"/>
+          <p:cNvSpPr>
+            <a:spLocks noGrp="1" noRot="1" noChangeAspect="1"/>
+          </p:cNvSpPr>
+          <p:nvPr>
+            <p:ph type="sldImg" idx="2"/>
+          </p:nvPr>
+        </p:nvSpPr>
+        <p:spPr>
+          <a:xfrm>
+            <a:off x="685800" y="1143000"/>
+            <a:ext cx="5486400" cy="3086100"/>
+          </a:xfrm>
+          <a:prstGeom prst="rect">
+            <a:avLst/>
+          </a:prstGeom>
+          <a:noFill/>
+          <a:ln w="12700">
+            <a:solidFill>
+              <a:prstClr val="black"/>
+            </a:solidFill>
+          </a:ln>
+        </p:spPr>
+        <p:txBody>
+          <a:bodyPr vert="horz" lIns="91440" tIns="45720" rIns="91440" bIns="45720" rtlCol="0" anchor="ctr"/>
+          <a:lstStyle/>
+          <a:p>
+            <a:endParaRPr lang="en-US"/>
+          </a:p>
+        </p:txBody>
+      </p:sp>
+      <p:sp>
+        <p:nvSpPr>
+          <p:cNvPr id="5" name="Notes Placeholder 4"/>
+          <p:cNvSpPr>
+            <a:spLocks noGrp="1"/>
+          </p:cNvSpPr>
+          <p:nvPr>
+            <p:ph type="body" sz="quarter" idx="3"/>
+          </p:nvPr>
+        </p:nvSpPr>
+        <p:spPr>
+          <a:xfrm>
+            <a:off x="685800" y="4400550"/>
+            <a:ext cx="5486400" cy="3600450"/>
+          </a:xfrm>
+          <a:prstGeom prst="rect">
+            <a:avLst/>
+          </a:prstGeom>
+        </p:spPr>
+        <p:txBody>
+          <a:bodyPr vert="horz" lIns="91440" tIns="45720" rIns="91440" bIns="45720" rtlCol="0"/>
+          <a:lstStyle/>
+          <a:p>
+            <a:pPr lvl="0"/>
+            <a:r>
+              <a:rPr lang="en-US"/>
+              <a:t>Edit Master text styles</a:t>
+            </a:r>
+          </a:p>
+          <a:p>
+            <a:pPr lvl="1"/>
+            <a:r>
+              <a:rPr lang="en-US"/>
+              <a:t>Second level</a:t>
+            </a:r>
+          </a:p>
+          <a:p>
+            <a:pPr lvl="2"/>
+            <a:r>
+              <a:rPr lang="en-US"/>
+              <a:t>Third level</a:t>
+            </a:r>
+          </a:p>
+          <a:p>
+            <a:pPr lvl="3"/>
+            <a:r>
+              <a:rPr lang="en-US"/>
+              <a:t>Fourth level</a:t>
+            </a:r>
+          </a:p>
+          <a:p>
+            <a:pPr lvl="4"/>
+            <a:r>
+              <a:rPr lang="en-US"/>
+              <a:t>Fifth level</a:t>
+            </a:r>
+          </a:p>
+        </p:txBody>
+      </p:sp>
+      <p:sp>
+        <p:nvSpPr>
+          <p:cNvPr id="6" name="Footer Placeholder 5"/>
+          <p:cNvSpPr>
+            <a:spLocks noGrp="1"/>
+          </p:cNvSpPr>
+          <p:nvPr>
+            <p:ph type="ftr" sz="quarter" idx="4"/>
+          </p:nvPr>
+        </p:nvSpPr>
+        <p:spPr>
+          <a:xfrm>
+            <a:off x="0" y="8685213"/>
+            <a:ext cx="2971800" cy="458787"/>
+          </a:xfrm>
+          <a:prstGeom prst="rect">
+            <a:avLst/>
+          </a:prstGeom>
+        </p:spPr>
+        <p:txBody>
+          <a:bodyPr vert="horz" lIns="91440" tIns="45720" rIns="91440" bIns="45720" rtlCol="0" anchor="b"/>
+          <a:lstStyle>
+            <a:lvl1pPr algn="l">
+              <a:defRPr sz="1200"/>
+            </a:lvl1pPr>
+          </a:lstStyle>
+          <a:p>
+            <a:endParaRPr lang="en-US"/>
+          </a:p>
+        </p:txBody>
+      </p:sp>
+      <p:sp>
+        <p:nvSpPr>
+          <p:cNvPr id="7" name="Slide Number Placeholder 6"/>
+          <p:cNvSpPr>
+            <a:spLocks noGrp="1"/>
+          </p:cNvSpPr>
+          <p:nvPr>
+            <p:ph type="sldNum" sz="quarter" idx="5"/>
+          </p:nvPr>
+        </p:nvSpPr>
+        <p:spPr>
+          <a:xfrm>
+            <a:off x="3884613" y="8685213"/>
+            <a:ext cx="2971800" cy="458787"/>
+          </a:xfrm>
+          <a:prstGeom prst="rect">
+            <a:avLst/>
+          </a:prstGeom>
+        </p:spPr>
+        <p:txBody>
+          <a:bodyPr vert="horz" lIns="91440" tIns="45720" rIns="91440" bIns="45720" rtlCol="0" anchor="b"/>
+          <a:lstStyle>
+            <a:lvl1pPr algn="r">
+              <a:defRPr sz="1200"/>
+            </a:lvl1pPr>
+          </a:lstStyle>
+          <a:p>
+            <a:fld id="{9B28DC5A-27E6-41A6-B153-C26FB7BAFA83}" type="slidenum">
+              <a:rPr lang="en-US"/>
+              <a:t>‹#›</a:t>
+            </a:fld>
+            <a:endParaRPr lang="en-US"/>
+          </a:p>
+        </p:txBody>
+      </p:sp>
+    </p:spTree>
+    <p:extLst>
+      <p:ext uri="{BB962C8B-B14F-4D97-AF65-F5344CB8AC3E}">
+        <p14:creationId xmlns:p14="http://schemas.microsoft.com/office/powerpoint/2010/main" val="3666555772"/>
+      </p:ext>
+    </p:extLst>
+  </p:cSld>
+  <p:clrMap bg1="lt1" tx1="dk1" bg2="lt2" tx2="dk2" accent1="accent1" accent2="accent2" accent3="accent3" accent4="accent4" accent5="accent5" accent6="accent6" hlink="hlink" folHlink="folHlink"/>
+  <p:notesStyle>
+    <a:lvl1pPr marL="0" algn="l" defTabSz="914400" rtl="0" eaLnBrk="1" latinLnBrk="0" hangingPunct="1">
+      <a:defRPr sz="1200" kern="1200">
+        <a:solidFill>
+          <a:schemeClr val="tx1"/>
+        </a:solidFill>
+        <a:latin typeface="+mn-lt"/>
+        <a:ea typeface="+mn-ea"/>
+        <a:cs typeface="+mn-cs"/>
+      </a:defRPr>
+    </a:lvl1pPr>
+    <a:lvl2pPr marL="457200" algn="l" defTabSz="914400" rtl="0" eaLnBrk="1" latinLnBrk="0" hangingPunct="1">
+      <a:defRPr sz="1200" kern="1200">
+        <a:solidFill>
+          <a:schemeClr val="tx1"/>
+        </a:solidFill>
+        <a:latin typeface="+mn-lt"/>
+        <a:ea typeface="+mn-ea"/>
+        <a:cs typeface="+mn-cs"/>
+      </a:defRPr>
+    </a:lvl2pPr>
+    <a:lvl3pPr marL="914400" algn="l" defTabSz="914400" rtl="0" eaLnBrk="1" latinLnBrk="0" hangingPunct="1">
+      <a:defRPr sz="1200" kern="1200">
+        <a:solidFill>
+          <a:schemeClr val="tx1"/>
+        </a:solidFill>
+        <a:latin typeface="+mn-lt"/>
+        <a:ea typeface="+mn-ea"/>
+        <a:cs typeface="+mn-cs"/>
+      </a:defRPr>
+    </a:lvl3pPr>
+    <a:lvl4pPr marL="1371600" algn="l" defTabSz="914400" rtl="0" eaLnBrk="1" latinLnBrk="0" hangingPunct="1">
+      <a:defRPr sz="1200" kern="1200">
+        <a:solidFill>
+          <a:schemeClr val="tx1"/>
+        </a:solidFill>
+        <a:latin typeface="+mn-lt"/>
+        <a:ea typeface="+mn-ea"/>
+        <a:cs typeface="+mn-cs"/>
+      </a:defRPr>
+    </a:lvl4pPr>
+    <a:lvl5pPr marL="1828800" algn="l" defTabSz="914400" rtl="0" eaLnBrk="1" latinLnBrk="0" hangingPunct="1">
+      <a:defRPr sz="1200" kern="1200">
+        <a:solidFill>
+          <a:schemeClr val="tx1"/>
+        </a:solidFill>
+        <a:latin typeface="+mn-lt"/>
+        <a:ea typeface="+mn-ea"/>
+        <a:cs typeface="+mn-cs"/>
+      </a:defRPr>
+    </a:lvl5pPr>
+    <a:lvl6pPr marL="2286000" algn="l" defTabSz="914400" rtl="0" eaLnBrk="1" latinLnBrk="0" hangingPunct="1">
+      <a:defRPr sz="1200" kern="1200">
+        <a:solidFill>
+          <a:schemeClr val="tx1"/>
+        </a:solidFill>
+        <a:latin typeface="+mn-lt"/>
+        <a:ea typeface="+mn-ea"/>
+        <a:cs typeface="+mn-cs"/>
+      </a:defRPr>
+    </a:lvl6pPr>
+    <a:lvl7pPr marL="2743200" algn="l" defTabSz="914400" rtl="0" eaLnBrk="1" latinLnBrk="0" hangingPunct="1">
+      <a:defRPr sz="1200" kern="1200">
+        <a:solidFill>
+          <a:schemeClr val="tx1"/>
+        </a:solidFill>
+        <a:latin typeface="+mn-lt"/>
+        <a:ea typeface="+mn-ea"/>
+        <a:cs typeface="+mn-cs"/>
+      </a:defRPr>
+    </a:lvl7pPr>
+    <a:lvl8pPr marL="3200400" algn="l" defTabSz="914400" rtl="0" eaLnBrk="1" latinLnBrk="0" hangingPunct="1">
+      <a:defRPr sz="1200" kern="1200">
+        <a:solidFill>
+          <a:schemeClr val="tx1"/>
+        </a:solidFill>
+        <a:latin typeface="+mn-lt"/>
+        <a:ea typeface="+mn-ea"/>
+        <a:cs typeface="+mn-cs"/>
+      </a:defRPr>
+    </a:lvl8pPr>
+    <a:lvl9pPr marL="3657600" algn="l" defTabSz="914400" rtl="0" eaLnBrk="1" latinLnBrk="0" hangingPunct="1">
+      <a:defRPr sz="1200" kern="1200">
+        <a:solidFill>
+          <a:schemeClr val="tx1"/>
+        </a:solidFill>
+        <a:latin typeface="+mn-lt"/>
+        <a:ea typeface="+mn-ea"/>
+        <a:cs typeface="+mn-cs"/>
+      </a:defRPr>
+    </a:lvl9pPr>
+  </p:notesStyle>
+</p:notesMaster>
+</file>
+
+<file path=ppt/notesSlides/notesSlide1.xml><?xml version="1.0" encoding="utf-8"?>
+<p:notes xmlns:a="http://schemas.openxmlformats.org/drawingml/2006/main" xmlns:r="http://schemas.openxmlformats.org/officeDocument/2006/relationships" xmlns:p="http://schemas.openxmlformats.org/presentationml/2006/main">
+  <p:cSld>
+    <p:spTree>
+      <p:nvGrpSpPr>
+        <p:cNvPr id="1" name=""/>
+        <p:cNvGrpSpPr/>
+        <p:nvPr/>
+      </p:nvGrpSpPr>
+      <p:grpSpPr>
+        <a:xfrm>
+          <a:off x="0" y="0"/>
+          <a:ext cx="0" cy="0"/>
+          <a:chOff x="0" y="0"/>
+          <a:chExt cx="0" cy="0"/>
+        </a:xfrm>
+      </p:grpSpPr>
+      <p:sp>
+        <p:nvSpPr>
+          <p:cNvPr id="2" name="Slide Image Placeholder 1"/>
+          <p:cNvSpPr>
+            <a:spLocks noGrp="1" noRot="1" noChangeAspect="1"/>
+          </p:cNvSpPr>
+          <p:nvPr>
+            <p:ph type="sldImg"/>
+          </p:nvPr>
+        </p:nvSpPr>
+        <p:spPr/>
+      </p:sp>
+      <p:sp>
+        <p:nvSpPr>
+          <p:cNvPr id="3" name="Notes Placeholder 2"/>
+          <p:cNvSpPr>
+            <a:spLocks noGrp="1"/>
+          </p:cNvSpPr>
+          <p:nvPr>
+            <p:ph type="body" idx="1"/>
+          </p:nvPr>
+        </p:nvSpPr>
+        <p:spPr/>
+        <p:txBody>
+          <a:bodyPr/>
+          <a:lstStyle/>
+          <a:p>
+            <a:endParaRPr lang="en-US"/>
+          </a:p>
+        </p:txBody>
+      </p:sp>
+      <p:sp>
+        <p:nvSpPr>
+          <p:cNvPr id="4" name="Slide Number Placeholder 3"/>
+          <p:cNvSpPr>
+            <a:spLocks noGrp="1"/>
+          </p:cNvSpPr>
+          <p:nvPr>
+            <p:ph type="sldNum" sz="quarter" idx="10"/>
+          </p:nvPr>
+        </p:nvSpPr>
+        <p:spPr/>
+        <p:txBody>
+          <a:bodyPr/>
+          <a:lstStyle/>
+          <a:p>
+            <a:fld id="{9B28DC5A-27E6-41A6-B153-C26FB7BAFA83}" type="slidenum">
+              <a:rPr lang="en-US"/>
+              <a:t>1</a:t>
+            </a:fld>
+            <a:endParaRPr lang="en-US"/>
+          </a:p>
+        </p:txBody>
+      </p:sp>
+    </p:spTree>
+    <p:extLst>
+      <p:ext uri="{BB962C8B-B14F-4D97-AF65-F5344CB8AC3E}">
+        <p14:creationId xmlns:p14="http://schemas.microsoft.com/office/powerpoint/2010/main" val="3181246235"/>
+      </p:ext>
+    </p:extLst>
+  </p:cSld>
+  <p:clrMapOvr>
+    <a:masterClrMapping/>
+  </p:clrMapOvr>
+</p:notes>
+</file>
+
+<file path=ppt/notesSlides/notesSlide2.xml><?xml version="1.0" encoding="utf-8"?>
+<p:notes xmlns:a="http://schemas.openxmlformats.org/drawingml/2006/main" xmlns:r="http://schemas.openxmlformats.org/officeDocument/2006/relationships" xmlns:p="http://schemas.openxmlformats.org/presentationml/2006/main">
+  <p:cSld>
+    <p:spTree>
+      <p:nvGrpSpPr>
+        <p:cNvPr id="1" name=""/>
+        <p:cNvGrpSpPr/>
+        <p:nvPr/>
+      </p:nvGrpSpPr>
+      <p:grpSpPr>
+        <a:xfrm>
+          <a:off x="0" y="0"/>
+          <a:ext cx="0" cy="0"/>
+          <a:chOff x="0" y="0"/>
+          <a:chExt cx="0" cy="0"/>
+        </a:xfrm>
+      </p:grpSpPr>
+      <p:sp>
+        <p:nvSpPr>
+          <p:cNvPr id="2" name="Slide Image Placeholder 1"/>
+          <p:cNvSpPr>
+            <a:spLocks noGrp="1" noRot="1" noChangeAspect="1"/>
+          </p:cNvSpPr>
+          <p:nvPr>
+            <p:ph type="sldImg"/>
+          </p:nvPr>
+        </p:nvSpPr>
+        <p:spPr/>
+      </p:sp>
+      <p:sp>
+        <p:nvSpPr>
+          <p:cNvPr id="3" name="Notes Placeholder 2"/>
+          <p:cNvSpPr>
+            <a:spLocks noGrp="1"/>
+          </p:cNvSpPr>
+          <p:nvPr>
+            <p:ph type="body" idx="1"/>
+          </p:nvPr>
+        </p:nvSpPr>
+        <p:spPr/>
+        <p:txBody>
+          <a:bodyPr/>
+          <a:lstStyle/>
+          <a:p>
+            <a:endParaRPr lang="en-US"/>
+          </a:p>
+        </p:txBody>
+      </p:sp>
+      <p:sp>
+        <p:nvSpPr>
+          <p:cNvPr id="4" name="Slide Number Placeholder 3"/>
+          <p:cNvSpPr>
+            <a:spLocks noGrp="1"/>
+          </p:cNvSpPr>
+          <p:nvPr>
+            <p:ph type="sldNum" sz="quarter" idx="10"/>
+          </p:nvPr>
+        </p:nvSpPr>
+        <p:spPr/>
+        <p:txBody>
+          <a:bodyPr/>
+          <a:lstStyle/>
+          <a:p>
+            <a:fld id="{9B28DC5A-27E6-41A6-B153-C26FB7BAFA83}" type="slidenum">
+              <a:rPr lang="en-US"/>
+              <a:t>2</a:t>
+            </a:fld>
+            <a:endParaRPr lang="en-US"/>
+          </a:p>
+        </p:txBody>
+      </p:sp>
+    </p:spTree>
+    <p:extLst>
+      <p:ext uri="{BB962C8B-B14F-4D97-AF65-F5344CB8AC3E}">
+        <p14:creationId xmlns:p14="http://schemas.microsoft.com/office/powerpoint/2010/main" val="690991104"/>
+      </p:ext>
+    </p:extLst>
+  </p:cSld>
+  <p:clrMapOvr>
+    <a:masterClrMapping/>
+  </p:clrMapOvr>
+</p:notes>
+</file>
+
+<file path=ppt/notesSlides/notesSlide3.xml><?xml version="1.0" encoding="utf-8"?>
+<p:notes xmlns:a="http://schemas.openxmlformats.org/drawingml/2006/main" xmlns:r="http://schemas.openxmlformats.org/officeDocument/2006/relationships" xmlns:p="http://schemas.openxmlformats.org/presentationml/2006/main">
+  <p:cSld>
+    <p:spTree>
+      <p:nvGrpSpPr>
+        <p:cNvPr id="1" name=""/>
+        <p:cNvGrpSpPr/>
+        <p:nvPr/>
+      </p:nvGrpSpPr>
+      <p:grpSpPr>
+        <a:xfrm>
+          <a:off x="0" y="0"/>
+          <a:ext cx="0" cy="0"/>
+          <a:chOff x="0" y="0"/>
+          <a:chExt cx="0" cy="0"/>
+        </a:xfrm>
+      </p:grpSpPr>
+      <p:sp>
+        <p:nvSpPr>
+          <p:cNvPr id="2" name="Slide Image Placeholder 1"/>
+          <p:cNvSpPr>
+            <a:spLocks noGrp="1" noRot="1" noChangeAspect="1"/>
+          </p:cNvSpPr>
+          <p:nvPr>
+            <p:ph type="sldImg"/>
+          </p:nvPr>
+        </p:nvSpPr>
+        <p:spPr/>
+      </p:sp>
+      <p:sp>
+        <p:nvSpPr>
+          <p:cNvPr id="3" name="Notes Placeholder 2"/>
+          <p:cNvSpPr>
+            <a:spLocks noGrp="1"/>
+          </p:cNvSpPr>
+          <p:nvPr>
+            <p:ph type="body" idx="1"/>
+          </p:nvPr>
+        </p:nvSpPr>
+        <p:spPr/>
+        <p:txBody>
+          <a:bodyPr/>
+          <a:lstStyle/>
+          <a:p>
+            <a:endParaRPr lang="en-US"/>
+          </a:p>
+        </p:txBody>
+      </p:sp>
+      <p:sp>
+        <p:nvSpPr>
+          <p:cNvPr id="4" name="Slide Number Placeholder 3"/>
+          <p:cNvSpPr>
+            <a:spLocks noGrp="1"/>
+          </p:cNvSpPr>
+          <p:nvPr>
+            <p:ph type="sldNum" sz="quarter" idx="10"/>
+          </p:nvPr>
+        </p:nvSpPr>
+        <p:spPr/>
+        <p:txBody>
+          <a:bodyPr/>
+          <a:lstStyle/>
+          <a:p>
+            <a:fld id="{9B28DC5A-27E6-41A6-B153-C26FB7BAFA83}" type="slidenum">
+              <a:rPr lang="en-US"/>
+              <a:t>3</a:t>
+            </a:fld>
+            <a:endParaRPr lang="en-US"/>
+          </a:p>
+        </p:txBody>
+      </p:sp>
+    </p:spTree>
+    <p:extLst>
+      <p:ext uri="{BB962C8B-B14F-4D97-AF65-F5344CB8AC3E}">
+        <p14:creationId xmlns:p14="http://schemas.microsoft.com/office/powerpoint/2010/main" val="668900987"/>
+      </p:ext>
+    </p:extLst>
+  </p:cSld>
+  <p:clrMapOvr>
+    <a:masterClrMapping/>
+  </p:clrMapOvr>
+</p:notes>
+</file>
+
+<file path=ppt/notesSlides/notesSlide4.xml><?xml version="1.0" encoding="utf-8"?>
+<p:notes xmlns:a="http://schemas.openxmlformats.org/drawingml/2006/main" xmlns:r="http://schemas.openxmlformats.org/officeDocument/2006/relationships" xmlns:p="http://schemas.openxmlformats.org/presentationml/2006/main">
+  <p:cSld>
+    <p:spTree>
+      <p:nvGrpSpPr>
+        <p:cNvPr id="1" name=""/>
+        <p:cNvGrpSpPr/>
+        <p:nvPr/>
+      </p:nvGrpSpPr>
+      <p:grpSpPr>
+        <a:xfrm>
+          <a:off x="0" y="0"/>
+          <a:ext cx="0" cy="0"/>
+          <a:chOff x="0" y="0"/>
+          <a:chExt cx="0" cy="0"/>
+        </a:xfrm>
+      </p:grpSpPr>
+      <p:sp>
+        <p:nvSpPr>
+          <p:cNvPr id="2" name="Slide Image Placeholder 1"/>
+          <p:cNvSpPr>
+            <a:spLocks noGrp="1" noRot="1" noChangeAspect="1"/>
+          </p:cNvSpPr>
+          <p:nvPr>
+            <p:ph type="sldImg"/>
+          </p:nvPr>
+        </p:nvSpPr>
+        <p:spPr/>
+      </p:sp>
+      <p:sp>
+        <p:nvSpPr>
+          <p:cNvPr id="3" name="Notes Placeholder 2"/>
+          <p:cNvSpPr>
+            <a:spLocks noGrp="1"/>
+          </p:cNvSpPr>
+          <p:nvPr>
+            <p:ph type="body" idx="1"/>
+          </p:nvPr>
+        </p:nvSpPr>
+        <p:spPr/>
+        <p:txBody>
+          <a:bodyPr/>
+          <a:lstStyle/>
+          <a:p>
+            <a:endParaRPr lang="en-US"/>
+          </a:p>
+        </p:txBody>
+      </p:sp>
+      <p:sp>
+        <p:nvSpPr>
+          <p:cNvPr id="4" name="Slide Number Placeholder 3"/>
+          <p:cNvSpPr>
+            <a:spLocks noGrp="1"/>
+          </p:cNvSpPr>
+          <p:nvPr>
+            <p:ph type="sldNum" sz="quarter" idx="10"/>
+          </p:nvPr>
+        </p:nvSpPr>
+        <p:spPr/>
+        <p:txBody>
+          <a:bodyPr/>
+          <a:lstStyle/>
+          <a:p>
+            <a:fld id="{9B28DC5A-27E6-41A6-B153-C26FB7BAFA83}" type="slidenum">
+              <a:rPr lang="en-US"/>
+              <a:t>4</a:t>
+            </a:fld>
+            <a:endParaRPr lang="en-US"/>
+          </a:p>
+        </p:txBody>
+      </p:sp>
+    </p:spTree>
+    <p:extLst>
+      <p:ext uri="{BB962C8B-B14F-4D97-AF65-F5344CB8AC3E}">
+        <p14:creationId xmlns:p14="http://schemas.microsoft.com/office/powerpoint/2010/main" val="3762239878"/>
+      </p:ext>
+    </p:extLst>
+  </p:cSld>
+  <p:clrMapOvr>
+    <a:masterClrMapping/>
+  </p:clrMapOvr>
+</p:notes>
+</file>
+
+<file path=ppt/notesSlides/notesSlide5.xml><?xml version="1.0" encoding="utf-8"?>
+<p:notes xmlns:a="http://schemas.openxmlformats.org/drawingml/2006/main" xmlns:r="http://schemas.openxmlformats.org/officeDocument/2006/relationships" xmlns:p="http://schemas.openxmlformats.org/presentationml/2006/main">
+  <p:cSld>
+    <p:spTree>
+      <p:nvGrpSpPr>
+        <p:cNvPr id="1" name=""/>
+        <p:cNvGrpSpPr/>
+        <p:nvPr/>
+      </p:nvGrpSpPr>
+      <p:grpSpPr>
+        <a:xfrm>
+          <a:off x="0" y="0"/>
+          <a:ext cx="0" cy="0"/>
+          <a:chOff x="0" y="0"/>
+          <a:chExt cx="0" cy="0"/>
+        </a:xfrm>
+      </p:grpSpPr>
+      <p:sp>
+        <p:nvSpPr>
+          <p:cNvPr id="2" name="Slide Image Placeholder 1"/>
+          <p:cNvSpPr>
+            <a:spLocks noGrp="1" noRot="1" noChangeAspect="1"/>
+          </p:cNvSpPr>
+          <p:nvPr>
+            <p:ph type="sldImg"/>
+          </p:nvPr>
+        </p:nvSpPr>
+        <p:spPr/>
+      </p:sp>
+      <p:sp>
+        <p:nvSpPr>
+          <p:cNvPr id="3" name="Notes Placeholder 2"/>
+          <p:cNvSpPr>
+            <a:spLocks noGrp="1"/>
+          </p:cNvSpPr>
+          <p:nvPr>
+            <p:ph type="body" idx="1"/>
+          </p:nvPr>
+        </p:nvSpPr>
+        <p:spPr/>
+        <p:txBody>
+          <a:bodyPr/>
+          <a:lstStyle/>
+          <a:p>
+            <a:endParaRPr lang="en-US"/>
+          </a:p>
+        </p:txBody>
+      </p:sp>
+      <p:sp>
+        <p:nvSpPr>
+          <p:cNvPr id="4" name="Slide Number Placeholder 3"/>
+          <p:cNvSpPr>
+            <a:spLocks noGrp="1"/>
+          </p:cNvSpPr>
+          <p:nvPr>
+            <p:ph type="sldNum" sz="quarter" idx="10"/>
+          </p:nvPr>
+        </p:nvSpPr>
+        <p:spPr/>
+        <p:txBody>
+          <a:bodyPr/>
+          <a:lstStyle/>
+          <a:p>
+            <a:fld id="{9B28DC5A-27E6-41A6-B153-C26FB7BAFA83}" type="slidenum">
+              <a:rPr lang="en-US"/>
+              <a:t>5</a:t>
+            </a:fld>
+            <a:endParaRPr lang="en-US"/>
+          </a:p>
+        </p:txBody>
+      </p:sp>
+    </p:spTree>
+    <p:extLst>
+      <p:ext uri="{BB962C8B-B14F-4D97-AF65-F5344CB8AC3E}">
+        <p14:creationId xmlns:p14="http://schemas.microsoft.com/office/powerpoint/2010/main" val="2899676593"/>
+      </p:ext>
+    </p:extLst>
+  </p:cSld>
+  <p:clrMapOvr>
+    <a:masterClrMapping/>
+  </p:clrMapOvr>
+</p:notes>
+</file>
+
+<file path=ppt/notesSlides/notesSlide6.xml><?xml version="1.0" encoding="utf-8"?>
+<p:notes xmlns:a="http://schemas.openxmlformats.org/drawingml/2006/main" xmlns:r="http://schemas.openxmlformats.org/officeDocument/2006/relationships" xmlns:p="http://schemas.openxmlformats.org/presentationml/2006/main">
+  <p:cSld>
+    <p:spTree>
+      <p:nvGrpSpPr>
+        <p:cNvPr id="1" name=""/>
+        <p:cNvGrpSpPr/>
+        <p:nvPr/>
+      </p:nvGrpSpPr>
+      <p:grpSpPr>
+        <a:xfrm>
+          <a:off x="0" y="0"/>
+          <a:ext cx="0" cy="0"/>
+          <a:chOff x="0" y="0"/>
+          <a:chExt cx="0" cy="0"/>
+        </a:xfrm>
+      </p:grpSpPr>
+      <p:sp>
+        <p:nvSpPr>
+          <p:cNvPr id="2" name="Slide Image Placeholder 1"/>
+          <p:cNvSpPr>
+            <a:spLocks noGrp="1" noRot="1" noChangeAspect="1"/>
+          </p:cNvSpPr>
+          <p:nvPr>
+            <p:ph type="sldImg"/>
+          </p:nvPr>
+        </p:nvSpPr>
+        <p:spPr/>
+      </p:sp>
+      <p:sp>
+        <p:nvSpPr>
+          <p:cNvPr id="3" name="Notes Placeholder 2"/>
+          <p:cNvSpPr>
+            <a:spLocks noGrp="1"/>
+          </p:cNvSpPr>
+          <p:nvPr>
+            <p:ph type="body" idx="1"/>
+          </p:nvPr>
+        </p:nvSpPr>
+        <p:spPr/>
+        <p:txBody>
+          <a:bodyPr/>
+          <a:lstStyle/>
+          <a:p>
+            <a:endParaRPr lang="en-US"/>
+          </a:p>
+        </p:txBody>
+      </p:sp>
+      <p:sp>
+        <p:nvSpPr>
+          <p:cNvPr id="4" name="Slide Number Placeholder 3"/>
+          <p:cNvSpPr>
+            <a:spLocks noGrp="1"/>
+          </p:cNvSpPr>
+          <p:nvPr>
+            <p:ph type="sldNum" sz="quarter" idx="10"/>
+          </p:nvPr>
+        </p:nvSpPr>
+        <p:spPr/>
+        <p:txBody>
+          <a:bodyPr/>
+          <a:lstStyle/>
+          <a:p>
+            <a:fld id="{9B28DC5A-27E6-41A6-B153-C26FB7BAFA83}" type="slidenum">
+              <a:rPr lang="en-US"/>
+              <a:t>6</a:t>
+            </a:fld>
+            <a:endParaRPr lang="en-US"/>
+          </a:p>
+        </p:txBody>
+      </p:sp>
+    </p:spTree>
+    <p:extLst>
+      <p:ext uri="{BB962C8B-B14F-4D97-AF65-F5344CB8AC3E}">
+        <p14:creationId xmlns:p14="http://schemas.microsoft.com/office/powerpoint/2010/main" val="4074381640"/>
+      </p:ext>
+    </p:extLst>
+  </p:cSld>
+  <p:clrMapOvr>
+    <a:masterClrMapping/>
+  </p:clrMapOvr>
+</p:notes>
+</file>
+
+<file path=ppt/notesSlides/notesSlide7.xml><?xml version="1.0" encoding="utf-8"?>
+<p:notes xmlns:a="http://schemas.openxmlformats.org/drawingml/2006/main" xmlns:r="http://schemas.openxmlformats.org/officeDocument/2006/relationships" xmlns:p="http://schemas.openxmlformats.org/presentationml/2006/main">
+  <p:cSld>
+    <p:spTree>
+      <p:nvGrpSpPr>
+        <p:cNvPr id="1" name=""/>
+        <p:cNvGrpSpPr/>
+        <p:nvPr/>
+      </p:nvGrpSpPr>
+      <p:grpSpPr>
+        <a:xfrm>
+          <a:off x="0" y="0"/>
+          <a:ext cx="0" cy="0"/>
+          <a:chOff x="0" y="0"/>
+          <a:chExt cx="0" cy="0"/>
+        </a:xfrm>
+      </p:grpSpPr>
+      <p:sp>
+        <p:nvSpPr>
+          <p:cNvPr id="2" name="Slide Image Placeholder 1"/>
+          <p:cNvSpPr>
+            <a:spLocks noGrp="1" noRot="1" noChangeAspect="1"/>
+          </p:cNvSpPr>
+          <p:nvPr>
+            <p:ph type="sldImg"/>
+          </p:nvPr>
+        </p:nvSpPr>
+        <p:spPr/>
+      </p:sp>
+      <p:sp>
+        <p:nvSpPr>
+          <p:cNvPr id="3" name="Notes Placeholder 2"/>
+          <p:cNvSpPr>
+            <a:spLocks noGrp="1"/>
+          </p:cNvSpPr>
+          <p:nvPr>
+            <p:ph type="body" idx="1"/>
+          </p:nvPr>
+        </p:nvSpPr>
+        <p:spPr/>
+        <p:txBody>
+          <a:bodyPr/>
+          <a:lstStyle/>
+          <a:p>
+            <a:endParaRPr lang="en-US"/>
+          </a:p>
+        </p:txBody>
+      </p:sp>
+      <p:sp>
+        <p:nvSpPr>
+          <p:cNvPr id="4" name="Slide Number Placeholder 3"/>
+          <p:cNvSpPr>
+            <a:spLocks noGrp="1"/>
+          </p:cNvSpPr>
+          <p:nvPr>
+            <p:ph type="sldNum" sz="quarter" idx="10"/>
+          </p:nvPr>
+        </p:nvSpPr>
+        <p:spPr/>
+        <p:txBody>
+          <a:bodyPr/>
+          <a:lstStyle/>
+          <a:p>
+            <a:fld id="{9B28DC5A-27E6-41A6-B153-C26FB7BAFA83}" type="slidenum">
+              <a:rPr lang="en-US"/>
+              <a:t>7</a:t>
+            </a:fld>
+            <a:endParaRPr lang="en-US"/>
+          </a:p>
+        </p:txBody>
+      </p:sp>
+    </p:spTree>
+    <p:extLst>
+      <p:ext uri="{BB962C8B-B14F-4D97-AF65-F5344CB8AC3E}">
+        <p14:creationId xmlns:p14="http://schemas.microsoft.com/office/powerpoint/2010/main" val="386683935"/>
+      </p:ext>
+    </p:extLst>
+  </p:cSld>
+  <p:clrMapOvr>
+    <a:masterClrMapping/>
+  </p:clrMapOvr>
+</p:notes>
+</file>
+
+<file path=ppt/notesSlides/notesSlide8.xml><?xml version="1.0" encoding="utf-8"?>
+<p:notes xmlns:a="http://schemas.openxmlformats.org/drawingml/2006/main" xmlns:r="http://schemas.openxmlformats.org/officeDocument/2006/relationships" xmlns:p="http://schemas.openxmlformats.org/presentationml/2006/main">
+  <p:cSld>
+    <p:spTree>
+      <p:nvGrpSpPr>
+        <p:cNvPr id="1" name=""/>
+        <p:cNvGrpSpPr/>
+        <p:nvPr/>
+      </p:nvGrpSpPr>
+      <p:grpSpPr>
+        <a:xfrm>
+          <a:off x="0" y="0"/>
+          <a:ext cx="0" cy="0"/>
+          <a:chOff x="0" y="0"/>
+          <a:chExt cx="0" cy="0"/>
+        </a:xfrm>
+      </p:grpSpPr>
+      <p:sp>
+        <p:nvSpPr>
+          <p:cNvPr id="2" name="Slide Image Placeholder 1"/>
+          <p:cNvSpPr>
+            <a:spLocks noGrp="1" noRot="1" noChangeAspect="1"/>
+          </p:cNvSpPr>
+          <p:nvPr>
+            <p:ph type="sldImg"/>
+          </p:nvPr>
+        </p:nvSpPr>
+        <p:spPr/>
+      </p:sp>
+      <p:sp>
+        <p:nvSpPr>
+          <p:cNvPr id="3" name="Notes Placeholder 2"/>
+          <p:cNvSpPr>
+            <a:spLocks noGrp="1"/>
+          </p:cNvSpPr>
+          <p:nvPr>
+            <p:ph type="body" idx="1"/>
+          </p:nvPr>
+        </p:nvSpPr>
+        <p:spPr/>
+        <p:txBody>
+          <a:bodyPr/>
+          <a:lstStyle/>
+          <a:p>
+            <a:endParaRPr lang="en-US"/>
+          </a:p>
+        </p:txBody>
+      </p:sp>
+      <p:sp>
+        <p:nvSpPr>
+          <p:cNvPr id="4" name="Slide Number Placeholder 3"/>
+          <p:cNvSpPr>
+            <a:spLocks noGrp="1"/>
+          </p:cNvSpPr>
+          <p:nvPr>
+            <p:ph type="sldNum" sz="quarter" idx="10"/>
+          </p:nvPr>
+        </p:nvSpPr>
+        <p:spPr/>
+        <p:txBody>
+          <a:bodyPr/>
+          <a:lstStyle/>
+          <a:p>
+            <a:fld id="{9B28DC5A-27E6-41A6-B153-C26FB7BAFA83}" type="slidenum">
+              <a:rPr lang="en-US"/>
+              <a:t>8</a:t>
+            </a:fld>
+            <a:endParaRPr lang="en-US"/>
+          </a:p>
+        </p:txBody>
+      </p:sp>
+    </p:spTree>
+    <p:extLst>
+      <p:ext uri="{BB962C8B-B14F-4D97-AF65-F5344CB8AC3E}">
+        <p14:creationId xmlns:p14="http://schemas.microsoft.com/office/powerpoint/2010/main" val="3081551843"/>
+      </p:ext>
+    </p:extLst>
+  </p:cSld>
+  <p:clrMapOvr>
+    <a:masterClrMapping/>
+  </p:clrMapOvr>
+</p:notes>
 </file>
 
 <file path=ppt/slideLayouts/slideLayout1.xml><?xml version="1.0" encoding="utf-8"?>
@@ -412,7 +1436,7 @@
           <a:p>
             <a:fld id="{91D87D8D-DA73-4EBB-B63C-B02DCD3A49B3}" type="datetimeFigureOut">
               <a:rPr lang="en-US" smtClean="0"/>
-              <a:t>09-Dec-15</a:t>
+              <a:t>12/10/2015</a:t>
             </a:fld>
             <a:endParaRPr lang="en-US" dirty="0"/>
           </a:p>
@@ -582,7 +1606,7 @@
           <a:p>
             <a:fld id="{91D87D8D-DA73-4EBB-B63C-B02DCD3A49B3}" type="datetimeFigureOut">
               <a:rPr lang="en-US" smtClean="0"/>
-              <a:t>09-Dec-15</a:t>
+              <a:t>12/10/2015</a:t>
             </a:fld>
             <a:endParaRPr lang="en-US" dirty="0"/>
           </a:p>
@@ -762,7 +1786,7 @@
           <a:p>
             <a:fld id="{91D87D8D-DA73-4EBB-B63C-B02DCD3A49B3}" type="datetimeFigureOut">
               <a:rPr lang="en-US" smtClean="0"/>
-              <a:t>09-Dec-15</a:t>
+              <a:t>12/10/2015</a:t>
             </a:fld>
             <a:endParaRPr lang="en-US" dirty="0"/>
           </a:p>
@@ -954,7 +1978,7 @@
           <a:p>
             <a:fld id="{91D87D8D-DA73-4EBB-B63C-B02DCD3A49B3}" type="datetimeFigureOut">
               <a:rPr lang="en-US" smtClean="0"/>
-              <a:t>09-Dec-15</a:t>
+              <a:t>12/10/2015</a:t>
             </a:fld>
             <a:endParaRPr lang="en-US" dirty="0"/>
           </a:p>
@@ -1131,7 +2155,7 @@
           <a:p>
             <a:fld id="{91D87D8D-DA73-4EBB-B63C-B02DCD3A49B3}" type="datetimeFigureOut">
               <a:rPr lang="en-US" smtClean="0"/>
-              <a:t>09-Dec-15</a:t>
+              <a:t>12/10/2015</a:t>
             </a:fld>
             <a:endParaRPr lang="en-US" dirty="0"/>
           </a:p>
@@ -1377,7 +2401,7 @@
           <a:p>
             <a:fld id="{91D87D8D-DA73-4EBB-B63C-B02DCD3A49B3}" type="datetimeFigureOut">
               <a:rPr lang="en-US" smtClean="0"/>
-              <a:t>09-Dec-15</a:t>
+              <a:t>12/10/2015</a:t>
             </a:fld>
             <a:endParaRPr lang="en-US" dirty="0"/>
           </a:p>
@@ -1609,7 +2633,7 @@
           <a:p>
             <a:fld id="{91D87D8D-DA73-4EBB-B63C-B02DCD3A49B3}" type="datetimeFigureOut">
               <a:rPr lang="en-US" smtClean="0"/>
-              <a:t>09-Dec-15</a:t>
+              <a:t>12/10/2015</a:t>
             </a:fld>
             <a:endParaRPr lang="en-US" dirty="0"/>
           </a:p>
@@ -1976,7 +3000,7 @@
           <a:p>
             <a:fld id="{91D87D8D-DA73-4EBB-B63C-B02DCD3A49B3}" type="datetimeFigureOut">
               <a:rPr lang="en-US" smtClean="0"/>
-              <a:t>09-Dec-15</a:t>
+              <a:t>12/10/2015</a:t>
             </a:fld>
             <a:endParaRPr lang="en-US" dirty="0"/>
           </a:p>
@@ -2094,7 +3118,7 @@
           <a:p>
             <a:fld id="{91D87D8D-DA73-4EBB-B63C-B02DCD3A49B3}" type="datetimeFigureOut">
               <a:rPr lang="en-US" smtClean="0"/>
-              <a:t>09-Dec-15</a:t>
+              <a:t>12/10/2015</a:t>
             </a:fld>
             <a:endParaRPr lang="en-US" dirty="0"/>
           </a:p>
@@ -2189,7 +3213,7 @@
           <a:p>
             <a:fld id="{91D87D8D-DA73-4EBB-B63C-B02DCD3A49B3}" type="datetimeFigureOut">
               <a:rPr lang="en-US" smtClean="0"/>
-              <a:t>09-Dec-15</a:t>
+              <a:t>12/10/2015</a:t>
             </a:fld>
             <a:endParaRPr lang="en-US" dirty="0"/>
           </a:p>
@@ -2466,7 +3490,7 @@
           <a:p>
             <a:fld id="{91D87D8D-DA73-4EBB-B63C-B02DCD3A49B3}" type="datetimeFigureOut">
               <a:rPr lang="en-US" smtClean="0"/>
-              <a:t>09-Dec-15</a:t>
+              <a:t>12/10/2015</a:t>
             </a:fld>
             <a:endParaRPr lang="en-US" dirty="0"/>
           </a:p>
@@ -2679,7 +3703,7 @@
           <a:p>
             <a:fld id="{91D87D8D-DA73-4EBB-B63C-B02DCD3A49B3}" type="datetimeFigureOut">
               <a:rPr lang="en-US" smtClean="0"/>
-              <a:t>09-Dec-15</a:t>
+              <a:t>12/10/2015</a:t>
             </a:fld>
             <a:endParaRPr lang="en-US" dirty="0"/>
           </a:p>
@@ -6001,9 +7025,9 @@
                     <p:grpSpPr>
                       <a:xfrm>
                         <a:off x="4520169" y="3679420"/>
-                        <a:ext cx="1304369" cy="169277"/>
+                        <a:ext cx="1477406" cy="169277"/>
                         <a:chOff x="4520169" y="3679420"/>
-                        <a:chExt cx="1304369" cy="169277"/>
+                        <a:chExt cx="1477406" cy="169277"/>
                       </a:xfrm>
                     </p:grpSpPr>
                     <p:sp>
@@ -6462,7 +7486,7 @@
                       <p:spPr>
                         <a:xfrm>
                           <a:off x="4941351" y="3679420"/>
-                          <a:ext cx="883187" cy="169277"/>
+                          <a:ext cx="1056224" cy="169277"/>
                         </a:xfrm>
                         <a:prstGeom prst="rect">
                           <a:avLst/>
@@ -6483,7 +7507,7 @@
                               <a:latin typeface="Segoe UI" panose="020B0502040204020203" pitchFamily="34" charset="0"/>
                               <a:cs typeface="Segoe UI" panose="020B0502040204020203" pitchFamily="34" charset="0"/>
                             </a:rPr>
-                            <a:t>Study edit</a:t>
+                            <a:t>Manage Studies</a:t>
                           </a:r>
                           <a:endParaRPr lang="en-US" sz="1100" dirty="0">
                             <a:solidFill>
@@ -6746,7 +7770,7 @@
               </p:nvPr>
             </p:nvPicPr>
             <p:blipFill>
-              <a:blip r:embed="rId12" cstate="print">
+              <a:blip r:embed="rId13" cstate="print">
                 <a:extLst>
                   <a:ext uri="{28A0092B-C50C-407E-A947-70E740481C1C}">
                     <a14:useLocalDpi xmlns:a14="http://schemas.microsoft.com/office/drawing/2010/main" val="0"/>
@@ -6995,7 +8019,7 @@
           <p:nvPr/>
         </p:nvPicPr>
         <p:blipFill>
-          <a:blip r:embed="rId13">
+          <a:blip r:embed="rId14">
             <a:extLst>
               <a:ext uri="{28A0092B-C50C-407E-A947-70E740481C1C}">
                 <a14:useLocalDpi xmlns:a14="http://schemas.microsoft.com/office/drawing/2010/main" val="0"/>
@@ -8480,7 +9504,7 @@
               </p:nvPr>
             </p:nvPicPr>
             <p:blipFill>
-              <a:blip r:embed="rId16" cstate="print">
+              <a:blip r:embed="rId17" cstate="print">
                 <a:extLst>
                   <a:ext uri="{28A0092B-C50C-407E-A947-70E740481C1C}">
                     <a14:useLocalDpi xmlns:a14="http://schemas.microsoft.com/office/drawing/2010/main" val="0"/>
@@ -9138,7 +10162,7 @@
           <p:nvPr/>
         </p:nvPicPr>
         <p:blipFill>
-          <a:blip r:embed="rId17">
+          <a:blip r:embed="rId18">
             <a:extLst>
               <a:ext uri="{28A0092B-C50C-407E-A947-70E740481C1C}">
                 <a14:useLocalDpi xmlns:a14="http://schemas.microsoft.com/office/drawing/2010/main" val="0"/>
@@ -10623,7 +11647,7 @@
               </p:nvPr>
             </p:nvPicPr>
             <p:blipFill>
-              <a:blip r:embed="rId18" cstate="print">
+              <a:blip r:embed="rId19" cstate="print">
                 <a:extLst>
                   <a:ext uri="{28A0092B-C50C-407E-A947-70E740481C1C}">
                     <a14:useLocalDpi xmlns:a14="http://schemas.microsoft.com/office/drawing/2010/main" val="0"/>
@@ -11547,7 +12571,7 @@
               <p:nvPr/>
             </p:nvPicPr>
             <p:blipFill>
-              <a:blip r:embed="rId19"/>
+              <a:blip r:embed="rId20"/>
               <a:stretch>
                 <a:fillRect/>
               </a:stretch>
@@ -11571,7 +12595,7 @@
               <p:nvPr/>
             </p:nvPicPr>
             <p:blipFill>
-              <a:blip r:embed="rId20"/>
+              <a:blip r:embed="rId21"/>
               <a:stretch>
                 <a:fillRect/>
               </a:stretch>
@@ -11595,7 +12619,7 @@
               <p:nvPr/>
             </p:nvPicPr>
             <p:blipFill>
-              <a:blip r:embed="rId21"/>
+              <a:blip r:embed="rId22"/>
               <a:stretch>
                 <a:fillRect/>
               </a:stretch>
@@ -12192,7 +13216,7 @@
           <p:nvPr/>
         </p:nvPicPr>
         <p:blipFill>
-          <a:blip r:embed="rId22">
+          <a:blip r:embed="rId23">
             <a:extLst>
               <a:ext uri="{28A0092B-C50C-407E-A947-70E740481C1C}">
                 <a14:useLocalDpi xmlns:a14="http://schemas.microsoft.com/office/drawing/2010/main" val="0"/>
@@ -12830,7 +13854,7 @@
             <p:cNvGrpSpPr/>
             <p:nvPr>
               <p:custDataLst>
-                <p:custData r:id="rId18"/>
+                <p:custData r:id="rId16"/>
               </p:custDataLst>
             </p:nvPr>
           </p:nvGrpSpPr>
@@ -12848,7 +13872,7 @@
               <p:cNvGrpSpPr/>
               <p:nvPr>
                 <p:custDataLst>
-                  <p:custData r:id="rId21"/>
+                  <p:custData r:id="rId19"/>
                 </p:custDataLst>
               </p:nvPr>
             </p:nvGrpSpPr>
@@ -12866,7 +13890,7 @@
                 <p:cNvGrpSpPr/>
                 <p:nvPr>
                   <p:custDataLst>
-                    <p:custData r:id="rId23"/>
+                    <p:custData r:id="rId21"/>
                   </p:custDataLst>
                 </p:nvPr>
               </p:nvGrpSpPr>
@@ -13515,8 +14539,8 @@
                 </p:cNvSpPr>
                 <p:nvPr>
                   <p:custDataLst>
-                    <p:custData r:id="rId24"/>
-                    <p:custData r:id="rId25"/>
+                    <p:custData r:id="rId22"/>
+                    <p:custData r:id="rId23"/>
                   </p:custDataLst>
                 </p:nvPr>
               </p:nvSpPr>
@@ -13672,12 +14696,12 @@
               </p:cNvPicPr>
               <p:nvPr>
                 <p:custDataLst>
-                  <p:custData r:id="rId22"/>
+                  <p:custData r:id="rId20"/>
                 </p:custDataLst>
               </p:nvPr>
             </p:nvPicPr>
             <p:blipFill>
-              <a:blip r:embed="rId27" cstate="print">
+              <a:blip r:embed="rId26" cstate="print">
                 <a:extLst>
                   <a:ext uri="{28A0092B-C50C-407E-A947-70E740481C1C}">
                     <a14:useLocalDpi xmlns:a14="http://schemas.microsoft.com/office/drawing/2010/main" val="0"/>
@@ -13718,8 +14742,8 @@
             </p:cNvSpPr>
             <p:nvPr>
               <p:custDataLst>
-                <p:custData r:id="rId19"/>
-                <p:custData r:id="rId20"/>
+                <p:custData r:id="rId17"/>
+                <p:custData r:id="rId18"/>
               </p:custDataLst>
             </p:nvPr>
           </p:nvSpPr>
@@ -14013,7 +15037,13 @@
                 <a:tableStyleId>{8EC20E35-A176-4012-BC5E-935CFFF8708E}</a:tableStyleId>
               </a:tblPr>
               <a:tblGrid>
-                <a:gridCol w="4527682"/>
+                <a:gridCol w="4527682">
+                  <a:extLst>
+                    <a:ext uri="{9D8B030D-6E8A-4147-A177-3AD203B41FA5}">
+                      <a16:colId xmlns:a16="http://schemas.microsoft.com/office/drawing/2014/main" val="20000"/>
+                    </a:ext>
+                  </a:extLst>
+                </a:gridCol>
               </a:tblGrid>
               <a:tr h="375762">
                 <a:tc>
@@ -14095,6 +15125,11 @@
                     </a:solidFill>
                   </a:tcPr>
                 </a:tc>
+                <a:extLst>
+                  <a:ext uri="{0D108BD9-81ED-4DB2-BD59-A6C34878D82A}">
+                    <a16:rowId xmlns:a16="http://schemas.microsoft.com/office/drawing/2014/main" val="10000"/>
+                  </a:ext>
+                </a:extLst>
               </a:tr>
               <a:tr h="305071">
                 <a:tc>
@@ -14168,6 +15203,11 @@
                     </a:lnT>
                   </a:tcPr>
                 </a:tc>
+                <a:extLst>
+                  <a:ext uri="{0D108BD9-81ED-4DB2-BD59-A6C34878D82A}">
+                    <a16:rowId xmlns:a16="http://schemas.microsoft.com/office/drawing/2014/main" val="10001"/>
+                  </a:ext>
+                </a:extLst>
               </a:tr>
               <a:tr h="305071">
                 <a:tc>
@@ -14230,6 +15270,11 @@
                     </a:lnR>
                   </a:tcPr>
                 </a:tc>
+                <a:extLst>
+                  <a:ext uri="{0D108BD9-81ED-4DB2-BD59-A6C34878D82A}">
+                    <a16:rowId xmlns:a16="http://schemas.microsoft.com/office/drawing/2014/main" val="10002"/>
+                  </a:ext>
+                </a:extLst>
               </a:tr>
               <a:tr h="305071">
                 <a:tc>
@@ -14292,6 +15337,11 @@
                     </a:lnR>
                   </a:tcPr>
                 </a:tc>
+                <a:extLst>
+                  <a:ext uri="{0D108BD9-81ED-4DB2-BD59-A6C34878D82A}">
+                    <a16:rowId xmlns:a16="http://schemas.microsoft.com/office/drawing/2014/main" val="10003"/>
+                  </a:ext>
+                </a:extLst>
               </a:tr>
               <a:tr h="297268">
                 <a:tc>
@@ -14331,6 +15381,11 @@
                     </a:lnR>
                   </a:tcPr>
                 </a:tc>
+                <a:extLst>
+                  <a:ext uri="{0D108BD9-81ED-4DB2-BD59-A6C34878D82A}">
+                    <a16:rowId xmlns:a16="http://schemas.microsoft.com/office/drawing/2014/main" val="10004"/>
+                  </a:ext>
+                </a:extLst>
               </a:tr>
               <a:tr h="297268">
                 <a:tc>
@@ -14370,6 +15425,11 @@
                     </a:lnR>
                   </a:tcPr>
                 </a:tc>
+                <a:extLst>
+                  <a:ext uri="{0D108BD9-81ED-4DB2-BD59-A6C34878D82A}">
+                    <a16:rowId xmlns:a16="http://schemas.microsoft.com/office/drawing/2014/main" val="10005"/>
+                  </a:ext>
+                </a:extLst>
               </a:tr>
               <a:tr h="297268">
                 <a:tc>
@@ -14409,6 +15469,11 @@
                     </a:lnR>
                   </a:tcPr>
                 </a:tc>
+                <a:extLst>
+                  <a:ext uri="{0D108BD9-81ED-4DB2-BD59-A6C34878D82A}">
+                    <a16:rowId xmlns:a16="http://schemas.microsoft.com/office/drawing/2014/main" val="10006"/>
+                  </a:ext>
+                </a:extLst>
               </a:tr>
               <a:tr h="297268">
                 <a:tc>
@@ -14459,6 +15524,11 @@
                     </a:lnB>
                   </a:tcPr>
                 </a:tc>
+                <a:extLst>
+                  <a:ext uri="{0D108BD9-81ED-4DB2-BD59-A6C34878D82A}">
+                    <a16:rowId xmlns:a16="http://schemas.microsoft.com/office/drawing/2014/main" val="10007"/>
+                  </a:ext>
+                </a:extLst>
               </a:tr>
             </a:tbl>
           </a:graphicData>
@@ -14500,291 +15570,6 @@
           </a:p>
         </p:txBody>
       </p:sp>
-      <p:grpSp>
-        <p:nvGrpSpPr>
-          <p:cNvPr id="165" name="RadioButtonUnselected"/>
-          <p:cNvGrpSpPr/>
-          <p:nvPr>
-            <p:custDataLst>
-              <p:custData r:id="rId4"/>
-            </p:custDataLst>
-          </p:nvPr>
-        </p:nvGrpSpPr>
-        <p:grpSpPr>
-          <a:xfrm>
-            <a:off x="4010526" y="3240913"/>
-            <a:ext cx="513730" cy="230832"/>
-            <a:chOff x="4356895" y="3334651"/>
-            <a:chExt cx="513730" cy="230832"/>
-          </a:xfrm>
-        </p:grpSpPr>
-        <p:sp>
-          <p:nvSpPr>
-            <p:cNvPr id="166" name="Content"/>
-            <p:cNvSpPr txBox="1"/>
-            <p:nvPr/>
-          </p:nvSpPr>
-          <p:spPr>
-            <a:xfrm>
-              <a:off x="4356895" y="3334651"/>
-              <a:ext cx="513730" cy="230832"/>
-            </a:xfrm>
-            <a:prstGeom prst="rect">
-              <a:avLst/>
-            </a:prstGeom>
-            <a:noFill/>
-          </p:spPr>
-          <p:txBody>
-            <a:bodyPr wrap="none" lIns="164592" tIns="18288" rIns="45720" bIns="27432" rtlCol="0" anchor="ctr" anchorCtr="0">
-              <a:spAutoFit/>
-            </a:bodyPr>
-            <a:lstStyle/>
-            <a:p>
-              <a:r>
-                <a:rPr lang="en-US" sz="1200" dirty="0" smtClean="0">
-                  <a:latin typeface="Segoe UI" pitchFamily="34" charset="0"/>
-                  <a:ea typeface="Segoe UI" pitchFamily="34" charset="0"/>
-                  <a:cs typeface="Segoe UI" pitchFamily="34" charset="0"/>
-                </a:rPr>
-                <a:t>SMS</a:t>
-              </a:r>
-              <a:endParaRPr lang="en-US" sz="1200" dirty="0">
-                <a:latin typeface="Segoe UI" pitchFamily="34" charset="0"/>
-                <a:ea typeface="Segoe UI" pitchFamily="34" charset="0"/>
-                <a:cs typeface="Segoe UI" pitchFamily="34" charset="0"/>
-              </a:endParaRPr>
-            </a:p>
-          </p:txBody>
-        </p:sp>
-        <p:sp>
-          <p:nvSpPr>
-            <p:cNvPr id="167" name="Circle"/>
-            <p:cNvSpPr>
-              <a:spLocks/>
-            </p:cNvSpPr>
-            <p:nvPr/>
-          </p:nvSpPr>
-          <p:spPr>
-            <a:xfrm>
-              <a:off x="4356895" y="3390106"/>
-              <a:ext cx="119960" cy="119922"/>
-            </a:xfrm>
-            <a:prstGeom prst="ellipse">
-              <a:avLst/>
-            </a:prstGeom>
-            <a:solidFill>
-              <a:srgbClr val="FFFFFF"/>
-            </a:solidFill>
-            <a:ln w="3175">
-              <a:solidFill>
-                <a:srgbClr val="FFFFFF">
-                  <a:lumMod val="50000"/>
-                </a:srgbClr>
-              </a:solidFill>
-            </a:ln>
-            <a:effectLst/>
-          </p:spPr>
-          <p:style>
-            <a:lnRef idx="2">
-              <a:srgbClr val="4F81BD">
-                <a:shade val="50000"/>
-              </a:srgbClr>
-            </a:lnRef>
-            <a:fillRef idx="1">
-              <a:srgbClr val="4F81BD"/>
-            </a:fillRef>
-            <a:effectRef idx="0">
-              <a:srgbClr val="4F81BD"/>
-            </a:effectRef>
-            <a:fontRef idx="minor">
-              <a:srgbClr val="000000"/>
-            </a:fontRef>
-          </p:style>
-          <p:txBody>
-            <a:bodyPr rtlCol="0" anchor="ctr"/>
-            <a:lstStyle/>
-            <a:p>
-              <a:pPr algn="ctr"/>
-              <a:endParaRPr lang="en-US" dirty="0"/>
-            </a:p>
-          </p:txBody>
-        </p:sp>
-      </p:grpSp>
-      <p:grpSp>
-        <p:nvGrpSpPr>
-          <p:cNvPr id="168" name="RadioButtonSelected"/>
-          <p:cNvGrpSpPr/>
-          <p:nvPr>
-            <p:custDataLst>
-              <p:custData r:id="rId5"/>
-            </p:custDataLst>
-          </p:nvPr>
-        </p:nvGrpSpPr>
-        <p:grpSpPr>
-          <a:xfrm>
-            <a:off x="4664551" y="3235566"/>
-            <a:ext cx="457626" cy="230832"/>
-            <a:chOff x="4356895" y="3334651"/>
-            <a:chExt cx="457626" cy="230832"/>
-          </a:xfrm>
-        </p:grpSpPr>
-        <p:sp>
-          <p:nvSpPr>
-            <p:cNvPr id="169" name="Content"/>
-            <p:cNvSpPr txBox="1"/>
-            <p:nvPr/>
-          </p:nvSpPr>
-          <p:spPr>
-            <a:xfrm>
-              <a:off x="4356895" y="3334651"/>
-              <a:ext cx="457626" cy="230832"/>
-            </a:xfrm>
-            <a:prstGeom prst="rect">
-              <a:avLst/>
-            </a:prstGeom>
-            <a:noFill/>
-          </p:spPr>
-          <p:txBody>
-            <a:bodyPr wrap="none" lIns="164592" tIns="18288" rIns="45720" bIns="27432" rtlCol="0" anchor="ctr" anchorCtr="0">
-              <a:spAutoFit/>
-            </a:bodyPr>
-            <a:lstStyle/>
-            <a:p>
-              <a:r>
-                <a:rPr lang="en-US" sz="1200" dirty="0" smtClean="0">
-                  <a:latin typeface="Segoe UI" pitchFamily="34" charset="0"/>
-                  <a:ea typeface="Segoe UI" pitchFamily="34" charset="0"/>
-                  <a:cs typeface="Segoe UI" pitchFamily="34" charset="0"/>
-                </a:rPr>
-                <a:t>SLR</a:t>
-              </a:r>
-              <a:endParaRPr lang="en-US" sz="1200" dirty="0">
-                <a:latin typeface="Segoe UI" pitchFamily="34" charset="0"/>
-                <a:ea typeface="Segoe UI" pitchFamily="34" charset="0"/>
-                <a:cs typeface="Segoe UI" pitchFamily="34" charset="0"/>
-              </a:endParaRPr>
-            </a:p>
-          </p:txBody>
-        </p:sp>
-        <p:grpSp>
-          <p:nvGrpSpPr>
-            <p:cNvPr id="170" name="Group 169"/>
-            <p:cNvGrpSpPr/>
-            <p:nvPr/>
-          </p:nvGrpSpPr>
-          <p:grpSpPr>
-            <a:xfrm>
-              <a:off x="4356895" y="3390106"/>
-              <a:ext cx="119960" cy="119922"/>
-              <a:chOff x="4356895" y="3390106"/>
-              <a:chExt cx="119960" cy="119922"/>
-            </a:xfrm>
-          </p:grpSpPr>
-          <p:sp>
-            <p:nvSpPr>
-              <p:cNvPr id="171" name="Circle"/>
-              <p:cNvSpPr>
-                <a:spLocks/>
-              </p:cNvSpPr>
-              <p:nvPr/>
-            </p:nvSpPr>
-            <p:spPr>
-              <a:xfrm>
-                <a:off x="4356895" y="3390106"/>
-                <a:ext cx="119960" cy="119922"/>
-              </a:xfrm>
-              <a:prstGeom prst="ellipse">
-                <a:avLst/>
-              </a:prstGeom>
-              <a:solidFill>
-                <a:srgbClr val="FFFFFF"/>
-              </a:solidFill>
-              <a:ln w="3175">
-                <a:solidFill>
-                  <a:srgbClr val="FFFFFF">
-                    <a:lumMod val="50000"/>
-                  </a:srgbClr>
-                </a:solidFill>
-              </a:ln>
-              <a:effectLst/>
-            </p:spPr>
-            <p:style>
-              <a:lnRef idx="2">
-                <a:srgbClr val="4F81BD">
-                  <a:shade val="50000"/>
-                </a:srgbClr>
-              </a:lnRef>
-              <a:fillRef idx="1">
-                <a:srgbClr val="4F81BD"/>
-              </a:fillRef>
-              <a:effectRef idx="0">
-                <a:srgbClr val="4F81BD"/>
-              </a:effectRef>
-              <a:fontRef idx="minor">
-                <a:srgbClr val="000000"/>
-              </a:fontRef>
-            </p:style>
-            <p:txBody>
-              <a:bodyPr rtlCol="0" anchor="ctr"/>
-              <a:lstStyle/>
-              <a:p>
-                <a:pPr algn="ctr"/>
-                <a:endParaRPr lang="en-US" dirty="0"/>
-              </a:p>
-            </p:txBody>
-          </p:sp>
-          <p:sp>
-            <p:nvSpPr>
-              <p:cNvPr id="172" name="InnerCircle"/>
-              <p:cNvSpPr>
-                <a:spLocks/>
-              </p:cNvSpPr>
-              <p:nvPr/>
-            </p:nvSpPr>
-            <p:spPr>
-              <a:xfrm>
-                <a:off x="4390432" y="3420972"/>
-                <a:ext cx="58189" cy="58190"/>
-              </a:xfrm>
-              <a:prstGeom prst="ellipse">
-                <a:avLst/>
-              </a:prstGeom>
-              <a:solidFill>
-                <a:srgbClr val="FFFFFF">
-                  <a:lumMod val="50000"/>
-                </a:srgbClr>
-              </a:solidFill>
-              <a:ln>
-                <a:noFill/>
-              </a:ln>
-            </p:spPr>
-            <p:style>
-              <a:lnRef idx="2">
-                <a:srgbClr val="4F81BD">
-                  <a:shade val="50000"/>
-                </a:srgbClr>
-              </a:lnRef>
-              <a:fillRef idx="1">
-                <a:srgbClr val="4F81BD"/>
-              </a:fillRef>
-              <a:effectRef idx="0">
-                <a:srgbClr val="4F81BD"/>
-              </a:effectRef>
-              <a:fontRef idx="minor">
-                <a:srgbClr val="000000"/>
-              </a:fontRef>
-            </p:style>
-            <p:txBody>
-              <a:bodyPr rtlCol="0" anchor="ctr"/>
-              <a:lstStyle/>
-              <a:p>
-                <a:pPr algn="ctr"/>
-                <a:endParaRPr lang="en-US" dirty="0"/>
-              </a:p>
-            </p:txBody>
-          </p:sp>
-        </p:grpSp>
-      </p:grpSp>
       <p:cxnSp>
         <p:nvCxnSpPr>
           <p:cNvPr id="15" name="Straight Connector 14"/>
@@ -14851,55 +15636,19 @@
           </a:p>
         </p:txBody>
       </p:sp>
-      <p:sp>
-        <p:nvSpPr>
-          <p:cNvPr id="174" name="Base"/>
-          <p:cNvSpPr txBox="1"/>
-          <p:nvPr/>
-        </p:nvSpPr>
-        <p:spPr>
-          <a:xfrm>
-            <a:off x="3913542" y="2943185"/>
-            <a:ext cx="596510" cy="323165"/>
-          </a:xfrm>
-          <a:prstGeom prst="rect">
-            <a:avLst/>
-          </a:prstGeom>
-          <a:noFill/>
-        </p:spPr>
-        <p:txBody>
-          <a:bodyPr wrap="none" rtlCol="0">
-            <a:spAutoFit/>
-          </a:bodyPr>
-          <a:lstStyle/>
-          <a:p>
-            <a:r>
-              <a:rPr lang="en-US" sz="1500" dirty="0" smtClean="0">
-                <a:latin typeface="Segoe UI Semibold" panose="020B0702040204020203" pitchFamily="34" charset="0"/>
-                <a:cs typeface="Segoe UI Semibold" panose="020B0702040204020203" pitchFamily="34" charset="0"/>
-              </a:rPr>
-              <a:t>Type</a:t>
-            </a:r>
-            <a:endParaRPr lang="en-US" sz="1500" dirty="0">
-              <a:latin typeface="Segoe UI Semibold" panose="020B0702040204020203" pitchFamily="34" charset="0"/>
-              <a:cs typeface="Segoe UI Semibold" panose="020B0702040204020203" pitchFamily="34" charset="0"/>
-            </a:endParaRPr>
-          </a:p>
-        </p:txBody>
-      </p:sp>
       <p:grpSp>
         <p:nvGrpSpPr>
           <p:cNvPr id="182" name="Group 181"/>
           <p:cNvGrpSpPr/>
           <p:nvPr>
             <p:custDataLst>
-              <p:custData r:id="rId6"/>
+              <p:custData r:id="rId4"/>
             </p:custDataLst>
           </p:nvPr>
         </p:nvGrpSpPr>
         <p:grpSpPr>
           <a:xfrm>
-            <a:off x="3913542" y="3676484"/>
+            <a:off x="3913542" y="2963596"/>
             <a:ext cx="2929134" cy="603920"/>
             <a:chOff x="4235274" y="8048126"/>
             <a:chExt cx="2929134" cy="603920"/>
@@ -14911,7 +15660,7 @@
             <p:cNvGrpSpPr/>
             <p:nvPr>
               <p:custDataLst>
-                <p:custData r:id="rId16"/>
+                <p:custData r:id="rId14"/>
               </p:custDataLst>
             </p:nvPr>
           </p:nvGrpSpPr>
@@ -14931,7 +15680,7 @@
               </p:cNvSpPr>
               <p:nvPr>
                 <p:custDataLst>
-                  <p:custData r:id="rId17"/>
+                  <p:custData r:id="rId15"/>
                 </p:custDataLst>
               </p:nvPr>
             </p:nvSpPr>
@@ -15066,13 +15815,13 @@
           <p:cNvGrpSpPr/>
           <p:nvPr>
             <p:custDataLst>
-              <p:custData r:id="rId7"/>
+              <p:custData r:id="rId5"/>
             </p:custDataLst>
           </p:nvPr>
         </p:nvGrpSpPr>
         <p:grpSpPr>
           <a:xfrm>
-            <a:off x="3925323" y="4344491"/>
+            <a:off x="3925323" y="3645582"/>
             <a:ext cx="2929134" cy="1104224"/>
             <a:chOff x="4235274" y="8048126"/>
             <a:chExt cx="2929134" cy="1104224"/>
@@ -15084,7 +15833,7 @@
             <p:cNvGrpSpPr/>
             <p:nvPr>
               <p:custDataLst>
-                <p:custData r:id="rId14"/>
+                <p:custData r:id="rId12"/>
               </p:custDataLst>
             </p:nvPr>
           </p:nvGrpSpPr>
@@ -15104,7 +15853,7 @@
               </p:cNvSpPr>
               <p:nvPr>
                 <p:custDataLst>
-                  <p:custData r:id="rId15"/>
+                  <p:custData r:id="rId13"/>
                 </p:custDataLst>
               </p:nvPr>
             </p:nvSpPr>
@@ -15239,13 +15988,13 @@
           <p:cNvGrpSpPr/>
           <p:nvPr>
             <p:custDataLst>
-              <p:custData r:id="rId8"/>
+              <p:custData r:id="rId6"/>
             </p:custDataLst>
           </p:nvPr>
         </p:nvGrpSpPr>
         <p:grpSpPr>
           <a:xfrm>
-            <a:off x="4010526" y="5778593"/>
+            <a:off x="4010526" y="5023771"/>
             <a:ext cx="1097652" cy="228600"/>
             <a:chOff x="4016824" y="3329200"/>
             <a:chExt cx="1097652" cy="228600"/>
@@ -15377,7 +16126,7 @@
         </p:nvSpPr>
         <p:spPr>
           <a:xfrm>
-            <a:off x="3941037" y="5540791"/>
+            <a:off x="3941037" y="4785969"/>
             <a:ext cx="990977" cy="261610"/>
           </a:xfrm>
           <a:prstGeom prst="rect">
@@ -15418,8 +16167,8 @@
           </p:cNvSpPr>
           <p:nvPr>
             <p:custDataLst>
-              <p:custData r:id="rId9"/>
-              <p:custData r:id="rId10"/>
+              <p:custData r:id="rId7"/>
+              <p:custData r:id="rId8"/>
             </p:custDataLst>
           </p:nvPr>
         </p:nvSpPr>
@@ -15574,12 +16323,12 @@
           </p:cNvPicPr>
           <p:nvPr>
             <p:custDataLst>
-              <p:custData r:id="rId11"/>
+              <p:custData r:id="rId9"/>
             </p:custDataLst>
           </p:nvPr>
         </p:nvPicPr>
         <p:blipFill rotWithShape="1">
-          <a:blip r:embed="rId28">
+          <a:blip r:embed="rId27">
             <a:extLst>
               <a:ext uri="{28A0092B-C50C-407E-A947-70E740481C1C}">
                 <a14:useLocalDpi xmlns:a14="http://schemas.microsoft.com/office/drawing/2010/main" val="0"/>
@@ -15607,12 +16356,12 @@
           </p:cNvPicPr>
           <p:nvPr>
             <p:custDataLst>
-              <p:custData r:id="rId12"/>
+              <p:custData r:id="rId10"/>
             </p:custDataLst>
           </p:nvPr>
         </p:nvPicPr>
         <p:blipFill rotWithShape="1">
-          <a:blip r:embed="rId29">
+          <a:blip r:embed="rId28">
             <a:extLst>
               <a:ext uri="{28A0092B-C50C-407E-A947-70E740481C1C}">
                 <a14:useLocalDpi xmlns:a14="http://schemas.microsoft.com/office/drawing/2010/main" val="0"/>
@@ -15638,7 +16387,7 @@
           <p:cNvGrpSpPr/>
           <p:nvPr>
             <p:custDataLst>
-              <p:custData r:id="rId13"/>
+              <p:custData r:id="rId11"/>
             </p:custDataLst>
           </p:nvPr>
         </p:nvGrpSpPr>
@@ -15744,7 +16493,7 @@
           <p:nvPr/>
         </p:nvPicPr>
         <p:blipFill>
-          <a:blip r:embed="rId30">
+          <a:blip r:embed="rId29">
             <a:extLst>
               <a:ext uri="{28A0092B-C50C-407E-A947-70E740481C1C}">
                 <a14:useLocalDpi xmlns:a14="http://schemas.microsoft.com/office/drawing/2010/main" val="0"/>
@@ -17229,7 +17978,7 @@
               </p:nvPr>
             </p:nvPicPr>
             <p:blipFill>
-              <a:blip r:embed="rId14" cstate="print">
+              <a:blip r:embed="rId15" cstate="print">
                 <a:extLst>
                   <a:ext uri="{28A0092B-C50C-407E-A947-70E740481C1C}">
                     <a14:useLocalDpi xmlns:a14="http://schemas.microsoft.com/office/drawing/2010/main" val="0"/>
@@ -17556,7 +18305,7 @@
           <p:nvPr/>
         </p:nvPicPr>
         <p:blipFill>
-          <a:blip r:embed="rId15">
+          <a:blip r:embed="rId16">
             <a:extLst>
               <a:ext uri="{28A0092B-C50C-407E-A947-70E740481C1C}">
                 <a14:useLocalDpi xmlns:a14="http://schemas.microsoft.com/office/drawing/2010/main" val="0"/>
@@ -17749,8 +18498,20 @@
                 <a:tableStyleId>{8EC20E35-A176-4012-BC5E-935CFFF8708E}</a:tableStyleId>
               </a:tblPr>
               <a:tblGrid>
-                <a:gridCol w="884238"/>
-                <a:gridCol w="2743199"/>
+                <a:gridCol w="884238">
+                  <a:extLst>
+                    <a:ext uri="{9D8B030D-6E8A-4147-A177-3AD203B41FA5}">
+                      <a16:colId xmlns:a16="http://schemas.microsoft.com/office/drawing/2014/main" val="20000"/>
+                    </a:ext>
+                  </a:extLst>
+                </a:gridCol>
+                <a:gridCol w="2743199">
+                  <a:extLst>
+                    <a:ext uri="{9D8B030D-6E8A-4147-A177-3AD203B41FA5}">
+                      <a16:colId xmlns:a16="http://schemas.microsoft.com/office/drawing/2014/main" val="20001"/>
+                    </a:ext>
+                  </a:extLst>
+                </a:gridCol>
               </a:tblGrid>
               <a:tr h="365380">
                 <a:tc>
@@ -17897,6 +18658,11 @@
                     </a:solidFill>
                   </a:tcPr>
                 </a:tc>
+                <a:extLst>
+                  <a:ext uri="{0D108BD9-81ED-4DB2-BD59-A6C34878D82A}">
+                    <a16:rowId xmlns:a16="http://schemas.microsoft.com/office/drawing/2014/main" val="10000"/>
+                  </a:ext>
+                </a:extLst>
               </a:tr>
               <a:tr h="82640">
                 <a:tc>
@@ -18015,6 +18781,11 @@
                     </a:lnT>
                   </a:tcPr>
                 </a:tc>
+                <a:extLst>
+                  <a:ext uri="{0D108BD9-81ED-4DB2-BD59-A6C34878D82A}">
+                    <a16:rowId xmlns:a16="http://schemas.microsoft.com/office/drawing/2014/main" val="10001"/>
+                  </a:ext>
+                </a:extLst>
               </a:tr>
               <a:tr h="88470">
                 <a:tc>
@@ -18111,6 +18882,11 @@
                     </a:lnR>
                   </a:tcPr>
                 </a:tc>
+                <a:extLst>
+                  <a:ext uri="{0D108BD9-81ED-4DB2-BD59-A6C34878D82A}">
+                    <a16:rowId xmlns:a16="http://schemas.microsoft.com/office/drawing/2014/main" val="10002"/>
+                  </a:ext>
+                </a:extLst>
               </a:tr>
               <a:tr h="94300">
                 <a:tc>
@@ -18203,6 +18979,11 @@
                     </a:lnR>
                   </a:tcPr>
                 </a:tc>
+                <a:extLst>
+                  <a:ext uri="{0D108BD9-81ED-4DB2-BD59-A6C34878D82A}">
+                    <a16:rowId xmlns:a16="http://schemas.microsoft.com/office/drawing/2014/main" val="10003"/>
+                  </a:ext>
+                </a:extLst>
               </a:tr>
               <a:tr h="94300">
                 <a:tc>
@@ -18295,6 +19076,11 @@
                     </a:lnR>
                   </a:tcPr>
                 </a:tc>
+                <a:extLst>
+                  <a:ext uri="{0D108BD9-81ED-4DB2-BD59-A6C34878D82A}">
+                    <a16:rowId xmlns:a16="http://schemas.microsoft.com/office/drawing/2014/main" val="10004"/>
+                  </a:ext>
+                </a:extLst>
               </a:tr>
               <a:tr h="94300">
                 <a:tc>
@@ -18371,6 +19157,11 @@
                     </a:lnR>
                   </a:tcPr>
                 </a:tc>
+                <a:extLst>
+                  <a:ext uri="{0D108BD9-81ED-4DB2-BD59-A6C34878D82A}">
+                    <a16:rowId xmlns:a16="http://schemas.microsoft.com/office/drawing/2014/main" val="10005"/>
+                  </a:ext>
+                </a:extLst>
               </a:tr>
               <a:tr h="94300">
                 <a:tc>
@@ -18447,6 +19238,11 @@
                     </a:lnR>
                   </a:tcPr>
                 </a:tc>
+                <a:extLst>
+                  <a:ext uri="{0D108BD9-81ED-4DB2-BD59-A6C34878D82A}">
+                    <a16:rowId xmlns:a16="http://schemas.microsoft.com/office/drawing/2014/main" val="10006"/>
+                  </a:ext>
+                </a:extLst>
               </a:tr>
               <a:tr h="94300">
                 <a:tc>
@@ -18545,6 +19341,11 @@
                     </a:lnB>
                   </a:tcPr>
                 </a:tc>
+                <a:extLst>
+                  <a:ext uri="{0D108BD9-81ED-4DB2-BD59-A6C34878D82A}">
+                    <a16:rowId xmlns:a16="http://schemas.microsoft.com/office/drawing/2014/main" val="10007"/>
+                  </a:ext>
+                </a:extLst>
               </a:tr>
             </a:tbl>
           </a:graphicData>
@@ -18614,9 +19415,27 @@
                 <a:tableStyleId>{8EC20E35-A176-4012-BC5E-935CFFF8708E}</a:tableStyleId>
               </a:tblPr>
               <a:tblGrid>
-                <a:gridCol w="1264876"/>
-                <a:gridCol w="1248882"/>
-                <a:gridCol w="1266162"/>
+                <a:gridCol w="1264876">
+                  <a:extLst>
+                    <a:ext uri="{9D8B030D-6E8A-4147-A177-3AD203B41FA5}">
+                      <a16:colId xmlns:a16="http://schemas.microsoft.com/office/drawing/2014/main" val="20000"/>
+                    </a:ext>
+                  </a:extLst>
+                </a:gridCol>
+                <a:gridCol w="1248882">
+                  <a:extLst>
+                    <a:ext uri="{9D8B030D-6E8A-4147-A177-3AD203B41FA5}">
+                      <a16:colId xmlns:a16="http://schemas.microsoft.com/office/drawing/2014/main" val="20001"/>
+                    </a:ext>
+                  </a:extLst>
+                </a:gridCol>
+                <a:gridCol w="1266162">
+                  <a:extLst>
+                    <a:ext uri="{9D8B030D-6E8A-4147-A177-3AD203B41FA5}">
+                      <a16:colId xmlns:a16="http://schemas.microsoft.com/office/drawing/2014/main" val="20002"/>
+                    </a:ext>
+                  </a:extLst>
+                </a:gridCol>
               </a:tblGrid>
               <a:tr h="378080">
                 <a:tc>
@@ -18835,6 +19654,11 @@
                     </a:solidFill>
                   </a:tcPr>
                 </a:tc>
+                <a:extLst>
+                  <a:ext uri="{0D108BD9-81ED-4DB2-BD59-A6C34878D82A}">
+                    <a16:rowId xmlns:a16="http://schemas.microsoft.com/office/drawing/2014/main" val="10000"/>
+                  </a:ext>
+                </a:extLst>
               </a:tr>
               <a:tr h="82640">
                 <a:tc>
@@ -18989,6 +19813,11 @@
                     </a:lnT>
                   </a:tcPr>
                 </a:tc>
+                <a:extLst>
+                  <a:ext uri="{0D108BD9-81ED-4DB2-BD59-A6C34878D82A}">
+                    <a16:rowId xmlns:a16="http://schemas.microsoft.com/office/drawing/2014/main" val="10001"/>
+                  </a:ext>
+                </a:extLst>
               </a:tr>
               <a:tr h="88470">
                 <a:tc>
@@ -19118,6 +19947,11 @@
                     </a:lnR>
                   </a:tcPr>
                 </a:tc>
+                <a:extLst>
+                  <a:ext uri="{0D108BD9-81ED-4DB2-BD59-A6C34878D82A}">
+                    <a16:rowId xmlns:a16="http://schemas.microsoft.com/office/drawing/2014/main" val="10002"/>
+                  </a:ext>
+                </a:extLst>
               </a:tr>
               <a:tr h="94300">
                 <a:tc>
@@ -19239,6 +20073,11 @@
                     </a:lnR>
                   </a:tcPr>
                 </a:tc>
+                <a:extLst>
+                  <a:ext uri="{0D108BD9-81ED-4DB2-BD59-A6C34878D82A}">
+                    <a16:rowId xmlns:a16="http://schemas.microsoft.com/office/drawing/2014/main" val="10003"/>
+                  </a:ext>
+                </a:extLst>
               </a:tr>
               <a:tr h="94300">
                 <a:tc>
@@ -19368,6 +20207,11 @@
                     </a:lnR>
                   </a:tcPr>
                 </a:tc>
+                <a:extLst>
+                  <a:ext uri="{0D108BD9-81ED-4DB2-BD59-A6C34878D82A}">
+                    <a16:rowId xmlns:a16="http://schemas.microsoft.com/office/drawing/2014/main" val="10004"/>
+                  </a:ext>
+                </a:extLst>
               </a:tr>
               <a:tr h="94300">
                 <a:tc>
@@ -19497,6 +20341,11 @@
                     </a:lnR>
                   </a:tcPr>
                 </a:tc>
+                <a:extLst>
+                  <a:ext uri="{0D108BD9-81ED-4DB2-BD59-A6C34878D82A}">
+                    <a16:rowId xmlns:a16="http://schemas.microsoft.com/office/drawing/2014/main" val="10005"/>
+                  </a:ext>
+                </a:extLst>
               </a:tr>
               <a:tr h="94300">
                 <a:tc>
@@ -19610,6 +20459,11 @@
                     </a:lnR>
                   </a:tcPr>
                 </a:tc>
+                <a:extLst>
+                  <a:ext uri="{0D108BD9-81ED-4DB2-BD59-A6C34878D82A}">
+                    <a16:rowId xmlns:a16="http://schemas.microsoft.com/office/drawing/2014/main" val="10006"/>
+                  </a:ext>
+                </a:extLst>
               </a:tr>
               <a:tr h="94300">
                 <a:tc>
@@ -19756,6 +20610,11 @@
                     </a:lnB>
                   </a:tcPr>
                 </a:tc>
+                <a:extLst>
+                  <a:ext uri="{0D108BD9-81ED-4DB2-BD59-A6C34878D82A}">
+                    <a16:rowId xmlns:a16="http://schemas.microsoft.com/office/drawing/2014/main" val="10007"/>
+                  </a:ext>
+                </a:extLst>
               </a:tr>
             </a:tbl>
           </a:graphicData>
@@ -20118,7 +20977,7 @@
             <p:nvPr/>
           </p:nvPicPr>
           <p:blipFill>
-            <a:blip r:embed="rId16"/>
+            <a:blip r:embed="rId17"/>
             <a:stretch>
               <a:fillRect/>
             </a:stretch>
@@ -20142,7 +21001,7 @@
             <p:nvPr/>
           </p:nvPicPr>
           <p:blipFill>
-            <a:blip r:embed="rId16"/>
+            <a:blip r:embed="rId17"/>
             <a:stretch>
               <a:fillRect/>
             </a:stretch>
@@ -20166,7 +21025,7 @@
             <p:nvPr/>
           </p:nvPicPr>
           <p:blipFill>
-            <a:blip r:embed="rId16"/>
+            <a:blip r:embed="rId17"/>
             <a:stretch>
               <a:fillRect/>
             </a:stretch>
@@ -20190,7 +21049,7 @@
             <p:nvPr/>
           </p:nvPicPr>
           <p:blipFill>
-            <a:blip r:embed="rId16"/>
+            <a:blip r:embed="rId17"/>
             <a:stretch>
               <a:fillRect/>
             </a:stretch>
@@ -20214,7 +21073,7 @@
             <p:nvPr/>
           </p:nvPicPr>
           <p:blipFill>
-            <a:blip r:embed="rId16"/>
+            <a:blip r:embed="rId17"/>
             <a:stretch>
               <a:fillRect/>
             </a:stretch>
@@ -20239,7 +21098,7 @@
           <p:nvPr/>
         </p:nvPicPr>
         <p:blipFill>
-          <a:blip r:embed="rId17"/>
+          <a:blip r:embed="rId18"/>
           <a:stretch>
             <a:fillRect/>
           </a:stretch>
@@ -21718,7 +22577,7 @@
               </p:nvPr>
             </p:nvPicPr>
             <p:blipFill>
-              <a:blip r:embed="rId12" cstate="print">
+              <a:blip r:embed="rId13" cstate="print">
                 <a:extLst>
                   <a:ext uri="{28A0092B-C50C-407E-A947-70E740481C1C}">
                     <a14:useLocalDpi xmlns:a14="http://schemas.microsoft.com/office/drawing/2010/main" val="0"/>
@@ -22045,7 +22904,7 @@
           <p:nvPr/>
         </p:nvPicPr>
         <p:blipFill>
-          <a:blip r:embed="rId13">
+          <a:blip r:embed="rId14">
             <a:extLst>
               <a:ext uri="{28A0092B-C50C-407E-A947-70E740481C1C}">
                 <a14:useLocalDpi xmlns:a14="http://schemas.microsoft.com/office/drawing/2010/main" val="0"/>
@@ -23674,7 +24533,7 @@
               </p:nvPr>
             </p:nvPicPr>
             <p:blipFill>
-              <a:blip r:embed="rId12" cstate="print">
+              <a:blip r:embed="rId13" cstate="print">
                 <a:extLst>
                   <a:ext uri="{28A0092B-C50C-407E-A947-70E740481C1C}">
                     <a14:useLocalDpi xmlns:a14="http://schemas.microsoft.com/office/drawing/2010/main" val="0"/>
@@ -24001,7 +24860,7 @@
           <p:nvPr/>
         </p:nvPicPr>
         <p:blipFill>
-          <a:blip r:embed="rId13">
+          <a:blip r:embed="rId14">
             <a:extLst>
               <a:ext uri="{28A0092B-C50C-407E-A947-70E740481C1C}">
                 <a14:useLocalDpi xmlns:a14="http://schemas.microsoft.com/office/drawing/2010/main" val="0"/>
@@ -24447,45 +25306,300 @@
 </a:theme>
 </file>
 
+<file path=ppt/theme/theme2.xml><?xml version="1.0" encoding="utf-8"?>
+<a:theme xmlns:a="http://schemas.openxmlformats.org/drawingml/2006/main" name="Office Theme">
+  <a:themeElements>
+    <a:clrScheme name="Office">
+      <a:dk1>
+        <a:sysClr val="windowText" lastClr="000000"/>
+      </a:dk1>
+      <a:lt1>
+        <a:sysClr val="window" lastClr="FFFFFF"/>
+      </a:lt1>
+      <a:dk2>
+        <a:srgbClr val="44546A"/>
+      </a:dk2>
+      <a:lt2>
+        <a:srgbClr val="E7E6E6"/>
+      </a:lt2>
+      <a:accent1>
+        <a:srgbClr val="5B9BD5"/>
+      </a:accent1>
+      <a:accent2>
+        <a:srgbClr val="ED7D31"/>
+      </a:accent2>
+      <a:accent3>
+        <a:srgbClr val="A5A5A5"/>
+      </a:accent3>
+      <a:accent4>
+        <a:srgbClr val="FFC000"/>
+      </a:accent4>
+      <a:accent5>
+        <a:srgbClr val="4472C4"/>
+      </a:accent5>
+      <a:accent6>
+        <a:srgbClr val="70AD47"/>
+      </a:accent6>
+      <a:hlink>
+        <a:srgbClr val="0563C1"/>
+      </a:hlink>
+      <a:folHlink>
+        <a:srgbClr val="954F72"/>
+      </a:folHlink>
+    </a:clrScheme>
+    <a:fontScheme name="Office">
+      <a:majorFont>
+        <a:latin typeface="Calibri Light" panose="020F0302020204030204"/>
+        <a:ea typeface=""/>
+        <a:cs typeface=""/>
+        <a:font script="Jpan" typeface="游ゴシック Light"/>
+        <a:font script="Hang" typeface="맑은 고딕"/>
+        <a:font script="Hans" typeface="等线 Light"/>
+        <a:font script="Hant" typeface="新細明體"/>
+        <a:font script="Arab" typeface="Times New Roman"/>
+        <a:font script="Hebr" typeface="Times New Roman"/>
+        <a:font script="Thai" typeface="Angsana New"/>
+        <a:font script="Ethi" typeface="Nyala"/>
+        <a:font script="Beng" typeface="Vrinda"/>
+        <a:font script="Gujr" typeface="Shruti"/>
+        <a:font script="Khmr" typeface="MoolBoran"/>
+        <a:font script="Knda" typeface="Tunga"/>
+        <a:font script="Guru" typeface="Raavi"/>
+        <a:font script="Cans" typeface="Euphemia"/>
+        <a:font script="Cher" typeface="Plantagenet Cherokee"/>
+        <a:font script="Yiii" typeface="Microsoft Yi Baiti"/>
+        <a:font script="Tibt" typeface="Microsoft Himalaya"/>
+        <a:font script="Thaa" typeface="MV Boli"/>
+        <a:font script="Deva" typeface="Mangal"/>
+        <a:font script="Telu" typeface="Gautami"/>
+        <a:font script="Taml" typeface="Latha"/>
+        <a:font script="Syrc" typeface="Estrangelo Edessa"/>
+        <a:font script="Orya" typeface="Kalinga"/>
+        <a:font script="Mlym" typeface="Kartika"/>
+        <a:font script="Laoo" typeface="DokChampa"/>
+        <a:font script="Sinh" typeface="Iskoola Pota"/>
+        <a:font script="Mong" typeface="Mongolian Baiti"/>
+        <a:font script="Viet" typeface="Times New Roman"/>
+        <a:font script="Uigh" typeface="Microsoft Uighur"/>
+        <a:font script="Geor" typeface="Sylfaen"/>
+      </a:majorFont>
+      <a:minorFont>
+        <a:latin typeface="Calibri" panose="020F0502020204030204"/>
+        <a:ea typeface=""/>
+        <a:cs typeface=""/>
+        <a:font script="Jpan" typeface="游ゴシック"/>
+        <a:font script="Hang" typeface="맑은 고딕"/>
+        <a:font script="Hans" typeface="等线"/>
+        <a:font script="Hant" typeface="新細明體"/>
+        <a:font script="Arab" typeface="Arial"/>
+        <a:font script="Hebr" typeface="Arial"/>
+        <a:font script="Thai" typeface="Cordia New"/>
+        <a:font script="Ethi" typeface="Nyala"/>
+        <a:font script="Beng" typeface="Vrinda"/>
+        <a:font script="Gujr" typeface="Shruti"/>
+        <a:font script="Khmr" typeface="DaunPenh"/>
+        <a:font script="Knda" typeface="Tunga"/>
+        <a:font script="Guru" typeface="Raavi"/>
+        <a:font script="Cans" typeface="Euphemia"/>
+        <a:font script="Cher" typeface="Plantagenet Cherokee"/>
+        <a:font script="Yiii" typeface="Microsoft Yi Baiti"/>
+        <a:font script="Tibt" typeface="Microsoft Himalaya"/>
+        <a:font script="Thaa" typeface="MV Boli"/>
+        <a:font script="Deva" typeface="Mangal"/>
+        <a:font script="Telu" typeface="Gautami"/>
+        <a:font script="Taml" typeface="Latha"/>
+        <a:font script="Syrc" typeface="Estrangelo Edessa"/>
+        <a:font script="Orya" typeface="Kalinga"/>
+        <a:font script="Mlym" typeface="Kartika"/>
+        <a:font script="Laoo" typeface="DokChampa"/>
+        <a:font script="Sinh" typeface="Iskoola Pota"/>
+        <a:font script="Mong" typeface="Mongolian Baiti"/>
+        <a:font script="Viet" typeface="Arial"/>
+        <a:font script="Uigh" typeface="Microsoft Uighur"/>
+        <a:font script="Geor" typeface="Sylfaen"/>
+      </a:minorFont>
+    </a:fontScheme>
+    <a:fmtScheme name="Office">
+      <a:fillStyleLst>
+        <a:solidFill>
+          <a:schemeClr val="phClr"/>
+        </a:solidFill>
+        <a:gradFill rotWithShape="1">
+          <a:gsLst>
+            <a:gs pos="0">
+              <a:schemeClr val="phClr">
+                <a:lumMod val="110000"/>
+                <a:satMod val="105000"/>
+                <a:tint val="67000"/>
+              </a:schemeClr>
+            </a:gs>
+            <a:gs pos="50000">
+              <a:schemeClr val="phClr">
+                <a:lumMod val="105000"/>
+                <a:satMod val="103000"/>
+                <a:tint val="73000"/>
+              </a:schemeClr>
+            </a:gs>
+            <a:gs pos="100000">
+              <a:schemeClr val="phClr">
+                <a:lumMod val="105000"/>
+                <a:satMod val="109000"/>
+                <a:tint val="81000"/>
+              </a:schemeClr>
+            </a:gs>
+          </a:gsLst>
+          <a:lin ang="5400000" scaled="0"/>
+        </a:gradFill>
+        <a:gradFill rotWithShape="1">
+          <a:gsLst>
+            <a:gs pos="0">
+              <a:schemeClr val="phClr">
+                <a:satMod val="103000"/>
+                <a:lumMod val="102000"/>
+                <a:tint val="94000"/>
+              </a:schemeClr>
+            </a:gs>
+            <a:gs pos="50000">
+              <a:schemeClr val="phClr">
+                <a:satMod val="110000"/>
+                <a:lumMod val="100000"/>
+                <a:shade val="100000"/>
+              </a:schemeClr>
+            </a:gs>
+            <a:gs pos="100000">
+              <a:schemeClr val="phClr">
+                <a:lumMod val="99000"/>
+                <a:satMod val="120000"/>
+                <a:shade val="78000"/>
+              </a:schemeClr>
+            </a:gs>
+          </a:gsLst>
+          <a:lin ang="5400000" scaled="0"/>
+        </a:gradFill>
+      </a:fillStyleLst>
+      <a:lnStyleLst>
+        <a:ln w="6350" cap="flat" cmpd="sng" algn="ctr">
+          <a:solidFill>
+            <a:schemeClr val="phClr"/>
+          </a:solidFill>
+          <a:prstDash val="solid"/>
+          <a:miter lim="800000"/>
+        </a:ln>
+        <a:ln w="12700" cap="flat" cmpd="sng" algn="ctr">
+          <a:solidFill>
+            <a:schemeClr val="phClr"/>
+          </a:solidFill>
+          <a:prstDash val="solid"/>
+          <a:miter lim="800000"/>
+        </a:ln>
+        <a:ln w="19050" cap="flat" cmpd="sng" algn="ctr">
+          <a:solidFill>
+            <a:schemeClr val="phClr"/>
+          </a:solidFill>
+          <a:prstDash val="solid"/>
+          <a:miter lim="800000"/>
+        </a:ln>
+      </a:lnStyleLst>
+      <a:effectStyleLst>
+        <a:effectStyle>
+          <a:effectLst/>
+        </a:effectStyle>
+        <a:effectStyle>
+          <a:effectLst/>
+        </a:effectStyle>
+        <a:effectStyle>
+          <a:effectLst>
+            <a:outerShdw blurRad="57150" dist="19050" dir="5400000" algn="ctr" rotWithShape="0">
+              <a:srgbClr val="000000">
+                <a:alpha val="63000"/>
+              </a:srgbClr>
+            </a:outerShdw>
+          </a:effectLst>
+        </a:effectStyle>
+      </a:effectStyleLst>
+      <a:bgFillStyleLst>
+        <a:solidFill>
+          <a:schemeClr val="phClr"/>
+        </a:solidFill>
+        <a:solidFill>
+          <a:schemeClr val="phClr">
+            <a:tint val="95000"/>
+            <a:satMod val="170000"/>
+          </a:schemeClr>
+        </a:solidFill>
+        <a:gradFill rotWithShape="1">
+          <a:gsLst>
+            <a:gs pos="0">
+              <a:schemeClr val="phClr">
+                <a:tint val="93000"/>
+                <a:satMod val="150000"/>
+                <a:shade val="98000"/>
+                <a:lumMod val="102000"/>
+              </a:schemeClr>
+            </a:gs>
+            <a:gs pos="50000">
+              <a:schemeClr val="phClr">
+                <a:tint val="98000"/>
+                <a:satMod val="130000"/>
+                <a:shade val="90000"/>
+                <a:lumMod val="103000"/>
+              </a:schemeClr>
+            </a:gs>
+            <a:gs pos="100000">
+              <a:schemeClr val="phClr">
+                <a:shade val="63000"/>
+                <a:satMod val="120000"/>
+              </a:schemeClr>
+            </a:gs>
+          </a:gsLst>
+          <a:lin ang="5400000" scaled="0"/>
+        </a:gradFill>
+      </a:bgFillStyleLst>
+    </a:fmtScheme>
+  </a:themeElements>
+  <a:objectDefaults/>
+  <a:extraClrSchemeLst/>
+  <a:extLst>
+    <a:ext uri="{05A4C25C-085E-4340-85A3-A5531E510DB2}">
+      <thm15:themeFamily xmlns:thm15="http://schemas.microsoft.com/office/thememl/2012/main" name="Office Theme" id="{62F939B6-93AF-4DB8-9C6B-D6C7DFDC589F}" vid="{4A3C46E8-61CC-4603-A589-7422A47A8E4A}"/>
+    </a:ext>
+  </a:extLst>
+</a:theme>
+</file>
+
 <file path=customXml/item1.xml><?xml version="1.0" encoding="utf-8"?>
+<p:properties xmlns:p="http://schemas.microsoft.com/office/2006/metadata/properties" xmlns:xsi="http://www.w3.org/2001/XMLSchema-instance" xmlns:pc="http://schemas.microsoft.com/office/infopath/2007/PartnerControls">
+  <documentManagement/>
+</p:properties>
+</file>
+
+<file path=customXml/item10.xml><?xml version="1.0" encoding="utf-8"?>
+<Control xmlns="http://schemas.microsoft.com/VisualStudio/2011/storyboarding/control">
+  <Id Name="System.Storyboarding.WindowsAppIcons.Plus" Revision="1" Stencil="System.Storyboarding.WindowsAppIcons" StencilVersion="0.1"/>
+</Control>
+</file>
+
+<file path=customXml/item11.xml><?xml version="1.0" encoding="utf-8"?>
+<Control xmlns="http://schemas.microsoft.com/VisualStudio/2011/storyboarding/control">
+  <Id Name="System.Storyboarding.Icons.Home" Revision="1" Stencil="System.Storyboarding.Icons" StencilVersion="0.1"/>
+</Control>
+</file>
+
+<file path=customXml/item12.xml><?xml version="1.0" encoding="utf-8"?>
+<Control xmlns="http://schemas.microsoft.com/VisualStudio/2011/storyboarding/control">
+  <Id Name="System.Storyboarding.WindowsAppIcons.Save" Revision="1" Stencil="System.Storyboarding.WindowsAppIcons" StencilVersion="0.1"/>
+</Control>
+</file>
+
+<file path=customXml/item13.xml><?xml version="1.0" encoding="utf-8"?>
 <Control xmlns="http://schemas.microsoft.com/VisualStudio/2011/storyboarding/control">
   <Id Name="f7a94b64-51d6-472a-8bb4-f2cc047935d1" RevisionId="4b37df06-a36b-4383-9074-55517f1335fc" Stencil="172d6d98-e5c9-42e9-a209-79f7a94bbd38" StencilRevisionId="00000000-0000-0000-0000-000000000000" StencilVersion="0.0"/>
 </Control>
 </file>
 
-<file path=customXml/item10.xml><?xml version="1.0" encoding="utf-8"?>
-<Control xmlns="http://schemas.microsoft.com/VisualStudio/2011/storyboarding/control">
-  <Id Name="ff2e9d33-8c17-48eb-8a16-3fba8f05309e" Revision="1" Stencil="d2af3a11-d2b6-4c8f-a815-4caa8f0f209f" StencilVersion="1.0"/>
-</Control>
-</file>
-
-<file path=customXml/item100.xml><?xml version="1.0" encoding="utf-8"?>
-<Control xmlns="http://schemas.microsoft.com/VisualStudio/2011/storyboarding/control">
-  <Id Name="a6f5cebd-68c1-4f83-b0b2-82e64af5daa8" Revision="1" Stencil="d2af3a11-d2b6-4c8f-a815-4caa8f0f209f" StencilVersion="1.0"/>
-</Control>
-</file>
-
-<file path=customXml/item11.xml><?xml version="1.0" encoding="utf-8"?>
-<Control xmlns="http://schemas.microsoft.com/VisualStudio/2011/storyboarding/control">
-  <Id Name="957c0455-b8d7-42c4-b540-2452ca01d79f" Revision="2" Stencil="System.MyShapes" StencilVersion="1.0"/>
-</Control>
-</file>
-
-<file path=customXml/item12.xml><?xml version="1.0" encoding="utf-8"?>
-<Control xmlns="http://schemas.microsoft.com/VisualStudio/2011/storyboarding/control">
-  <Id Name="8cc5062a-2bde-4898-80b0-24eb70a28493" Revision="1" Stencil="System.MyShapes" StencilVersion="1.0"/>
-</Control>
-</file>
-
-<file path=customXml/item13.xml><?xml version="1.0" encoding="utf-8"?>
+<file path=customXml/item14.xml><?xml version="1.0" encoding="utf-8"?>
 <Control xmlns="http://schemas.microsoft.com/VisualStudio/2011/storyboarding/control">
   <Id Name="System.Storyboarding.Backgrounds.Window" Revision="1" Stencil="System.Storyboarding.Backgrounds" StencilVersion="0.1"/>
-</Control>
-</file>
-
-<file path=customXml/item14.xml><?xml version="1.0" encoding="utf-8"?>
-<Control xmlns="http://schemas.microsoft.com/VisualStudio/2011/storyboarding/control">
-  <Id Name="def0aba0-baad-4063-9e57-08bc10ceefe9" Revision="3" Stencil="d2af3a11-d2b6-4c8f-a815-4caa8f0f209f" StencilVersion="1.0"/>
 </Control>
 </file>
 
@@ -24497,350 +25611,29 @@
 
 <file path=customXml/item16.xml><?xml version="1.0" encoding="utf-8"?>
 <Control xmlns="http://schemas.microsoft.com/VisualStudio/2011/storyboarding/control">
-  <Id Name="System.Storyboarding.Icons.Home" Revision="1" Stencil="System.Storyboarding.Icons" StencilVersion="0.1"/>
+  <Id Name="4713f25e-8454-4767-b415-fedfeb3bf21e" Revision="1" Stencil="System.MyShapes" StencilVersion="1.0"/>
 </Control>
 </file>
 
 <file path=customXml/item17.xml><?xml version="1.0" encoding="utf-8"?>
 <Control xmlns="http://schemas.microsoft.com/VisualStudio/2011/storyboarding/control">
-  <Id Name="32035d07-bc66-4a79-8001-2507012193e3" RevisionId="7f6cc906-8fab-4878-8f41-90bcdc4e860e" Stencil="172d6d98-e5c9-42e9-a209-79f7a94bbd38" StencilRevisionId="00000000-0000-0000-0000-000000000000" StencilVersion="0.0"/>
+  <Id Name="8cc5062a-2bde-4898-80b0-24eb70a28493" Revision="1" Stencil="System.MyShapes" StencilVersion="1.0"/>
 </Control>
 </file>
 
 <file path=customXml/item18.xml><?xml version="1.0" encoding="utf-8"?>
 <Control xmlns="http://schemas.microsoft.com/VisualStudio/2011/storyboarding/control">
-  <Id Name="6f4ba032-df64-4a9a-9180-fb33924eaf53" Revision="1" Stencil="System.MyShapes" StencilVersion="1.0"/>
+  <Id Name="def0aba0-baad-4063-9e57-08bc10ceefe9" Revision="3" Stencil="d2af3a11-d2b6-4c8f-a815-4caa8f0f209f" StencilVersion="1.0"/>
 </Control>
 </file>
 
 <file path=customXml/item19.xml><?xml version="1.0" encoding="utf-8"?>
 <Control xmlns="http://schemas.microsoft.com/VisualStudio/2011/storyboarding/control">
-  <Id Name="System.Storyboarding.Backgrounds.Window" Revision="1" Stencil="System.Storyboarding.Backgrounds" StencilVersion="0.1"/>
+  <Id Name="System.Storyboarding.WindowsAppIcons.Plus" Revision="1" Stencil="System.Storyboarding.WindowsAppIcons" StencilVersion="0.1"/>
 </Control>
 </file>
 
 <file path=customXml/item2.xml><?xml version="1.0" encoding="utf-8"?>
-<Control xmlns="http://schemas.microsoft.com/VisualStudio/2011/storyboarding/control">
-  <Id Name="System.Storyboarding.Common.DropdownBox" Revision="1" Stencil="System.Storyboarding.Common" StencilVersion="0.1"/>
-</Control>
-</file>
-
-<file path=customXml/item20.xml><?xml version="1.0" encoding="utf-8"?>
-<Control xmlns="http://schemas.microsoft.com/VisualStudio/2011/storyboarding/control">
-  <Id Name="8cc5062a-2bde-4898-80b0-24eb70a28493" Revision="1" Stencil="System.MyShapes" StencilVersion="1.0"/>
-</Control>
-</file>
-
-<file path=customXml/item21.xml><?xml version="1.0" encoding="utf-8"?>
-<Control xmlns="http://schemas.microsoft.com/VisualStudio/2011/storyboarding/control">
-  <Id Name="32035d07-bc66-4a79-8001-2507012193e3" RevisionId="7f6cc906-8fab-4878-8f41-90bcdc4e860e" Stencil="172d6d98-e5c9-42e9-a209-79f7a94bbd38" StencilRevisionId="00000000-0000-0000-0000-000000000000" StencilVersion="0.0"/>
-</Control>
-</file>
-
-<file path=customXml/item22.xml><?xml version="1.0" encoding="utf-8"?>
-<Control xmlns="http://schemas.microsoft.com/VisualStudio/2011/storyboarding/control">
-  <Id Name="System.Storyboarding.Backgrounds.Window" Revision="1" Stencil="System.Storyboarding.Backgrounds" StencilVersion="0.1"/>
-</Control>
-</file>
-
-<file path=customXml/item23.xml><?xml version="1.0" encoding="utf-8"?>
-<Control xmlns="http://schemas.microsoft.com/VisualStudio/2011/storyboarding/control">
-  <Id Name="ef659927-1c37-4e42-a914-d9f8d808d3dc" Revision="1" Stencil="System.MyShapes" StencilVersion="1.0"/>
-</Control>
-</file>
-
-<file path=customXml/item24.xml><?xml version="1.0" encoding="utf-8"?>
-<Control xmlns="http://schemas.microsoft.com/VisualStudio/2011/storyboarding/control">
-  <Id Name="System.Storyboarding.Icons.Home" Revision="1" Stencil="System.Storyboarding.Icons" StencilVersion="0.1"/>
-</Control>
-</file>
-
-<file path=customXml/item25.xml><?xml version="1.0" encoding="utf-8"?>
-<Control xmlns="http://schemas.microsoft.com/VisualStudio/2011/storyboarding/control">
-  <Id Name="System.Storyboarding.WindowsAppIcons.Save" Revision="1" Stencil="System.Storyboarding.WindowsAppIcons" StencilVersion="0.1"/>
-</Control>
-</file>
-
-<file path=customXml/item26.xml><?xml version="1.0" encoding="utf-8"?>
-<Control xmlns="http://schemas.microsoft.com/VisualStudio/2011/storyboarding/control">
-  <Id Name="System.Storyboarding.WindowsAppIcons.Save" Revision="1" Stencil="System.Storyboarding.WindowsAppIcons" StencilVersion="0.1"/>
-</Control>
-</file>
-
-<file path=customXml/item27.xml><?xml version="1.0" encoding="utf-8"?>
-<Control xmlns="http://schemas.microsoft.com/VisualStudio/2011/storyboarding/control">
-  <Id Name="8cc5062a-2bde-4898-80b0-24eb70a28493" Revision="1" Stencil="System.MyShapes" StencilVersion="1.0"/>
-</Control>
-</file>
-
-<file path=customXml/item28.xml><?xml version="1.0" encoding="utf-8"?>
-<Control xmlns="http://schemas.microsoft.com/VisualStudio/2011/storyboarding/control">
-  <Id Name="4f185384-0037-4dff-9f11-22fdc1322437" Revision="1" Stencil="d2af3a11-d2b6-4c8f-a815-4caa8f0f209f" StencilVersion="1.0"/>
-</Control>
-</file>
-
-<file path=customXml/item29.xml><?xml version="1.0" encoding="utf-8"?>
-<Control xmlns="http://schemas.microsoft.com/VisualStudio/2011/storyboarding/control">
-  <Id Name="a09f5cbd-b64d-4c98-9714-c612df05bf73" Revision="5" Stencil="d2af3a11-d2b6-4c8f-a815-4caa8f0f209f" StencilVersion="1.0"/>
-</Control>
-</file>
-
-<file path=customXml/item3.xml><?xml version="1.0" encoding="utf-8"?>
-<Control xmlns="http://schemas.microsoft.com/VisualStudio/2011/storyboarding/control">
-  <Id Name="a6f5cebd-68c1-4f83-b0b2-82e64af5daa8" Revision="1" Stencil="d2af3a11-d2b6-4c8f-a815-4caa8f0f209f" StencilVersion="1.0"/>
-</Control>
-</file>
-
-<file path=customXml/item30.xml><?xml version="1.0" encoding="utf-8"?>
-<Control xmlns="http://schemas.microsoft.com/VisualStudio/2011/storyboarding/control">
-  <Id Name="System.Storyboarding.Common.DataGrid" Revision="1" Stencil="System.Storyboarding.Common" StencilVersion="0.1"/>
-</Control>
-</file>
-
-<file path=customXml/item31.xml><?xml version="1.0" encoding="utf-8"?>
-<Control xmlns="http://schemas.microsoft.com/VisualStudio/2011/storyboarding/control">
-  <Id Name="ef659927-1c37-4e42-a914-d9f8d808d3dc" Revision="1" Stencil="System.MyShapes" StencilVersion="1.0"/>
-</Control>
-</file>
-
-<file path=customXml/item32.xml><?xml version="1.0" encoding="utf-8"?>
-<Control xmlns="http://schemas.microsoft.com/VisualStudio/2011/storyboarding/control">
-  <Id Name="System.Storyboarding.Icons.Home" Revision="1" Stencil="System.Storyboarding.Icons" StencilVersion="0.1"/>
-</Control>
-</file>
-
-<file path=customXml/item33.xml><?xml version="1.0" encoding="utf-8"?>
-<Control xmlns="http://schemas.microsoft.com/VisualStudio/2011/storyboarding/control">
-  <Id Name="4713f25e-8454-4767-b415-fedfeb3bf21e" Revision="1" Stencil="System.MyShapes" StencilVersion="1.0"/>
-</Control>
-</file>
-
-<file path=customXml/item34.xml><?xml version="1.0" encoding="utf-8"?>
-<Control xmlns="http://schemas.microsoft.com/VisualStudio/2011/storyboarding/control">
-  <Id Name="def0aba0-baad-4063-9e57-08bc10ceefe9" Revision="3" Stencil="d2af3a11-d2b6-4c8f-a815-4caa8f0f209f" StencilVersion="1.0"/>
-</Control>
-</file>
-
-<file path=customXml/item35.xml><?xml version="1.0" encoding="utf-8"?>
-<?mso-contentType ?>
-<FormTemplates xmlns="http://schemas.microsoft.com/sharepoint/v3/contenttype/forms">
-  <Display>DocumentLibraryForm</Display>
-  <Edit>DocumentLibraryForm</Edit>
-  <New>DocumentLibraryForm</New>
-</FormTemplates>
-</file>
-
-<file path=customXml/item36.xml><?xml version="1.0" encoding="utf-8"?>
-<Control xmlns="http://schemas.microsoft.com/VisualStudio/2011/storyboarding/control">
-  <Id Name="32035d07-bc66-4a79-8001-2507012193e3" RevisionId="7f6cc906-8fab-4878-8f41-90bcdc4e860e" Stencil="172d6d98-e5c9-42e9-a209-79f7a94bbd38" StencilRevisionId="00000000-0000-0000-0000-000000000000" StencilVersion="0.0"/>
-</Control>
-</file>
-
-<file path=customXml/item37.xml><?xml version="1.0" encoding="utf-8"?>
-<Control xmlns="http://schemas.microsoft.com/VisualStudio/2011/storyboarding/control">
-  <Id Name="ef659927-1c37-4e42-a914-d9f8d808d3dc" Revision="1" Stencil="System.MyShapes" StencilVersion="1.0"/>
-</Control>
-</file>
-
-<file path=customXml/item38.xml><?xml version="1.0" encoding="utf-8"?>
-<Control xmlns="http://schemas.microsoft.com/VisualStudio/2011/storyboarding/control">
-  <Id Name="System.Storyboarding.WindowsAppIcons.Plus" Revision="1" Stencil="System.Storyboarding.WindowsAppIcons" StencilVersion="0.1"/>
-</Control>
-</file>
-
-<file path=customXml/item39.xml><?xml version="1.0" encoding="utf-8"?>
-<Control xmlns="http://schemas.microsoft.com/VisualStudio/2011/storyboarding/control">
-  <Id Name="System.Storyboarding.Backgrounds.Window" Revision="1" Stencil="System.Storyboarding.Backgrounds" StencilVersion="0.1"/>
-</Control>
-</file>
-
-<file path=customXml/item4.xml><?xml version="1.0" encoding="utf-8"?>
-<Control xmlns="http://schemas.microsoft.com/VisualStudio/2011/storyboarding/control">
-  <Id Name="8cc5062a-2bde-4898-80b0-24eb70a28493" Revision="1" Stencil="System.MyShapes" StencilVersion="1.0"/>
-</Control>
-</file>
-
-<file path=customXml/item40.xml><?xml version="1.0" encoding="utf-8"?>
-<Control xmlns="http://schemas.microsoft.com/VisualStudio/2011/storyboarding/control">
-  <Id Name="System.Storyboarding.WindowsAppIcons.Plus" Revision="1" Stencil="System.Storyboarding.WindowsAppIcons" StencilVersion="0.1"/>
-</Control>
-</file>
-
-<file path=customXml/item41.xml><?xml version="1.0" encoding="utf-8"?>
-<Control xmlns="http://schemas.microsoft.com/VisualStudio/2011/storyboarding/control">
-  <Id Name="System.Storyboarding.Icons.Home" Revision="1" Stencil="System.Storyboarding.Icons" StencilVersion="0.1"/>
-</Control>
-</file>
-
-<file path=customXml/item42.xml><?xml version="1.0" encoding="utf-8"?>
-<Control xmlns="http://schemas.microsoft.com/VisualStudio/2011/storyboarding/control">
-  <Id Name="e07a033b-12ab-4913-adeb-a09872464d2d" Revision="2" Stencil="System.MyShapes" StencilVersion="1.0"/>
-</Control>
-</file>
-
-<file path=customXml/item43.xml><?xml version="1.0" encoding="utf-8"?>
-<Control xmlns="http://schemas.microsoft.com/VisualStudio/2011/storyboarding/control">
-  <Id Name="4713f25e-8454-4767-b415-fedfeb3bf21e" Revision="1" Stencil="System.MyShapes" StencilVersion="1.0"/>
-</Control>
-</file>
-
-<file path=customXml/item44.xml><?xml version="1.0" encoding="utf-8"?>
-<Control xmlns="http://schemas.microsoft.com/VisualStudio/2011/storyboarding/control">
-  <Id Name="System.Storyboarding.WindowsAppIcons.Save" Revision="1" Stencil="System.Storyboarding.WindowsAppIcons" StencilVersion="0.1"/>
-</Control>
-</file>
-
-<file path=customXml/item45.xml><?xml version="1.0" encoding="utf-8"?>
-<Control xmlns="http://schemas.microsoft.com/VisualStudio/2011/storyboarding/control">
-  <Id Name="ef659927-1c37-4e42-a914-d9f8d808d3dc" Revision="1" Stencil="System.MyShapes" StencilVersion="1.0"/>
-</Control>
-</file>
-
-<file path=customXml/item46.xml><?xml version="1.0" encoding="utf-8"?>
-<Control xmlns="http://schemas.microsoft.com/VisualStudio/2011/storyboarding/control">
-  <Id Name="32035d07-bc66-4a79-8001-2507012193e3" RevisionId="7f6cc906-8fab-4878-8f41-90bcdc4e860e" Stencil="172d6d98-e5c9-42e9-a209-79f7a94bbd38" StencilRevisionId="00000000-0000-0000-0000-000000000000" StencilVersion="0.0"/>
-</Control>
-</file>
-
-<file path=customXml/item47.xml><?xml version="1.0" encoding="utf-8"?>
-<Control xmlns="http://schemas.microsoft.com/VisualStudio/2011/storyboarding/control">
-  <Id Name="e07a033b-12ab-4913-adeb-a09872464d2d" Revision="2" Stencil="System.MyShapes" StencilVersion="1.0"/>
-</Control>
-</file>
-
-<file path=customXml/item48.xml><?xml version="1.0" encoding="utf-8"?>
-<Control xmlns="http://schemas.microsoft.com/VisualStudio/2011/storyboarding/control">
-  <Id Name="System.Storyboarding.WindowsAppIcons.Plus" Revision="1" Stencil="System.Storyboarding.WindowsAppIcons" StencilVersion="0.1"/>
-</Control>
-</file>
-
-<file path=customXml/item49.xml><?xml version="1.0" encoding="utf-8"?>
-<Control xmlns="http://schemas.microsoft.com/VisualStudio/2011/storyboarding/control">
-  <Id Name="System.Storyboarding.WindowsAppIcons.Save" Revision="1" Stencil="System.Storyboarding.WindowsAppIcons" StencilVersion="0.1"/>
-</Control>
-</file>
-
-<file path=customXml/item5.xml><?xml version="1.0" encoding="utf-8"?>
-<Control xmlns="http://schemas.microsoft.com/VisualStudio/2011/storyboarding/control">
-  <Id Name="System.Storyboarding.Backgrounds.Window" Revision="1" Stencil="System.Storyboarding.Backgrounds" StencilVersion="0.1"/>
-</Control>
-</file>
-
-<file path=customXml/item50.xml><?xml version="1.0" encoding="utf-8"?>
-<Control xmlns="http://schemas.microsoft.com/VisualStudio/2011/storyboarding/control">
-  <Id Name="System.Storyboarding.WindowsAppIcons.Plus" Revision="1" Stencil="System.Storyboarding.WindowsAppIcons" StencilVersion="0.1"/>
-</Control>
-</file>
-
-<file path=customXml/item51.xml><?xml version="1.0" encoding="utf-8"?>
-<Control xmlns="http://schemas.microsoft.com/VisualStudio/2011/storyboarding/control">
-  <Id Name="4713f25e-8454-4767-b415-fedfeb3bf21e" Revision="1" Stencil="System.MyShapes" StencilVersion="1.0"/>
-</Control>
-</file>
-
-<file path=customXml/item52.xml><?xml version="1.0" encoding="utf-8"?>
-<Control xmlns="http://schemas.microsoft.com/VisualStudio/2011/storyboarding/control">
-  <Id Name="def0aba0-baad-4063-9e57-08bc10ceefe9" Revision="3" Stencil="d2af3a11-d2b6-4c8f-a815-4caa8f0f209f" StencilVersion="1.0"/>
-</Control>
-</file>
-
-<file path=customXml/item53.xml><?xml version="1.0" encoding="utf-8"?>
-<Control xmlns="http://schemas.microsoft.com/VisualStudio/2011/storyboarding/control">
-  <Id Name="8cc5062a-2bde-4898-80b0-24eb70a28493" Revision="1" Stencil="System.MyShapes" StencilVersion="1.0"/>
-</Control>
-</file>
-
-<file path=customXml/item54.xml><?xml version="1.0" encoding="utf-8"?>
-<Control xmlns="http://schemas.microsoft.com/VisualStudio/2011/storyboarding/control">
-  <Id Name="System.Storyboarding.Common.DataGrid" Revision="1" Stencil="System.Storyboarding.Common" StencilVersion="0.1"/>
-</Control>
-</file>
-
-<file path=customXml/item55.xml><?xml version="1.0" encoding="utf-8"?>
-<Control xmlns="http://schemas.microsoft.com/VisualStudio/2011/storyboarding/control">
-  <Id Name="System.Storyboarding.Backgrounds.Window" Revision="1" Stencil="System.Storyboarding.Backgrounds" StencilVersion="0.1"/>
-</Control>
-</file>
-
-<file path=customXml/item56.xml><?xml version="1.0" encoding="utf-8"?>
-<Control xmlns="http://schemas.microsoft.com/VisualStudio/2011/storyboarding/control">
-  <Id Name="System.Storyboarding.Icons.Home" Revision="1" Stencil="System.Storyboarding.Icons" StencilVersion="0.1"/>
-</Control>
-</file>
-
-<file path=customXml/item57.xml><?xml version="1.0" encoding="utf-8"?>
-<Control xmlns="http://schemas.microsoft.com/VisualStudio/2011/storyboarding/control">
-  <Id Name="ef659927-1c37-4e42-a914-d9f8d808d3dc" Revision="1" Stencil="System.MyShapes" StencilVersion="1.0"/>
-</Control>
-</file>
-
-<file path=customXml/item58.xml><?xml version="1.0" encoding="utf-8"?>
-<Control xmlns="http://schemas.microsoft.com/VisualStudio/2011/storyboarding/control">
-  <Id Name="f7a94b64-51d6-472a-8bb4-f2cc047935d1" RevisionId="4b37df06-a36b-4383-9074-55517f1335fc" Stencil="172d6d98-e5c9-42e9-a209-79f7a94bbd38" StencilRevisionId="00000000-0000-0000-0000-000000000000" StencilVersion="0.0"/>
-</Control>
-</file>
-
-<file path=customXml/item59.xml><?xml version="1.0" encoding="utf-8"?>
-<Control xmlns="http://schemas.microsoft.com/VisualStudio/2011/storyboarding/control">
-  <Id Name="6ef3194f-f2d7-4a43-9382-2f03cb15141f" Revision="1" Stencil="d2af3a11-d2b6-4c8f-a815-4caa8f0f209f" StencilVersion="1.0"/>
-</Control>
-</file>
-
-<file path=customXml/item6.xml><?xml version="1.0" encoding="utf-8"?>
-<Control xmlns="http://schemas.microsoft.com/VisualStudio/2011/storyboarding/control">
-  <Id Name="4713f25e-8454-4767-b415-fedfeb3bf21e" Revision="1" Stencil="System.MyShapes" StencilVersion="1.0"/>
-</Control>
-</file>
-
-<file path=customXml/item60.xml><?xml version="1.0" encoding="utf-8"?>
-<Control xmlns="http://schemas.microsoft.com/VisualStudio/2011/storyboarding/control">
-  <Id Name="System.Storyboarding.Icons.Home" Revision="1" Stencil="System.Storyboarding.Icons" StencilVersion="0.1"/>
-</Control>
-</file>
-
-<file path=customXml/item61.xml><?xml version="1.0" encoding="utf-8"?>
-<Control xmlns="http://schemas.microsoft.com/VisualStudio/2011/storyboarding/control">
-  <Id Name="def0aba0-baad-4063-9e57-08bc10ceefe9" Revision="3" Stencil="d2af3a11-d2b6-4c8f-a815-4caa8f0f209f" StencilVersion="1.0"/>
-</Control>
-</file>
-
-<file path=customXml/item62.xml><?xml version="1.0" encoding="utf-8"?>
-<Control xmlns="http://schemas.microsoft.com/VisualStudio/2011/storyboarding/control">
-  <Id Name="System.Storyboarding.Common.RadioButtonUnselected" Revision="1" Stencil="System.Storyboarding.Common" StencilVersion="0.1"/>
-</Control>
-</file>
-
-<file path=customXml/item63.xml><?xml version="1.0" encoding="utf-8"?>
-<Control xmlns="http://schemas.microsoft.com/VisualStudio/2011/storyboarding/control">
-  <Id Name="def0aba0-baad-4063-9e57-08bc10ceefe9" Revision="3" Stencil="d2af3a11-d2b6-4c8f-a815-4caa8f0f209f" StencilVersion="1.0"/>
-</Control>
-</file>
-
-<file path=customXml/item64.xml><?xml version="1.0" encoding="utf-8"?>
-<Control xmlns="http://schemas.microsoft.com/VisualStudio/2011/storyboarding/control">
-  <Id Name="32035d07-bc66-4a79-8001-2507012193e3" RevisionId="7f6cc906-8fab-4878-8f41-90bcdc4e860e" Stencil="172d6d98-e5c9-42e9-a209-79f7a94bbd38" StencilRevisionId="00000000-0000-0000-0000-000000000000" StencilVersion="0.0"/>
-</Control>
-</file>
-
-<file path=customXml/item65.xml><?xml version="1.0" encoding="utf-8"?>
-<Control xmlns="http://schemas.microsoft.com/VisualStudio/2011/storyboarding/control">
-  <Id Name="System.Storyboarding.WindowsAppIcons.Plus" Revision="1" Stencil="System.Storyboarding.WindowsAppIcons" StencilVersion="0.1"/>
-</Control>
-</file>
-
-<file path=customXml/item66.xml><?xml version="1.0" encoding="utf-8"?>
-<Control xmlns="http://schemas.microsoft.com/VisualStudio/2011/storyboarding/control">
-  <Id Name="4713f25e-8454-4767-b415-fedfeb3bf21e" Revision="1" Stencil="System.MyShapes" StencilVersion="1.0"/>
-</Control>
-</file>
-
-<file path=customXml/item67.xml><?xml version="1.0" encoding="utf-8"?>
-<Control xmlns="http://schemas.microsoft.com/VisualStudio/2011/storyboarding/control">
-  <Id Name="f7a94b64-51d6-472a-8bb4-f2cc047935d1" RevisionId="4b37df06-a36b-4383-9074-55517f1335fc" Stencil="172d6d98-e5c9-42e9-a209-79f7a94bbd38" StencilRevisionId="00000000-0000-0000-0000-000000000000" StencilVersion="0.0"/>
-</Control>
-</file>
-
-<file path=customXml/item68.xml><?xml version="1.0" encoding="utf-8"?>
 <ct:contentTypeSchema xmlns:ct="http://schemas.microsoft.com/office/2006/metadata/contentType" xmlns:ma="http://schemas.microsoft.com/office/2006/metadata/properties/metaAttributes" ct:_="" ma:_="" ma:contentTypeName="Document" ma:contentTypeID="0x01010032653D8449C1E24D83001F99E28E0D0B" ma:contentTypeVersion="3" ma:contentTypeDescription="Create a new document." ma:contentTypeScope="" ma:versionID="9c07c3e638c1199296f77fdaccf6001b">
   <xsd:schema xmlns:xsd="http://www.w3.org/2001/XMLSchema" xmlns:xs="http://www.w3.org/2001/XMLSchema" xmlns:p="http://schemas.microsoft.com/office/2006/metadata/properties" xmlns:ns2="57b46829-05be-45b5-b819-0a162c331775" xmlns:ns3="11a788af-2a95-4add-a4b4-a60d70c1a184" xmlns:ns4="ed4f1a8c-625d-41bf-9ea8-bf9abed4eeb2" targetNamespace="http://schemas.microsoft.com/office/2006/metadata/properties" ma:root="true" ma:fieldsID="503d36e7df1a8a7138b94264e1fef846" ns2:_="" ns3:_="" ns4:_="">
     <xsd:import namespace="57b46829-05be-45b5-b819-0a162c331775"/>
@@ -25004,111 +25797,432 @@
 </ct:contentTypeSchema>
 </file>
 
-<file path=customXml/item69.xml><?xml version="1.0" encoding="utf-8"?>
+<file path=customXml/item20.xml><?xml version="1.0" encoding="utf-8"?>
+<Control xmlns="http://schemas.microsoft.com/VisualStudio/2011/storyboarding/control">
+  <Id Name="32035d07-bc66-4a79-8001-2507012193e3" RevisionId="7f6cc906-8fab-4878-8f41-90bcdc4e860e" Stencil="172d6d98-e5c9-42e9-a209-79f7a94bbd38" StencilRevisionId="00000000-0000-0000-0000-000000000000" StencilVersion="0.0"/>
+</Control>
+</file>
+
+<file path=customXml/item21.xml><?xml version="1.0" encoding="utf-8"?>
+<Control xmlns="http://schemas.microsoft.com/VisualStudio/2011/storyboarding/control">
+  <Id Name="System.Storyboarding.Icons.Home" Revision="1" Stencil="System.Storyboarding.Icons" StencilVersion="0.1"/>
+</Control>
+</file>
+
+<file path=customXml/item22.xml><?xml version="1.0" encoding="utf-8"?>
+<Control xmlns="http://schemas.microsoft.com/VisualStudio/2011/storyboarding/control">
+  <Id Name="System.Storyboarding.WindowsAppIcons.Save" Revision="1" Stencil="System.Storyboarding.WindowsAppIcons" StencilVersion="0.1"/>
+</Control>
+</file>
+
+<file path=customXml/item23.xml><?xml version="1.0" encoding="utf-8"?>
+<Control xmlns="http://schemas.microsoft.com/VisualStudio/2011/storyboarding/control">
+  <Id Name="f7a94b64-51d6-472a-8bb4-f2cc047935d1" RevisionId="4b37df06-a36b-4383-9074-55517f1335fc" Stencil="172d6d98-e5c9-42e9-a209-79f7a94bbd38" StencilRevisionId="00000000-0000-0000-0000-000000000000" StencilVersion="0.0"/>
+</Control>
+</file>
+
+<file path=customXml/item24.xml><?xml version="1.0" encoding="utf-8"?>
+<Control xmlns="http://schemas.microsoft.com/VisualStudio/2011/storyboarding/control">
+  <Id Name="6f4ba032-df64-4a9a-9180-fb33924eaf53" Revision="1" Stencil="System.MyShapes" StencilVersion="1.0"/>
+</Control>
+</file>
+
+<file path=customXml/item25.xml><?xml version="1.0" encoding="utf-8"?>
+<Control xmlns="http://schemas.microsoft.com/VisualStudio/2011/storyboarding/control">
+  <Id Name="a6f5cebd-68c1-4f83-b0b2-82e64af5daa8" Revision="1" Stencil="d2af3a11-d2b6-4c8f-a815-4caa8f0f209f" StencilVersion="1.0"/>
+</Control>
+</file>
+
+<file path=customXml/item26.xml><?xml version="1.0" encoding="utf-8"?>
+<Control xmlns="http://schemas.microsoft.com/VisualStudio/2011/storyboarding/control">
+  <Id Name="System.Storyboarding.Common.Text" Revision="1" Stencil="System.Storyboarding.Common" StencilVersion="0.1"/>
+</Control>
+</file>
+
+<file path=customXml/item27.xml><?xml version="1.0" encoding="utf-8"?>
+<Control xmlns="http://schemas.microsoft.com/VisualStudio/2011/storyboarding/control">
+  <Id Name="a6f5cebd-68c1-4f83-b0b2-82e64af5daa8" Revision="1" Stencil="d2af3a11-d2b6-4c8f-a815-4caa8f0f209f" StencilVersion="1.0"/>
+</Control>
+</file>
+
+<file path=customXml/item28.xml><?xml version="1.0" encoding="utf-8"?>
+<Control xmlns="http://schemas.microsoft.com/VisualStudio/2011/storyboarding/control">
+  <Id Name="System.Storyboarding.Backgrounds.Window" Revision="1" Stencil="System.Storyboarding.Backgrounds" StencilVersion="0.1"/>
+</Control>
+</file>
+
+<file path=customXml/item29.xml><?xml version="1.0" encoding="utf-8"?>
 <Control xmlns="http://schemas.microsoft.com/VisualStudio/2011/storyboarding/control">
   <Id Name="ef659927-1c37-4e42-a914-d9f8d808d3dc" Revision="1" Stencil="System.MyShapes" StencilVersion="1.0"/>
 </Control>
 </file>
 
-<file path=customXml/item7.xml><?xml version="1.0" encoding="utf-8"?>
+<file path=customXml/item3.xml><?xml version="1.0" encoding="utf-8"?>
+<?mso-contentType ?>
+<FormTemplates xmlns="http://schemas.microsoft.com/sharepoint/v3/contenttype/forms">
+  <Display>DocumentLibraryForm</Display>
+  <Edit>DocumentLibraryForm</Edit>
+  <New>DocumentLibraryForm</New>
+</FormTemplates>
+</file>
+
+<file path=customXml/item30.xml><?xml version="1.0" encoding="utf-8"?>
+<Control xmlns="http://schemas.microsoft.com/VisualStudio/2011/storyboarding/control">
+  <Id Name="4713f25e-8454-4767-b415-fedfeb3bf21e" Revision="1" Stencil="System.MyShapes" StencilVersion="1.0"/>
+</Control>
+</file>
+
+<file path=customXml/item31.xml><?xml version="1.0" encoding="utf-8"?>
+<Control xmlns="http://schemas.microsoft.com/VisualStudio/2011/storyboarding/control">
+  <Id Name="8cc5062a-2bde-4898-80b0-24eb70a28493" Revision="1" Stencil="System.MyShapes" StencilVersion="1.0"/>
+</Control>
+</file>
+
+<file path=customXml/item32.xml><?xml version="1.0" encoding="utf-8"?>
+<Control xmlns="http://schemas.microsoft.com/VisualStudio/2011/storyboarding/control">
+  <Id Name="def0aba0-baad-4063-9e57-08bc10ceefe9" Revision="3" Stencil="d2af3a11-d2b6-4c8f-a815-4caa8f0f209f" StencilVersion="1.0"/>
+</Control>
+</file>
+
+<file path=customXml/item33.xml><?xml version="1.0" encoding="utf-8"?>
+<Control xmlns="http://schemas.microsoft.com/VisualStudio/2011/storyboarding/control">
+  <Id Name="System.Storyboarding.WindowsAppIcons.Plus" Revision="1" Stencil="System.Storyboarding.WindowsAppIcons" StencilVersion="0.1"/>
+</Control>
+</file>
+
+<file path=customXml/item34.xml><?xml version="1.0" encoding="utf-8"?>
+<Control xmlns="http://schemas.microsoft.com/VisualStudio/2011/storyboarding/control">
+  <Id Name="32035d07-bc66-4a79-8001-2507012193e3" RevisionId="7f6cc906-8fab-4878-8f41-90bcdc4e860e" Stencil="172d6d98-e5c9-42e9-a209-79f7a94bbd38" StencilRevisionId="00000000-0000-0000-0000-000000000000" StencilVersion="0.0"/>
+</Control>
+</file>
+
+<file path=customXml/item35.xml><?xml version="1.0" encoding="utf-8"?>
+<Control xmlns="http://schemas.microsoft.com/VisualStudio/2011/storyboarding/control">
+  <Id Name="System.Storyboarding.Icons.Home" Revision="1" Stencil="System.Storyboarding.Icons" StencilVersion="0.1"/>
+</Control>
+</file>
+
+<file path=customXml/item36.xml><?xml version="1.0" encoding="utf-8"?>
+<Control xmlns="http://schemas.microsoft.com/VisualStudio/2011/storyboarding/control">
+  <Id Name="System.Storyboarding.WindowsAppIcons.Save" Revision="1" Stencil="System.Storyboarding.WindowsAppIcons" StencilVersion="0.1"/>
+</Control>
+</file>
+
+<file path=customXml/item37.xml><?xml version="1.0" encoding="utf-8"?>
 <Control xmlns="http://schemas.microsoft.com/VisualStudio/2011/storyboarding/control">
   <Id Name="f7a94b64-51d6-472a-8bb4-f2cc047935d1" RevisionId="4b37df06-a36b-4383-9074-55517f1335fc" Stencil="172d6d98-e5c9-42e9-a209-79f7a94bbd38" StencilRevisionId="00000000-0000-0000-0000-000000000000" StencilVersion="0.0"/>
 </Control>
 </file>
 
-<file path=customXml/item70.xml><?xml version="1.0" encoding="utf-8"?>
+<file path=customXml/item38.xml><?xml version="1.0" encoding="utf-8"?>
+<Control xmlns="http://schemas.microsoft.com/VisualStudio/2011/storyboarding/control">
+  <Id Name="4f185384-0037-4dff-9f11-22fdc1322437" Revision="1" Stencil="d2af3a11-d2b6-4c8f-a815-4caa8f0f209f" StencilVersion="1.0"/>
+</Control>
+</file>
+
+<file path=customXml/item39.xml><?xml version="1.0" encoding="utf-8"?>
+<Control xmlns="http://schemas.microsoft.com/VisualStudio/2011/storyboarding/control">
+  <Id Name="6ef3194f-f2d7-4a43-9382-2f03cb15141f" Revision="1" Stencil="d2af3a11-d2b6-4c8f-a815-4caa8f0f209f" StencilVersion="1.0"/>
+</Control>
+</file>
+
+<file path=customXml/item4.xml><?xml version="1.0" encoding="utf-8"?>
+<Control xmlns="http://schemas.microsoft.com/VisualStudio/2011/storyboarding/control">
+  <Id Name="System.Storyboarding.Backgrounds.Window" Revision="1" Stencil="System.Storyboarding.Backgrounds" StencilVersion="0.1"/>
+</Control>
+</file>
+
+<file path=customXml/item40.xml><?xml version="1.0" encoding="utf-8"?>
+<Control xmlns="http://schemas.microsoft.com/VisualStudio/2011/storyboarding/control">
+  <Id Name="a14cf0bd-1afa-46b8-8b7a-4383daf40b21" Revision="2" Stencil="d2af3a11-d2b6-4c8f-a815-4caa8f0f209f" StencilVersion="1.0"/>
+</Control>
+</file>
+
+<file path=customXml/item41.xml><?xml version="1.0" encoding="utf-8"?>
 <Control xmlns="http://schemas.microsoft.com/VisualStudio/2011/storyboarding/control">
   <Id Name="a6f5cebd-68c1-4f83-b0b2-82e64af5daa8" Revision="1" Stencil="d2af3a11-d2b6-4c8f-a815-4caa8f0f209f" StencilVersion="1.0"/>
 </Control>
 </file>
 
+<file path=customXml/item42.xml><?xml version="1.0" encoding="utf-8"?>
+<Control xmlns="http://schemas.microsoft.com/VisualStudio/2011/storyboarding/control">
+  <Id Name="a6f5cebd-68c1-4f83-b0b2-82e64af5daa8" Revision="1" Stencil="d2af3a11-d2b6-4c8f-a815-4caa8f0f209f" StencilVersion="1.0"/>
+</Control>
+</file>
+
+<file path=customXml/item43.xml><?xml version="1.0" encoding="utf-8"?>
+<Control xmlns="http://schemas.microsoft.com/VisualStudio/2011/storyboarding/control">
+  <Id Name="ff2e9d33-8c17-48eb-8a16-3fba8f05309e" Revision="1" Stencil="d2af3a11-d2b6-4c8f-a815-4caa8f0f209f" StencilVersion="1.0"/>
+</Control>
+</file>
+
+<file path=customXml/item44.xml><?xml version="1.0" encoding="utf-8"?>
+<Control xmlns="http://schemas.microsoft.com/VisualStudio/2011/storyboarding/control">
+  <Id Name="System.Storyboarding.Backgrounds.Window" Revision="1" Stencil="System.Storyboarding.Backgrounds" StencilVersion="0.1"/>
+</Control>
+</file>
+
+<file path=customXml/item45.xml><?xml version="1.0" encoding="utf-8"?>
+<Control xmlns="http://schemas.microsoft.com/VisualStudio/2011/storyboarding/control">
+  <Id Name="ef659927-1c37-4e42-a914-d9f8d808d3dc" Revision="1" Stencil="System.MyShapes" StencilVersion="1.0"/>
+</Control>
+</file>
+
+<file path=customXml/item46.xml><?xml version="1.0" encoding="utf-8"?>
+<Control xmlns="http://schemas.microsoft.com/VisualStudio/2011/storyboarding/control">
+  <Id Name="4713f25e-8454-4767-b415-fedfeb3bf21e" Revision="1" Stencil="System.MyShapes" StencilVersion="1.0"/>
+</Control>
+</file>
+
+<file path=customXml/item47.xml><?xml version="1.0" encoding="utf-8"?>
+<Control xmlns="http://schemas.microsoft.com/VisualStudio/2011/storyboarding/control">
+  <Id Name="8cc5062a-2bde-4898-80b0-24eb70a28493" Revision="1" Stencil="System.MyShapes" StencilVersion="1.0"/>
+</Control>
+</file>
+
+<file path=customXml/item48.xml><?xml version="1.0" encoding="utf-8"?>
+<Control xmlns="http://schemas.microsoft.com/VisualStudio/2011/storyboarding/control">
+  <Id Name="def0aba0-baad-4063-9e57-08bc10ceefe9" Revision="3" Stencil="d2af3a11-d2b6-4c8f-a815-4caa8f0f209f" StencilVersion="1.0"/>
+</Control>
+</file>
+
+<file path=customXml/item49.xml><?xml version="1.0" encoding="utf-8"?>
+<Control xmlns="http://schemas.microsoft.com/VisualStudio/2011/storyboarding/control">
+  <Id Name="32035d07-bc66-4a79-8001-2507012193e3" RevisionId="7f6cc906-8fab-4878-8f41-90bcdc4e860e" Stencil="172d6d98-e5c9-42e9-a209-79f7a94bbd38" StencilRevisionId="00000000-0000-0000-0000-000000000000" StencilVersion="0.0"/>
+</Control>
+</file>
+
+<file path=customXml/item5.xml><?xml version="1.0" encoding="utf-8"?>
+<Control xmlns="http://schemas.microsoft.com/VisualStudio/2011/storyboarding/control">
+  <Id Name="ef659927-1c37-4e42-a914-d9f8d808d3dc" Revision="1" Stencil="System.MyShapes" StencilVersion="1.0"/>
+</Control>
+</file>
+
+<file path=customXml/item50.xml><?xml version="1.0" encoding="utf-8"?>
+<Control xmlns="http://schemas.microsoft.com/VisualStudio/2011/storyboarding/control">
+  <Id Name="System.Storyboarding.WindowsAppIcons.Plus" Revision="1" Stencil="System.Storyboarding.WindowsAppIcons" StencilVersion="0.1"/>
+</Control>
+</file>
+
+<file path=customXml/item51.xml><?xml version="1.0" encoding="utf-8"?>
+<Control xmlns="http://schemas.microsoft.com/VisualStudio/2011/storyboarding/control">
+  <Id Name="System.Storyboarding.Icons.Home" Revision="1" Stencil="System.Storyboarding.Icons" StencilVersion="0.1"/>
+</Control>
+</file>
+
+<file path=customXml/item52.xml><?xml version="1.0" encoding="utf-8"?>
+<Control xmlns="http://schemas.microsoft.com/VisualStudio/2011/storyboarding/control">
+  <Id Name="f7a94b64-51d6-472a-8bb4-f2cc047935d1" RevisionId="4b37df06-a36b-4383-9074-55517f1335fc" Stencil="172d6d98-e5c9-42e9-a209-79f7a94bbd38" StencilRevisionId="00000000-0000-0000-0000-000000000000" StencilVersion="0.0"/>
+</Control>
+</file>
+
+<file path=customXml/item53.xml><?xml version="1.0" encoding="utf-8"?>
+<Control xmlns="http://schemas.microsoft.com/VisualStudio/2011/storyboarding/control">
+  <Id Name="System.Storyboarding.WindowsAppIcons.Save" Revision="1" Stencil="System.Storyboarding.WindowsAppIcons" StencilVersion="0.1"/>
+</Control>
+</file>
+
+<file path=customXml/item54.xml><?xml version="1.0" encoding="utf-8"?>
+<Control xmlns="http://schemas.microsoft.com/VisualStudio/2011/storyboarding/control">
+  <Id Name="System.Storyboarding.Common.DataGrid" Revision="1" Stencil="System.Storyboarding.Common" StencilVersion="0.1"/>
+</Control>
+</file>
+
+<file path=customXml/item55.xml><?xml version="1.0" encoding="utf-8"?>
+<Control xmlns="http://schemas.microsoft.com/VisualStudio/2011/storyboarding/control">
+  <Id Name="a09f5cbd-b64d-4c98-9714-c612df05bf73" Revision="5" Stencil="d2af3a11-d2b6-4c8f-a815-4caa8f0f209f" StencilVersion="1.0"/>
+</Control>
+</file>
+
+<file path=customXml/item56.xml><?xml version="1.0" encoding="utf-8"?>
+<Control xmlns="http://schemas.microsoft.com/VisualStudio/2011/storyboarding/control">
+  <Id Name="e07a033b-12ab-4913-adeb-a09872464d2d" Revision="2" Stencil="System.MyShapes" StencilVersion="1.0"/>
+</Control>
+</file>
+
+<file path=customXml/item57.xml><?xml version="1.0" encoding="utf-8"?>
+<Control xmlns="http://schemas.microsoft.com/VisualStudio/2011/storyboarding/control">
+  <Id Name="957c0455-b8d7-42c4-b540-2452ca01d79f" Revision="2" Stencil="System.MyShapes" StencilVersion="1.0"/>
+</Control>
+</file>
+
+<file path=customXml/item58.xml><?xml version="1.0" encoding="utf-8"?>
+<Control xmlns="http://schemas.microsoft.com/VisualStudio/2011/storyboarding/control">
+  <Id Name="a09f5cbd-b64d-4c98-9714-c612df05bf73" Revision="5" Stencil="d2af3a11-d2b6-4c8f-a815-4caa8f0f209f" StencilVersion="1.0"/>
+</Control>
+</file>
+
+<file path=customXml/item59.xml><?xml version="1.0" encoding="utf-8"?>
+<Control xmlns="http://schemas.microsoft.com/VisualStudio/2011/storyboarding/control">
+  <Id Name="e07a033b-12ab-4913-adeb-a09872464d2d" Revision="2" Stencil="System.MyShapes" StencilVersion="1.0"/>
+</Control>
+</file>
+
+<file path=customXml/item6.xml><?xml version="1.0" encoding="utf-8"?>
+<Control xmlns="http://schemas.microsoft.com/VisualStudio/2011/storyboarding/control">
+  <Id Name="4713f25e-8454-4767-b415-fedfeb3bf21e" Revision="1" Stencil="System.MyShapes" StencilVersion="1.0"/>
+</Control>
+</file>
+
+<file path=customXml/item60.xml><?xml version="1.0" encoding="utf-8"?>
+<Control xmlns="http://schemas.microsoft.com/VisualStudio/2011/storyboarding/control">
+  <Id Name="957c0455-b8d7-42c4-b540-2452ca01d79f" Revision="2" Stencil="System.MyShapes" StencilVersion="1.0"/>
+</Control>
+</file>
+
+<file path=customXml/item61.xml><?xml version="1.0" encoding="utf-8"?>
+<Control xmlns="http://schemas.microsoft.com/VisualStudio/2011/storyboarding/control">
+  <Id Name="System.Storyboarding.Common.DropdownBox" Revision="1" Stencil="System.Storyboarding.Common" StencilVersion="0.1"/>
+</Control>
+</file>
+
+<file path=customXml/item62.xml><?xml version="1.0" encoding="utf-8"?>
+<Control xmlns="http://schemas.microsoft.com/VisualStudio/2011/storyboarding/control">
+  <Id Name="System.Storyboarding.WindowsAppIcons.Plus" Revision="1" Stencil="System.Storyboarding.WindowsAppIcons" StencilVersion="0.1"/>
+</Control>
+</file>
+
+<file path=customXml/item63.xml><?xml version="1.0" encoding="utf-8"?>
+<Control xmlns="http://schemas.microsoft.com/VisualStudio/2011/storyboarding/control">
+  <Id Name="32035d07-bc66-4a79-8001-2507012193e3" RevisionId="7f6cc906-8fab-4878-8f41-90bcdc4e860e" Stencil="172d6d98-e5c9-42e9-a209-79f7a94bbd38" StencilRevisionId="00000000-0000-0000-0000-000000000000" StencilVersion="0.0"/>
+</Control>
+</file>
+
+<file path=customXml/item64.xml><?xml version="1.0" encoding="utf-8"?>
+<Control xmlns="http://schemas.microsoft.com/VisualStudio/2011/storyboarding/control">
+  <Id Name="System.Storyboarding.WindowsAppIcons.Recycle" Revision="1" Stencil="System.Storyboarding.WindowsAppIcons" StencilVersion="0.1"/>
+</Control>
+</file>
+
+<file path=customXml/item65.xml><?xml version="1.0" encoding="utf-8"?>
+<Control xmlns="http://schemas.microsoft.com/VisualStudio/2011/storyboarding/control">
+  <Id Name="System.Storyboarding.WindowsAppIcons.Edit" Revision="1" Stencil="System.Storyboarding.WindowsAppIcons" StencilVersion="0.1"/>
+</Control>
+</file>
+
+<file path=customXml/item66.xml><?xml version="1.0" encoding="utf-8"?>
+<Control xmlns="http://schemas.microsoft.com/VisualStudio/2011/storyboarding/control">
+  <Id Name="a6f5cebd-68c1-4f83-b0b2-82e64af5daa8" Revision="1" Stencil="d2af3a11-d2b6-4c8f-a815-4caa8f0f209f" StencilVersion="1.0"/>
+</Control>
+</file>
+
+<file path=customXml/item67.xml><?xml version="1.0" encoding="utf-8"?>
+<Control xmlns="http://schemas.microsoft.com/VisualStudio/2011/storyboarding/control">
+  <Id Name="System.Storyboarding.Backgrounds.Window" Revision="1" Stencil="System.Storyboarding.Backgrounds" StencilVersion="0.1"/>
+</Control>
+</file>
+
+<file path=customXml/item68.xml><?xml version="1.0" encoding="utf-8"?>
+<Control xmlns="http://schemas.microsoft.com/VisualStudio/2011/storyboarding/control">
+  <Id Name="ef659927-1c37-4e42-a914-d9f8d808d3dc" Revision="1" Stencil="System.MyShapes" StencilVersion="1.0"/>
+</Control>
+</file>
+
+<file path=customXml/item69.xml><?xml version="1.0" encoding="utf-8"?>
+<Control xmlns="http://schemas.microsoft.com/VisualStudio/2011/storyboarding/control">
+  <Id Name="4713f25e-8454-4767-b415-fedfeb3bf21e" Revision="1" Stencil="System.MyShapes" StencilVersion="1.0"/>
+</Control>
+</file>
+
+<file path=customXml/item7.xml><?xml version="1.0" encoding="utf-8"?>
+<Control xmlns="http://schemas.microsoft.com/VisualStudio/2011/storyboarding/control">
+  <Id Name="8cc5062a-2bde-4898-80b0-24eb70a28493" Revision="1" Stencil="System.MyShapes" StencilVersion="1.0"/>
+</Control>
+</file>
+
+<file path=customXml/item70.xml><?xml version="1.0" encoding="utf-8"?>
+<Control xmlns="http://schemas.microsoft.com/VisualStudio/2011/storyboarding/control">
+  <Id Name="8cc5062a-2bde-4898-80b0-24eb70a28493" Revision="1" Stencil="System.MyShapes" StencilVersion="1.0"/>
+</Control>
+</file>
+
 <file path=customXml/item71.xml><?xml version="1.0" encoding="utf-8"?>
 <Control xmlns="http://schemas.microsoft.com/VisualStudio/2011/storyboarding/control">
-  <Id Name="a14cf0bd-1afa-46b8-8b7a-4383daf40b21" Revision="2" Stencil="d2af3a11-d2b6-4c8f-a815-4caa8f0f209f" StencilVersion="1.0"/>
+  <Id Name="def0aba0-baad-4063-9e57-08bc10ceefe9" Revision="3" Stencil="d2af3a11-d2b6-4c8f-a815-4caa8f0f209f" StencilVersion="1.0"/>
 </Control>
 </file>
 
 <file path=customXml/item72.xml><?xml version="1.0" encoding="utf-8"?>
 <Control xmlns="http://schemas.microsoft.com/VisualStudio/2011/storyboarding/control">
-  <Id Name="4713f25e-8454-4767-b415-fedfeb3bf21e" Revision="1" Stencil="System.MyShapes" StencilVersion="1.0"/>
+  <Id Name="32035d07-bc66-4a79-8001-2507012193e3" RevisionId="7f6cc906-8fab-4878-8f41-90bcdc4e860e" Stencil="172d6d98-e5c9-42e9-a209-79f7a94bbd38" StencilRevisionId="00000000-0000-0000-0000-000000000000" StencilVersion="0.0"/>
 </Control>
 </file>
 
 <file path=customXml/item73.xml><?xml version="1.0" encoding="utf-8"?>
 <Control xmlns="http://schemas.microsoft.com/VisualStudio/2011/storyboarding/control">
-  <Id Name="System.Storyboarding.WindowsAppIcons.Recycle" Revision="1" Stencil="System.Storyboarding.WindowsAppIcons" StencilVersion="0.1"/>
+  <Id Name="System.Storyboarding.WindowsAppIcons.Plus" Revision="1" Stencil="System.Storyboarding.WindowsAppIcons" StencilVersion="0.1"/>
 </Control>
 </file>
 
 <file path=customXml/item74.xml><?xml version="1.0" encoding="utf-8"?>
 <Control xmlns="http://schemas.microsoft.com/VisualStudio/2011/storyboarding/control">
-  <Id Name="32035d07-bc66-4a79-8001-2507012193e3" RevisionId="7f6cc906-8fab-4878-8f41-90bcdc4e860e" Stencil="172d6d98-e5c9-42e9-a209-79f7a94bbd38" StencilRevisionId="00000000-0000-0000-0000-000000000000" StencilVersion="0.0"/>
+  <Id Name="System.Storyboarding.Icons.Home" Revision="1" Stencil="System.Storyboarding.Icons" StencilVersion="0.1"/>
 </Control>
 </file>
 
 <file path=customXml/item75.xml><?xml version="1.0" encoding="utf-8"?>
 <Control xmlns="http://schemas.microsoft.com/VisualStudio/2011/storyboarding/control">
-  <Id Name="957c0455-b8d7-42c4-b540-2452ca01d79f" Revision="2" Stencil="System.MyShapes" StencilVersion="1.0"/>
+  <Id Name="f7a94b64-51d6-472a-8bb4-f2cc047935d1" RevisionId="4b37df06-a36b-4383-9074-55517f1335fc" Stencil="172d6d98-e5c9-42e9-a209-79f7a94bbd38" StencilRevisionId="00000000-0000-0000-0000-000000000000" StencilVersion="0.0"/>
 </Control>
 </file>
 
 <file path=customXml/item76.xml><?xml version="1.0" encoding="utf-8"?>
 <Control xmlns="http://schemas.microsoft.com/VisualStudio/2011/storyboarding/control">
-  <Id Name="f7a94b64-51d6-472a-8bb4-f2cc047935d1" RevisionId="4b37df06-a36b-4383-9074-55517f1335fc" Stencil="172d6d98-e5c9-42e9-a209-79f7a94bbd38" StencilRevisionId="00000000-0000-0000-0000-000000000000" StencilVersion="0.0"/>
+  <Id Name="System.Storyboarding.WindowsAppIcons.Save" Revision="1" Stencil="System.Storyboarding.WindowsAppIcons" StencilVersion="0.1"/>
 </Control>
 </file>
 
 <file path=customXml/item77.xml><?xml version="1.0" encoding="utf-8"?>
 <Control xmlns="http://schemas.microsoft.com/VisualStudio/2011/storyboarding/control">
-  <Id Name="8cc5062a-2bde-4898-80b0-24eb70a28493" Revision="1" Stencil="System.MyShapes" StencilVersion="1.0"/>
+  <Id Name="System.Storyboarding.Common.DataGrid" Revision="1" Stencil="System.Storyboarding.Common" StencilVersion="0.1"/>
 </Control>
 </file>
 
 <file path=customXml/item78.xml><?xml version="1.0" encoding="utf-8"?>
 <Control xmlns="http://schemas.microsoft.com/VisualStudio/2011/storyboarding/control">
-  <Id Name="System.Storyboarding.Backgrounds.Window" Revision="1" Stencil="System.Storyboarding.Backgrounds" StencilVersion="0.1"/>
+  <Id Name="System.Storyboarding.Common.DataGrid" Revision="1" Stencil="System.Storyboarding.Common" StencilVersion="0.1"/>
 </Control>
 </file>
 
 <file path=customXml/item79.xml><?xml version="1.0" encoding="utf-8"?>
 <Control xmlns="http://schemas.microsoft.com/VisualStudio/2011/storyboarding/control">
-  <Id Name="4713f25e-8454-4767-b415-fedfeb3bf21e" Revision="1" Stencil="System.MyShapes" StencilVersion="1.0"/>
+  <Id Name="System.Storyboarding.Backgrounds.Window" Revision="1" Stencil="System.Storyboarding.Backgrounds" StencilVersion="0.1"/>
 </Control>
 </file>
 
 <file path=customXml/item8.xml><?xml version="1.0" encoding="utf-8"?>
 <Control xmlns="http://schemas.microsoft.com/VisualStudio/2011/storyboarding/control">
-  <Id Name="f7a94b64-51d6-472a-8bb4-f2cc047935d1" RevisionId="4b37df06-a36b-4383-9074-55517f1335fc" Stencil="172d6d98-e5c9-42e9-a209-79f7a94bbd38" StencilRevisionId="00000000-0000-0000-0000-000000000000" StencilVersion="0.0"/>
+  <Id Name="def0aba0-baad-4063-9e57-08bc10ceefe9" Revision="3" Stencil="d2af3a11-d2b6-4c8f-a815-4caa8f0f209f" StencilVersion="1.0"/>
 </Control>
 </file>
 
 <file path=customXml/item80.xml><?xml version="1.0" encoding="utf-8"?>
 <Control xmlns="http://schemas.microsoft.com/VisualStudio/2011/storyboarding/control">
-  <Id Name="def0aba0-baad-4063-9e57-08bc10ceefe9" Revision="3" Stencil="d2af3a11-d2b6-4c8f-a815-4caa8f0f209f" StencilVersion="1.0"/>
+  <Id Name="ef659927-1c37-4e42-a914-d9f8d808d3dc" Revision="1" Stencil="System.MyShapes" StencilVersion="1.0"/>
 </Control>
 </file>
 
 <file path=customXml/item81.xml><?xml version="1.0" encoding="utf-8"?>
 <Control xmlns="http://schemas.microsoft.com/VisualStudio/2011/storyboarding/control">
-  <Id Name="System.Storyboarding.Common.RadioButtonSelected" Revision="1" Stencil="System.Storyboarding.Common" StencilVersion="0.1"/>
+  <Id Name="4713f25e-8454-4767-b415-fedfeb3bf21e" Revision="1" Stencil="System.MyShapes" StencilVersion="1.0"/>
 </Control>
 </file>
 
 <file path=customXml/item82.xml><?xml version="1.0" encoding="utf-8"?>
 <Control xmlns="http://schemas.microsoft.com/VisualStudio/2011/storyboarding/control">
-  <Id Name="32035d07-bc66-4a79-8001-2507012193e3" RevisionId="7f6cc906-8fab-4878-8f41-90bcdc4e860e" Stencil="172d6d98-e5c9-42e9-a209-79f7a94bbd38" StencilRevisionId="00000000-0000-0000-0000-000000000000" StencilVersion="0.0"/>
+  <Id Name="8cc5062a-2bde-4898-80b0-24eb70a28493" Revision="1" Stencil="System.MyShapes" StencilVersion="1.0"/>
 </Control>
 </file>
 
 <file path=customXml/item83.xml><?xml version="1.0" encoding="utf-8"?>
 <Control xmlns="http://schemas.microsoft.com/VisualStudio/2011/storyboarding/control">
-  <Id Name="System.Storyboarding.Common.DataGrid" Revision="1" Stencil="System.Storyboarding.Common" StencilVersion="0.1"/>
+  <Id Name="def0aba0-baad-4063-9e57-08bc10ceefe9" Revision="3" Stencil="d2af3a11-d2b6-4c8f-a815-4caa8f0f209f" StencilVersion="1.0"/>
 </Control>
 </file>
 
 <file path=customXml/item84.xml><?xml version="1.0" encoding="utf-8"?>
 <Control xmlns="http://schemas.microsoft.com/VisualStudio/2011/storyboarding/control">
-  <Id Name="8cc5062a-2bde-4898-80b0-24eb70a28493" Revision="1" Stencil="System.MyShapes" StencilVersion="1.0"/>
+  <Id Name="32035d07-bc66-4a79-8001-2507012193e3" RevisionId="7f6cc906-8fab-4878-8f41-90bcdc4e860e" Stencil="172d6d98-e5c9-42e9-a209-79f7a94bbd38" StencilRevisionId="00000000-0000-0000-0000-000000000000" StencilVersion="0.0"/>
 </Control>
 </file>
 
@@ -25120,26 +26234,26 @@
 
 <file path=customXml/item86.xml><?xml version="1.0" encoding="utf-8"?>
 <Control xmlns="http://schemas.microsoft.com/VisualStudio/2011/storyboarding/control">
-  <Id Name="f7a94b64-51d6-472a-8bb4-f2cc047935d1" RevisionId="4b37df06-a36b-4383-9074-55517f1335fc" Stencil="172d6d98-e5c9-42e9-a209-79f7a94bbd38" StencilRevisionId="00000000-0000-0000-0000-000000000000" StencilVersion="0.0"/>
+  <Id Name="System.Storyboarding.Icons.Home" Revision="1" Stencil="System.Storyboarding.Icons" StencilVersion="0.1"/>
 </Control>
 </file>
 
 <file path=customXml/item87.xml><?xml version="1.0" encoding="utf-8"?>
 <Control xmlns="http://schemas.microsoft.com/VisualStudio/2011/storyboarding/control">
-  <Id Name="System.Storyboarding.WindowsAppIcons.Save" Revision="1" Stencil="System.Storyboarding.WindowsAppIcons" StencilVersion="0.1"/>
+  <Id Name="f7a94b64-51d6-472a-8bb4-f2cc047935d1" RevisionId="4b37df06-a36b-4383-9074-55517f1335fc" Stencil="172d6d98-e5c9-42e9-a209-79f7a94bbd38" StencilRevisionId="00000000-0000-0000-0000-000000000000" StencilVersion="0.0"/>
 </Control>
 </file>
 
 <file path=customXml/item88.xml><?xml version="1.0" encoding="utf-8"?>
 <Control xmlns="http://schemas.microsoft.com/VisualStudio/2011/storyboarding/control">
-  <Id Name="System.Storyboarding.WindowsAppIcons.Plus" Revision="1" Stencil="System.Storyboarding.WindowsAppIcons" StencilVersion="0.1"/>
+  <Id Name="System.Storyboarding.WindowsAppIcons.Save" Revision="1" Stencil="System.Storyboarding.WindowsAppIcons" StencilVersion="0.1"/>
 </Control>
 </file>
 
 <file path=customXml/item89.xml><?xml version="1.0" encoding="utf-8"?>
-<p:properties xmlns:p="http://schemas.microsoft.com/office/2006/metadata/properties" xmlns:xsi="http://www.w3.org/2001/XMLSchema-instance" xmlns:pc="http://schemas.microsoft.com/office/infopath/2007/PartnerControls">
-  <documentManagement/>
-</p:properties>
+<Control xmlns="http://schemas.microsoft.com/VisualStudio/2011/storyboarding/control">
+  <Id Name="System.Storyboarding.Backgrounds.Window" Revision="1" Stencil="System.Storyboarding.Backgrounds" StencilVersion="0.1"/>
+</Control>
 </file>
 
 <file path=customXml/item9.xml><?xml version="1.0" encoding="utf-8"?>
@@ -25150,82 +26264,78 @@
 
 <file path=customXml/item90.xml><?xml version="1.0" encoding="utf-8"?>
 <Control xmlns="http://schemas.microsoft.com/VisualStudio/2011/storyboarding/control">
-  <Id Name="System.Storyboarding.Common.Text" Revision="1" Stencil="System.Storyboarding.Common" StencilVersion="0.1"/>
+  <Id Name="ef659927-1c37-4e42-a914-d9f8d808d3dc" Revision="1" Stencil="System.MyShapes" StencilVersion="1.0"/>
 </Control>
 </file>
 
 <file path=customXml/item91.xml><?xml version="1.0" encoding="utf-8"?>
 <Control xmlns="http://schemas.microsoft.com/VisualStudio/2011/storyboarding/control">
-  <Id Name="System.Storyboarding.WindowsAppIcons.Save" Revision="1" Stencil="System.Storyboarding.WindowsAppIcons" StencilVersion="0.1"/>
+  <Id Name="4713f25e-8454-4767-b415-fedfeb3bf21e" Revision="1" Stencil="System.MyShapes" StencilVersion="1.0"/>
 </Control>
 </file>
 
 <file path=customXml/item92.xml><?xml version="1.0" encoding="utf-8"?>
 <Control xmlns="http://schemas.microsoft.com/VisualStudio/2011/storyboarding/control">
-  <Id Name="System.Storyboarding.WindowsAppIcons.Edit" Revision="1" Stencil="System.Storyboarding.WindowsAppIcons" StencilVersion="0.1"/>
+  <Id Name="8cc5062a-2bde-4898-80b0-24eb70a28493" Revision="1" Stencil="System.MyShapes" StencilVersion="1.0"/>
 </Control>
 </file>
 
 <file path=customXml/item93.xml><?xml version="1.0" encoding="utf-8"?>
 <Control xmlns="http://schemas.microsoft.com/VisualStudio/2011/storyboarding/control">
-  <Id Name="System.Storyboarding.Icons.Home" Revision="1" Stencil="System.Storyboarding.Icons" StencilVersion="0.1"/>
+  <Id Name="def0aba0-baad-4063-9e57-08bc10ceefe9" Revision="3" Stencil="d2af3a11-d2b6-4c8f-a815-4caa8f0f209f" StencilVersion="1.0"/>
 </Control>
 </file>
 
 <file path=customXml/item94.xml><?xml version="1.0" encoding="utf-8"?>
 <Control xmlns="http://schemas.microsoft.com/VisualStudio/2011/storyboarding/control">
-  <Id Name="a6f5cebd-68c1-4f83-b0b2-82e64af5daa8" Revision="1" Stencil="d2af3a11-d2b6-4c8f-a815-4caa8f0f209f" StencilVersion="1.0"/>
+  <Id Name="32035d07-bc66-4a79-8001-2507012193e3" RevisionId="7f6cc906-8fab-4878-8f41-90bcdc4e860e" Stencil="172d6d98-e5c9-42e9-a209-79f7a94bbd38" StencilRevisionId="00000000-0000-0000-0000-000000000000" StencilVersion="0.0"/>
 </Control>
 </file>
 
 <file path=customXml/item95.xml><?xml version="1.0" encoding="utf-8"?>
 <Control xmlns="http://schemas.microsoft.com/VisualStudio/2011/storyboarding/control">
-  <Id Name="a09f5cbd-b64d-4c98-9714-c612df05bf73" Revision="5" Stencil="d2af3a11-d2b6-4c8f-a815-4caa8f0f209f" StencilVersion="1.0"/>
+  <Id Name="System.Storyboarding.WindowsAppIcons.Plus" Revision="1" Stencil="System.Storyboarding.WindowsAppIcons" StencilVersion="0.1"/>
 </Control>
 </file>
 
 <file path=customXml/item96.xml><?xml version="1.0" encoding="utf-8"?>
 <Control xmlns="http://schemas.microsoft.com/VisualStudio/2011/storyboarding/control">
-  <Id Name="System.Storyboarding.WindowsAppIcons.Save" Revision="1" Stencil="System.Storyboarding.WindowsAppIcons" StencilVersion="0.1"/>
+  <Id Name="System.Storyboarding.Icons.Home" Revision="1" Stencil="System.Storyboarding.Icons" StencilVersion="0.1"/>
 </Control>
 </file>
 
 <file path=customXml/item97.xml><?xml version="1.0" encoding="utf-8"?>
 <Control xmlns="http://schemas.microsoft.com/VisualStudio/2011/storyboarding/control">
-  <Id Name="System.Storyboarding.WindowsAppIcons.Plus" Revision="1" Stencil="System.Storyboarding.WindowsAppIcons" StencilVersion="0.1"/>
+  <Id Name="System.Storyboarding.WindowsAppIcons.Save" Revision="1" Stencil="System.Storyboarding.WindowsAppIcons" StencilVersion="0.1"/>
 </Control>
 </file>
 
 <file path=customXml/item98.xml><?xml version="1.0" encoding="utf-8"?>
 <Control xmlns="http://schemas.microsoft.com/VisualStudio/2011/storyboarding/control">
-  <Id Name="a6f5cebd-68c1-4f83-b0b2-82e64af5daa8" Revision="1" Stencil="d2af3a11-d2b6-4c8f-a815-4caa8f0f209f" StencilVersion="1.0"/>
-</Control>
-</file>
-
-<file path=customXml/item99.xml><?xml version="1.0" encoding="utf-8"?>
-<Control xmlns="http://schemas.microsoft.com/VisualStudio/2011/storyboarding/control">
-  <Id Name="def0aba0-baad-4063-9e57-08bc10ceefe9" Revision="3" Stencil="d2af3a11-d2b6-4c8f-a815-4caa8f0f209f" StencilVersion="1.0"/>
+  <Id Name="f7a94b64-51d6-472a-8bb4-f2cc047935d1" RevisionId="4b37df06-a36b-4383-9074-55517f1335fc" Stencil="172d6d98-e5c9-42e9-a209-79f7a94bbd38" StencilRevisionId="00000000-0000-0000-0000-000000000000" StencilVersion="0.0"/>
 </Control>
 </file>
 
 <file path=customXml/itemProps1.xml><?xml version="1.0" encoding="utf-8"?>
-<ds:datastoreItem xmlns:ds="http://schemas.openxmlformats.org/officeDocument/2006/customXml" ds:itemID="{42CBDBB6-16F1-415E-9616-B6E80C51BC14}">
+<ds:datastoreItem xmlns:ds="http://schemas.openxmlformats.org/officeDocument/2006/customXml" ds:itemID="{DED51774-C402-4C04-B6DB-6BA97942E023}">
   <ds:schemaRefs>
-    <ds:schemaRef ds:uri="http://schemas.microsoft.com/VisualStudio/2011/storyboarding/control"/>
+    <ds:schemaRef ds:uri="http://www.w3.org/XML/1998/namespace"/>
+    <ds:schemaRef ds:uri="http://schemas.microsoft.com/office/2006/metadata/properties"/>
+    <ds:schemaRef ds:uri="http://schemas.openxmlformats.org/package/2006/metadata/core-properties"/>
+    <ds:schemaRef ds:uri="http://purl.org/dc/elements/1.1/"/>
+    <ds:schemaRef ds:uri="http://purl.org/dc/dcmitype/"/>
+    <ds:schemaRef ds:uri="http://purl.org/dc/terms/"/>
+    <ds:schemaRef ds:uri="http://schemas.microsoft.com/office/infopath/2007/PartnerControls"/>
+    <ds:schemaRef ds:uri="11a788af-2a95-4add-a4b4-a60d70c1a184"/>
+    <ds:schemaRef ds:uri="http://schemas.microsoft.com/office/2006/documentManagement/types"/>
+    <ds:schemaRef ds:uri="ed4f1a8c-625d-41bf-9ea8-bf9abed4eeb2"/>
+    <ds:schemaRef ds:uri="57b46829-05be-45b5-b819-0a162c331775"/>
   </ds:schemaRefs>
 </ds:datastoreItem>
 </file>
 
 <file path=customXml/itemProps10.xml><?xml version="1.0" encoding="utf-8"?>
-<ds:datastoreItem xmlns:ds="http://schemas.openxmlformats.org/officeDocument/2006/customXml" ds:itemID="{8D306C08-A78F-44FB-BFC4-13528017568F}">
-  <ds:schemaRefs>
-    <ds:schemaRef ds:uri="http://schemas.microsoft.com/VisualStudio/2011/storyboarding/control"/>
-  </ds:schemaRefs>
-</ds:datastoreItem>
-</file>
-
-<file path=customXml/itemProps100.xml><?xml version="1.0" encoding="utf-8"?>
-<ds:datastoreItem xmlns:ds="http://schemas.openxmlformats.org/officeDocument/2006/customXml" ds:itemID="{D52C4DBE-B22D-4D88-A2A2-A51F0BC53B2E}">
+<ds:datastoreItem xmlns:ds="http://schemas.openxmlformats.org/officeDocument/2006/customXml" ds:itemID="{405217EF-7BB1-480E-9A3E-36F71E74B2C1}">
   <ds:schemaRefs>
     <ds:schemaRef ds:uri="http://schemas.microsoft.com/VisualStudio/2011/storyboarding/control"/>
   </ds:schemaRefs>
@@ -25233,7 +26343,7 @@
 </file>
 
 <file path=customXml/itemProps11.xml><?xml version="1.0" encoding="utf-8"?>
-<ds:datastoreItem xmlns:ds="http://schemas.openxmlformats.org/officeDocument/2006/customXml" ds:itemID="{9EB5736F-435C-4547-A528-CF37A572C846}">
+<ds:datastoreItem xmlns:ds="http://schemas.openxmlformats.org/officeDocument/2006/customXml" ds:itemID="{37E01C55-B306-4CDB-8472-BD6BE63DF607}">
   <ds:schemaRefs>
     <ds:schemaRef ds:uri="http://schemas.microsoft.com/VisualStudio/2011/storyboarding/control"/>
   </ds:schemaRefs>
@@ -25241,7 +26351,7 @@
 </file>
 
 <file path=customXml/itemProps12.xml><?xml version="1.0" encoding="utf-8"?>
-<ds:datastoreItem xmlns:ds="http://schemas.openxmlformats.org/officeDocument/2006/customXml" ds:itemID="{D68B2FF2-28C3-499B-8281-24BF4ABE96F2}">
+<ds:datastoreItem xmlns:ds="http://schemas.openxmlformats.org/officeDocument/2006/customXml" ds:itemID="{9264755E-9386-4AB5-896C-FADAA2EB9BAD}">
   <ds:schemaRefs>
     <ds:schemaRef ds:uri="http://schemas.microsoft.com/VisualStudio/2011/storyboarding/control"/>
   </ds:schemaRefs>
@@ -25249,7 +26359,7 @@
 </file>
 
 <file path=customXml/itemProps13.xml><?xml version="1.0" encoding="utf-8"?>
-<ds:datastoreItem xmlns:ds="http://schemas.openxmlformats.org/officeDocument/2006/customXml" ds:itemID="{CADB8207-2C24-491C-8843-FCF39EB8F98B}">
+<ds:datastoreItem xmlns:ds="http://schemas.openxmlformats.org/officeDocument/2006/customXml" ds:itemID="{D7C75009-0A94-427F-9A6E-7BF7BF340D46}">
   <ds:schemaRefs>
     <ds:schemaRef ds:uri="http://schemas.microsoft.com/VisualStudio/2011/storyboarding/control"/>
   </ds:schemaRefs>
@@ -25257,7 +26367,7 @@
 </file>
 
 <file path=customXml/itemProps14.xml><?xml version="1.0" encoding="utf-8"?>
-<ds:datastoreItem xmlns:ds="http://schemas.openxmlformats.org/officeDocument/2006/customXml" ds:itemID="{849EE3D6-B167-4D4D-AFE6-FED4C093B524}">
+<ds:datastoreItem xmlns:ds="http://schemas.openxmlformats.org/officeDocument/2006/customXml" ds:itemID="{CB00F8A8-CC68-41D5-B532-53DA211787AF}">
   <ds:schemaRefs>
     <ds:schemaRef ds:uri="http://schemas.microsoft.com/VisualStudio/2011/storyboarding/control"/>
   </ds:schemaRefs>
@@ -25265,7 +26375,7 @@
 </file>
 
 <file path=customXml/itemProps15.xml><?xml version="1.0" encoding="utf-8"?>
-<ds:datastoreItem xmlns:ds="http://schemas.openxmlformats.org/officeDocument/2006/customXml" ds:itemID="{EBFDA17D-D03A-4ABC-B7F6-765EC09D4F42}">
+<ds:datastoreItem xmlns:ds="http://schemas.openxmlformats.org/officeDocument/2006/customXml" ds:itemID="{6E6DF77B-1BD7-4B2C-BF09-BB06C0A30987}">
   <ds:schemaRefs>
     <ds:schemaRef ds:uri="http://schemas.microsoft.com/VisualStudio/2011/storyboarding/control"/>
   </ds:schemaRefs>
@@ -25273,7 +26383,7 @@
 </file>
 
 <file path=customXml/itemProps16.xml><?xml version="1.0" encoding="utf-8"?>
-<ds:datastoreItem xmlns:ds="http://schemas.openxmlformats.org/officeDocument/2006/customXml" ds:itemID="{C6B7B63F-C48F-4718-AA06-F4FB2B4E543E}">
+<ds:datastoreItem xmlns:ds="http://schemas.openxmlformats.org/officeDocument/2006/customXml" ds:itemID="{09DA4285-1CDA-42D6-BDBF-2F760948E54E}">
   <ds:schemaRefs>
     <ds:schemaRef ds:uri="http://schemas.microsoft.com/VisualStudio/2011/storyboarding/control"/>
   </ds:schemaRefs>
@@ -25281,7 +26391,7 @@
 </file>
 
 <file path=customXml/itemProps17.xml><?xml version="1.0" encoding="utf-8"?>
-<ds:datastoreItem xmlns:ds="http://schemas.openxmlformats.org/officeDocument/2006/customXml" ds:itemID="{9F426529-17B7-41B9-87B3-0C47ED41A963}">
+<ds:datastoreItem xmlns:ds="http://schemas.openxmlformats.org/officeDocument/2006/customXml" ds:itemID="{5613B52C-138F-4433-93A2-8E22310B10BA}">
   <ds:schemaRefs>
     <ds:schemaRef ds:uri="http://schemas.microsoft.com/VisualStudio/2011/storyboarding/control"/>
   </ds:schemaRefs>
@@ -25289,7 +26399,7 @@
 </file>
 
 <file path=customXml/itemProps18.xml><?xml version="1.0" encoding="utf-8"?>
-<ds:datastoreItem xmlns:ds="http://schemas.openxmlformats.org/officeDocument/2006/customXml" ds:itemID="{6738CC57-A155-4D68-B3F7-126D2558A08D}">
+<ds:datastoreItem xmlns:ds="http://schemas.openxmlformats.org/officeDocument/2006/customXml" ds:itemID="{FC31C350-9FC4-4E25-81F6-FB9A920B8D57}">
   <ds:schemaRefs>
     <ds:schemaRef ds:uri="http://schemas.microsoft.com/VisualStudio/2011/storyboarding/control"/>
   </ds:schemaRefs>
@@ -25297,7 +26407,7 @@
 </file>
 
 <file path=customXml/itemProps19.xml><?xml version="1.0" encoding="utf-8"?>
-<ds:datastoreItem xmlns:ds="http://schemas.openxmlformats.org/officeDocument/2006/customXml" ds:itemID="{C170519B-19BE-4F4F-86B2-8DEF32E04A42}">
+<ds:datastoreItem xmlns:ds="http://schemas.openxmlformats.org/officeDocument/2006/customXml" ds:itemID="{5CF93791-5D2C-44C0-8A15-A2B209D2793F}">
   <ds:schemaRefs>
     <ds:schemaRef ds:uri="http://schemas.microsoft.com/VisualStudio/2011/storyboarding/control"/>
   </ds:schemaRefs>
@@ -25305,430 +26415,6 @@
 </file>
 
 <file path=customXml/itemProps2.xml><?xml version="1.0" encoding="utf-8"?>
-<ds:datastoreItem xmlns:ds="http://schemas.openxmlformats.org/officeDocument/2006/customXml" ds:itemID="{4A2098C0-CAE2-424B-B95A-0BC00D919BF6}">
-  <ds:schemaRefs>
-    <ds:schemaRef ds:uri="http://schemas.microsoft.com/VisualStudio/2011/storyboarding/control"/>
-  </ds:schemaRefs>
-</ds:datastoreItem>
-</file>
-
-<file path=customXml/itemProps20.xml><?xml version="1.0" encoding="utf-8"?>
-<ds:datastoreItem xmlns:ds="http://schemas.openxmlformats.org/officeDocument/2006/customXml" ds:itemID="{A51403EB-C942-460A-B56B-107F6FF0E63E}">
-  <ds:schemaRefs>
-    <ds:schemaRef ds:uri="http://schemas.microsoft.com/VisualStudio/2011/storyboarding/control"/>
-  </ds:schemaRefs>
-</ds:datastoreItem>
-</file>
-
-<file path=customXml/itemProps21.xml><?xml version="1.0" encoding="utf-8"?>
-<ds:datastoreItem xmlns:ds="http://schemas.openxmlformats.org/officeDocument/2006/customXml" ds:itemID="{91F471D5-19F2-4DD1-925B-2849EFFB2CA5}">
-  <ds:schemaRefs>
-    <ds:schemaRef ds:uri="http://schemas.microsoft.com/VisualStudio/2011/storyboarding/control"/>
-  </ds:schemaRefs>
-</ds:datastoreItem>
-</file>
-
-<file path=customXml/itemProps22.xml><?xml version="1.0" encoding="utf-8"?>
-<ds:datastoreItem xmlns:ds="http://schemas.openxmlformats.org/officeDocument/2006/customXml" ds:itemID="{8D141F9C-E5D3-4A6C-B5C2-AE41F207CD4F}">
-  <ds:schemaRefs>
-    <ds:schemaRef ds:uri="http://schemas.microsoft.com/VisualStudio/2011/storyboarding/control"/>
-  </ds:schemaRefs>
-</ds:datastoreItem>
-</file>
-
-<file path=customXml/itemProps23.xml><?xml version="1.0" encoding="utf-8"?>
-<ds:datastoreItem xmlns:ds="http://schemas.openxmlformats.org/officeDocument/2006/customXml" ds:itemID="{8730DC7C-9427-4E7E-8E5D-1A17BBC23A27}">
-  <ds:schemaRefs>
-    <ds:schemaRef ds:uri="http://schemas.microsoft.com/VisualStudio/2011/storyboarding/control"/>
-  </ds:schemaRefs>
-</ds:datastoreItem>
-</file>
-
-<file path=customXml/itemProps24.xml><?xml version="1.0" encoding="utf-8"?>
-<ds:datastoreItem xmlns:ds="http://schemas.openxmlformats.org/officeDocument/2006/customXml" ds:itemID="{43147EBE-FAF7-4241-A91D-F05E4A30F17C}">
-  <ds:schemaRefs>
-    <ds:schemaRef ds:uri="http://schemas.microsoft.com/VisualStudio/2011/storyboarding/control"/>
-  </ds:schemaRefs>
-</ds:datastoreItem>
-</file>
-
-<file path=customXml/itemProps25.xml><?xml version="1.0" encoding="utf-8"?>
-<ds:datastoreItem xmlns:ds="http://schemas.openxmlformats.org/officeDocument/2006/customXml" ds:itemID="{9264755E-9386-4AB5-896C-FADAA2EB9BAD}">
-  <ds:schemaRefs>
-    <ds:schemaRef ds:uri="http://schemas.microsoft.com/VisualStudio/2011/storyboarding/control"/>
-  </ds:schemaRefs>
-</ds:datastoreItem>
-</file>
-
-<file path=customXml/itemProps26.xml><?xml version="1.0" encoding="utf-8"?>
-<ds:datastoreItem xmlns:ds="http://schemas.openxmlformats.org/officeDocument/2006/customXml" ds:itemID="{4D6FA079-3775-4458-918C-ACD40D7B6A78}">
-  <ds:schemaRefs>
-    <ds:schemaRef ds:uri="http://schemas.microsoft.com/VisualStudio/2011/storyboarding/control"/>
-  </ds:schemaRefs>
-</ds:datastoreItem>
-</file>
-
-<file path=customXml/itemProps27.xml><?xml version="1.0" encoding="utf-8"?>
-<ds:datastoreItem xmlns:ds="http://schemas.openxmlformats.org/officeDocument/2006/customXml" ds:itemID="{BC0C127F-50EF-4CC5-BFD5-F077D2220FCF}">
-  <ds:schemaRefs>
-    <ds:schemaRef ds:uri="http://schemas.microsoft.com/VisualStudio/2011/storyboarding/control"/>
-  </ds:schemaRefs>
-</ds:datastoreItem>
-</file>
-
-<file path=customXml/itemProps28.xml><?xml version="1.0" encoding="utf-8"?>
-<ds:datastoreItem xmlns:ds="http://schemas.openxmlformats.org/officeDocument/2006/customXml" ds:itemID="{653043DB-DCAD-4FC8-8919-6AAD3D5C49C6}">
-  <ds:schemaRefs>
-    <ds:schemaRef ds:uri="http://schemas.microsoft.com/VisualStudio/2011/storyboarding/control"/>
-  </ds:schemaRefs>
-</ds:datastoreItem>
-</file>
-
-<file path=customXml/itemProps29.xml><?xml version="1.0" encoding="utf-8"?>
-<ds:datastoreItem xmlns:ds="http://schemas.openxmlformats.org/officeDocument/2006/customXml" ds:itemID="{7507913C-72A6-4D4A-B4C7-4EE9CFA0A512}">
-  <ds:schemaRefs>
-    <ds:schemaRef ds:uri="http://schemas.microsoft.com/VisualStudio/2011/storyboarding/control"/>
-  </ds:schemaRefs>
-</ds:datastoreItem>
-</file>
-
-<file path=customXml/itemProps3.xml><?xml version="1.0" encoding="utf-8"?>
-<ds:datastoreItem xmlns:ds="http://schemas.openxmlformats.org/officeDocument/2006/customXml" ds:itemID="{D21F02FB-5DB1-4DBA-BD13-D2862FBE9DF2}">
-  <ds:schemaRefs>
-    <ds:schemaRef ds:uri="http://schemas.microsoft.com/VisualStudio/2011/storyboarding/control"/>
-  </ds:schemaRefs>
-</ds:datastoreItem>
-</file>
-
-<file path=customXml/itemProps30.xml><?xml version="1.0" encoding="utf-8"?>
-<ds:datastoreItem xmlns:ds="http://schemas.openxmlformats.org/officeDocument/2006/customXml" ds:itemID="{1A0D6E66-364F-4DE0-A3F6-46BF686E7FAB}">
-  <ds:schemaRefs>
-    <ds:schemaRef ds:uri="http://schemas.microsoft.com/VisualStudio/2011/storyboarding/control"/>
-  </ds:schemaRefs>
-</ds:datastoreItem>
-</file>
-
-<file path=customXml/itemProps31.xml><?xml version="1.0" encoding="utf-8"?>
-<ds:datastoreItem xmlns:ds="http://schemas.openxmlformats.org/officeDocument/2006/customXml" ds:itemID="{D7DF3B9B-42F3-49B4-8896-8C4B48B73E93}">
-  <ds:schemaRefs>
-    <ds:schemaRef ds:uri="http://schemas.microsoft.com/VisualStudio/2011/storyboarding/control"/>
-  </ds:schemaRefs>
-</ds:datastoreItem>
-</file>
-
-<file path=customXml/itemProps32.xml><?xml version="1.0" encoding="utf-8"?>
-<ds:datastoreItem xmlns:ds="http://schemas.openxmlformats.org/officeDocument/2006/customXml" ds:itemID="{5ED3A7E7-82A7-496E-81C2-82BDA053DD8D}">
-  <ds:schemaRefs>
-    <ds:schemaRef ds:uri="http://schemas.microsoft.com/VisualStudio/2011/storyboarding/control"/>
-  </ds:schemaRefs>
-</ds:datastoreItem>
-</file>
-
-<file path=customXml/itemProps33.xml><?xml version="1.0" encoding="utf-8"?>
-<ds:datastoreItem xmlns:ds="http://schemas.openxmlformats.org/officeDocument/2006/customXml" ds:itemID="{3B6E51D0-65DC-44C7-AEB6-AE0EE55ECA02}">
-  <ds:schemaRefs>
-    <ds:schemaRef ds:uri="http://schemas.microsoft.com/VisualStudio/2011/storyboarding/control"/>
-  </ds:schemaRefs>
-</ds:datastoreItem>
-</file>
-
-<file path=customXml/itemProps34.xml><?xml version="1.0" encoding="utf-8"?>
-<ds:datastoreItem xmlns:ds="http://schemas.openxmlformats.org/officeDocument/2006/customXml" ds:itemID="{D3C199F2-3435-4F38-9729-F31F3FD6089C}">
-  <ds:schemaRefs>
-    <ds:schemaRef ds:uri="http://schemas.microsoft.com/VisualStudio/2011/storyboarding/control"/>
-  </ds:schemaRefs>
-</ds:datastoreItem>
-</file>
-
-<file path=customXml/itemProps35.xml><?xml version="1.0" encoding="utf-8"?>
-<ds:datastoreItem xmlns:ds="http://schemas.openxmlformats.org/officeDocument/2006/customXml" ds:itemID="{B7015256-82B9-4E25-8467-DE10A9D7BED0}">
-  <ds:schemaRefs>
-    <ds:schemaRef ds:uri="http://schemas.microsoft.com/sharepoint/v3/contenttype/forms"/>
-  </ds:schemaRefs>
-</ds:datastoreItem>
-</file>
-
-<file path=customXml/itemProps36.xml><?xml version="1.0" encoding="utf-8"?>
-<ds:datastoreItem xmlns:ds="http://schemas.openxmlformats.org/officeDocument/2006/customXml" ds:itemID="{B11D23D9-EA0D-4757-A03C-E7F510283FC4}">
-  <ds:schemaRefs>
-    <ds:schemaRef ds:uri="http://schemas.microsoft.com/VisualStudio/2011/storyboarding/control"/>
-  </ds:schemaRefs>
-</ds:datastoreItem>
-</file>
-
-<file path=customXml/itemProps37.xml><?xml version="1.0" encoding="utf-8"?>
-<ds:datastoreItem xmlns:ds="http://schemas.openxmlformats.org/officeDocument/2006/customXml" ds:itemID="{6E6DF77B-1BD7-4B2C-BF09-BB06C0A30987}">
-  <ds:schemaRefs>
-    <ds:schemaRef ds:uri="http://schemas.microsoft.com/VisualStudio/2011/storyboarding/control"/>
-  </ds:schemaRefs>
-</ds:datastoreItem>
-</file>
-
-<file path=customXml/itemProps38.xml><?xml version="1.0" encoding="utf-8"?>
-<ds:datastoreItem xmlns:ds="http://schemas.openxmlformats.org/officeDocument/2006/customXml" ds:itemID="{5CF93791-5D2C-44C0-8A15-A2B209D2793F}">
-  <ds:schemaRefs>
-    <ds:schemaRef ds:uri="http://schemas.microsoft.com/VisualStudio/2011/storyboarding/control"/>
-  </ds:schemaRefs>
-</ds:datastoreItem>
-</file>
-
-<file path=customXml/itemProps39.xml><?xml version="1.0" encoding="utf-8"?>
-<ds:datastoreItem xmlns:ds="http://schemas.openxmlformats.org/officeDocument/2006/customXml" ds:itemID="{2E134369-6F2D-4F65-B8F7-B9B50B2F1CC3}">
-  <ds:schemaRefs>
-    <ds:schemaRef ds:uri="http://schemas.microsoft.com/VisualStudio/2011/storyboarding/control"/>
-  </ds:schemaRefs>
-</ds:datastoreItem>
-</file>
-
-<file path=customXml/itemProps4.xml><?xml version="1.0" encoding="utf-8"?>
-<ds:datastoreItem xmlns:ds="http://schemas.openxmlformats.org/officeDocument/2006/customXml" ds:itemID="{15D48E4A-DBDF-4078-A9CD-66DB78FBDBCB}">
-  <ds:schemaRefs>
-    <ds:schemaRef ds:uri="http://schemas.microsoft.com/VisualStudio/2011/storyboarding/control"/>
-  </ds:schemaRefs>
-</ds:datastoreItem>
-</file>
-
-<file path=customXml/itemProps40.xml><?xml version="1.0" encoding="utf-8"?>
-<ds:datastoreItem xmlns:ds="http://schemas.openxmlformats.org/officeDocument/2006/customXml" ds:itemID="{39A2D63A-AF60-4559-9E69-EEBBBDF89C22}">
-  <ds:schemaRefs>
-    <ds:schemaRef ds:uri="http://schemas.microsoft.com/VisualStudio/2011/storyboarding/control"/>
-  </ds:schemaRefs>
-</ds:datastoreItem>
-</file>
-
-<file path=customXml/itemProps41.xml><?xml version="1.0" encoding="utf-8"?>
-<ds:datastoreItem xmlns:ds="http://schemas.openxmlformats.org/officeDocument/2006/customXml" ds:itemID="{FF6D44D0-85A6-42D8-9BD1-7A1AFFA38BD9}">
-  <ds:schemaRefs>
-    <ds:schemaRef ds:uri="http://schemas.microsoft.com/VisualStudio/2011/storyboarding/control"/>
-  </ds:schemaRefs>
-</ds:datastoreItem>
-</file>
-
-<file path=customXml/itemProps42.xml><?xml version="1.0" encoding="utf-8"?>
-<ds:datastoreItem xmlns:ds="http://schemas.openxmlformats.org/officeDocument/2006/customXml" ds:itemID="{50E880FA-7ACA-4914-BE57-492563439B7C}">
-  <ds:schemaRefs>
-    <ds:schemaRef ds:uri="http://schemas.microsoft.com/VisualStudio/2011/storyboarding/control"/>
-  </ds:schemaRefs>
-</ds:datastoreItem>
-</file>
-
-<file path=customXml/itemProps43.xml><?xml version="1.0" encoding="utf-8"?>
-<ds:datastoreItem xmlns:ds="http://schemas.openxmlformats.org/officeDocument/2006/customXml" ds:itemID="{2042CB66-327D-4A2E-9460-63B72B0281D1}">
-  <ds:schemaRefs>
-    <ds:schemaRef ds:uri="http://schemas.microsoft.com/VisualStudio/2011/storyboarding/control"/>
-  </ds:schemaRefs>
-</ds:datastoreItem>
-</file>
-
-<file path=customXml/itemProps44.xml><?xml version="1.0" encoding="utf-8"?>
-<ds:datastoreItem xmlns:ds="http://schemas.openxmlformats.org/officeDocument/2006/customXml" ds:itemID="{5855FEFB-95B1-411F-B053-D56AC988ACFA}">
-  <ds:schemaRefs>
-    <ds:schemaRef ds:uri="http://schemas.microsoft.com/VisualStudio/2011/storyboarding/control"/>
-  </ds:schemaRefs>
-</ds:datastoreItem>
-</file>
-
-<file path=customXml/itemProps45.xml><?xml version="1.0" encoding="utf-8"?>
-<ds:datastoreItem xmlns:ds="http://schemas.openxmlformats.org/officeDocument/2006/customXml" ds:itemID="{CEF99D9C-83CB-43BB-8365-C774E4D1A143}">
-  <ds:schemaRefs>
-    <ds:schemaRef ds:uri="http://schemas.microsoft.com/VisualStudio/2011/storyboarding/control"/>
-  </ds:schemaRefs>
-</ds:datastoreItem>
-</file>
-
-<file path=customXml/itemProps46.xml><?xml version="1.0" encoding="utf-8"?>
-<ds:datastoreItem xmlns:ds="http://schemas.openxmlformats.org/officeDocument/2006/customXml" ds:itemID="{92D2FCF6-C487-42E5-A43F-1605668A3540}">
-  <ds:schemaRefs>
-    <ds:schemaRef ds:uri="http://schemas.microsoft.com/VisualStudio/2011/storyboarding/control"/>
-  </ds:schemaRefs>
-</ds:datastoreItem>
-</file>
-
-<file path=customXml/itemProps47.xml><?xml version="1.0" encoding="utf-8"?>
-<ds:datastoreItem xmlns:ds="http://schemas.openxmlformats.org/officeDocument/2006/customXml" ds:itemID="{542D3781-7277-45C2-A7BE-BCFFC1B3B2C2}">
-  <ds:schemaRefs>
-    <ds:schemaRef ds:uri="http://schemas.microsoft.com/VisualStudio/2011/storyboarding/control"/>
-  </ds:schemaRefs>
-</ds:datastoreItem>
-</file>
-
-<file path=customXml/itemProps48.xml><?xml version="1.0" encoding="utf-8"?>
-<ds:datastoreItem xmlns:ds="http://schemas.openxmlformats.org/officeDocument/2006/customXml" ds:itemID="{6637330C-6677-4A84-AB1A-01F539624967}">
-  <ds:schemaRefs>
-    <ds:schemaRef ds:uri="http://schemas.microsoft.com/VisualStudio/2011/storyboarding/control"/>
-  </ds:schemaRefs>
-</ds:datastoreItem>
-</file>
-
-<file path=customXml/itemProps49.xml><?xml version="1.0" encoding="utf-8"?>
-<ds:datastoreItem xmlns:ds="http://schemas.openxmlformats.org/officeDocument/2006/customXml" ds:itemID="{661AFA96-4209-4986-942C-0DACF461EB44}">
-  <ds:schemaRefs>
-    <ds:schemaRef ds:uri="http://schemas.microsoft.com/VisualStudio/2011/storyboarding/control"/>
-  </ds:schemaRefs>
-</ds:datastoreItem>
-</file>
-
-<file path=customXml/itemProps5.xml><?xml version="1.0" encoding="utf-8"?>
-<ds:datastoreItem xmlns:ds="http://schemas.openxmlformats.org/officeDocument/2006/customXml" ds:itemID="{E044AAA4-E7E2-4035-BC90-73B06AD25910}">
-  <ds:schemaRefs>
-    <ds:schemaRef ds:uri="http://schemas.microsoft.com/VisualStudio/2011/storyboarding/control"/>
-  </ds:schemaRefs>
-</ds:datastoreItem>
-</file>
-
-<file path=customXml/itemProps50.xml><?xml version="1.0" encoding="utf-8"?>
-<ds:datastoreItem xmlns:ds="http://schemas.openxmlformats.org/officeDocument/2006/customXml" ds:itemID="{9BCCF8C9-269C-41CB-8569-328A0B68649E}">
-  <ds:schemaRefs>
-    <ds:schemaRef ds:uri="http://schemas.microsoft.com/VisualStudio/2011/storyboarding/control"/>
-  </ds:schemaRefs>
-</ds:datastoreItem>
-</file>
-
-<file path=customXml/itemProps51.xml><?xml version="1.0" encoding="utf-8"?>
-<ds:datastoreItem xmlns:ds="http://schemas.openxmlformats.org/officeDocument/2006/customXml" ds:itemID="{B2675522-B349-4DFE-8CFB-5767140985C1}">
-  <ds:schemaRefs>
-    <ds:schemaRef ds:uri="http://schemas.microsoft.com/VisualStudio/2011/storyboarding/control"/>
-  </ds:schemaRefs>
-</ds:datastoreItem>
-</file>
-
-<file path=customXml/itemProps52.xml><?xml version="1.0" encoding="utf-8"?>
-<ds:datastoreItem xmlns:ds="http://schemas.openxmlformats.org/officeDocument/2006/customXml" ds:itemID="{B6053901-4DC9-40C2-9D30-515169322164}">
-  <ds:schemaRefs>
-    <ds:schemaRef ds:uri="http://schemas.microsoft.com/VisualStudio/2011/storyboarding/control"/>
-  </ds:schemaRefs>
-</ds:datastoreItem>
-</file>
-
-<file path=customXml/itemProps53.xml><?xml version="1.0" encoding="utf-8"?>
-<ds:datastoreItem xmlns:ds="http://schemas.openxmlformats.org/officeDocument/2006/customXml" ds:itemID="{42B99A03-7B2A-4958-A399-3D4E65A957D8}">
-  <ds:schemaRefs>
-    <ds:schemaRef ds:uri="http://schemas.microsoft.com/VisualStudio/2011/storyboarding/control"/>
-  </ds:schemaRefs>
-</ds:datastoreItem>
-</file>
-
-<file path=customXml/itemProps54.xml><?xml version="1.0" encoding="utf-8"?>
-<ds:datastoreItem xmlns:ds="http://schemas.openxmlformats.org/officeDocument/2006/customXml" ds:itemID="{053B253E-E961-4CF6-939E-DCD3A52C6253}">
-  <ds:schemaRefs>
-    <ds:schemaRef ds:uri="http://schemas.microsoft.com/VisualStudio/2011/storyboarding/control"/>
-  </ds:schemaRefs>
-</ds:datastoreItem>
-</file>
-
-<file path=customXml/itemProps55.xml><?xml version="1.0" encoding="utf-8"?>
-<ds:datastoreItem xmlns:ds="http://schemas.openxmlformats.org/officeDocument/2006/customXml" ds:itemID="{91D30638-3C1C-42B6-945D-3779B5CFC107}">
-  <ds:schemaRefs>
-    <ds:schemaRef ds:uri="http://schemas.microsoft.com/VisualStudio/2011/storyboarding/control"/>
-  </ds:schemaRefs>
-</ds:datastoreItem>
-</file>
-
-<file path=customXml/itemProps56.xml><?xml version="1.0" encoding="utf-8"?>
-<ds:datastoreItem xmlns:ds="http://schemas.openxmlformats.org/officeDocument/2006/customXml" ds:itemID="{37E01C55-B306-4CDB-8472-BD6BE63DF607}">
-  <ds:schemaRefs>
-    <ds:schemaRef ds:uri="http://schemas.microsoft.com/VisualStudio/2011/storyboarding/control"/>
-  </ds:schemaRefs>
-</ds:datastoreItem>
-</file>
-
-<file path=customXml/itemProps57.xml><?xml version="1.0" encoding="utf-8"?>
-<ds:datastoreItem xmlns:ds="http://schemas.openxmlformats.org/officeDocument/2006/customXml" ds:itemID="{316C99AA-0AAE-40AD-9975-7B4236321B6E}">
-  <ds:schemaRefs>
-    <ds:schemaRef ds:uri="http://schemas.microsoft.com/VisualStudio/2011/storyboarding/control"/>
-  </ds:schemaRefs>
-</ds:datastoreItem>
-</file>
-
-<file path=customXml/itemProps58.xml><?xml version="1.0" encoding="utf-8"?>
-<ds:datastoreItem xmlns:ds="http://schemas.openxmlformats.org/officeDocument/2006/customXml" ds:itemID="{40A9D91C-CB09-435D-A52B-0F7B5993455E}">
-  <ds:schemaRefs>
-    <ds:schemaRef ds:uri="http://schemas.microsoft.com/VisualStudio/2011/storyboarding/control"/>
-  </ds:schemaRefs>
-</ds:datastoreItem>
-</file>
-
-<file path=customXml/itemProps59.xml><?xml version="1.0" encoding="utf-8"?>
-<ds:datastoreItem xmlns:ds="http://schemas.openxmlformats.org/officeDocument/2006/customXml" ds:itemID="{9DCD6B8E-B2F2-4862-BB1F-E6974C7D28CA}">
-  <ds:schemaRefs>
-    <ds:schemaRef ds:uri="http://schemas.microsoft.com/VisualStudio/2011/storyboarding/control"/>
-  </ds:schemaRefs>
-</ds:datastoreItem>
-</file>
-
-<file path=customXml/itemProps6.xml><?xml version="1.0" encoding="utf-8"?>
-<ds:datastoreItem xmlns:ds="http://schemas.openxmlformats.org/officeDocument/2006/customXml" ds:itemID="{09DA4285-1CDA-42D6-BDBF-2F760948E54E}">
-  <ds:schemaRefs>
-    <ds:schemaRef ds:uri="http://schemas.microsoft.com/VisualStudio/2011/storyboarding/control"/>
-  </ds:schemaRefs>
-</ds:datastoreItem>
-</file>
-
-<file path=customXml/itemProps60.xml><?xml version="1.0" encoding="utf-8"?>
-<ds:datastoreItem xmlns:ds="http://schemas.openxmlformats.org/officeDocument/2006/customXml" ds:itemID="{5926F671-2034-44F7-902B-B7083CCFE0D8}">
-  <ds:schemaRefs>
-    <ds:schemaRef ds:uri="http://schemas.microsoft.com/VisualStudio/2011/storyboarding/control"/>
-  </ds:schemaRefs>
-</ds:datastoreItem>
-</file>
-
-<file path=customXml/itemProps61.xml><?xml version="1.0" encoding="utf-8"?>
-<ds:datastoreItem xmlns:ds="http://schemas.openxmlformats.org/officeDocument/2006/customXml" ds:itemID="{EFE33596-3B04-4569-9CEB-E02E085FDFCF}">
-  <ds:schemaRefs>
-    <ds:schemaRef ds:uri="http://schemas.microsoft.com/VisualStudio/2011/storyboarding/control"/>
-  </ds:schemaRefs>
-</ds:datastoreItem>
-</file>
-
-<file path=customXml/itemProps62.xml><?xml version="1.0" encoding="utf-8"?>
-<ds:datastoreItem xmlns:ds="http://schemas.openxmlformats.org/officeDocument/2006/customXml" ds:itemID="{7EF52C15-C024-4B19-AA11-D5FBAF0DBB3C}">
-  <ds:schemaRefs>
-    <ds:schemaRef ds:uri="http://schemas.microsoft.com/VisualStudio/2011/storyboarding/control"/>
-  </ds:schemaRefs>
-</ds:datastoreItem>
-</file>
-
-<file path=customXml/itemProps63.xml><?xml version="1.0" encoding="utf-8"?>
-<ds:datastoreItem xmlns:ds="http://schemas.openxmlformats.org/officeDocument/2006/customXml" ds:itemID="{5257C525-80EC-4AFB-AAC4-72BDB405FEE7}">
-  <ds:schemaRefs>
-    <ds:schemaRef ds:uri="http://schemas.microsoft.com/VisualStudio/2011/storyboarding/control"/>
-  </ds:schemaRefs>
-</ds:datastoreItem>
-</file>
-
-<file path=customXml/itemProps64.xml><?xml version="1.0" encoding="utf-8"?>
-<ds:datastoreItem xmlns:ds="http://schemas.openxmlformats.org/officeDocument/2006/customXml" ds:itemID="{CB5DB83F-1AF1-4253-878C-B66311C1BD1A}">
-  <ds:schemaRefs>
-    <ds:schemaRef ds:uri="http://schemas.microsoft.com/VisualStudio/2011/storyboarding/control"/>
-  </ds:schemaRefs>
-</ds:datastoreItem>
-</file>
-
-<file path=customXml/itemProps65.xml><?xml version="1.0" encoding="utf-8"?>
-<ds:datastoreItem xmlns:ds="http://schemas.openxmlformats.org/officeDocument/2006/customXml" ds:itemID="{405217EF-7BB1-480E-9A3E-36F71E74B2C1}">
-  <ds:schemaRefs>
-    <ds:schemaRef ds:uri="http://schemas.microsoft.com/VisualStudio/2011/storyboarding/control"/>
-  </ds:schemaRefs>
-</ds:datastoreItem>
-</file>
-
-<file path=customXml/itemProps66.xml><?xml version="1.0" encoding="utf-8"?>
-<ds:datastoreItem xmlns:ds="http://schemas.openxmlformats.org/officeDocument/2006/customXml" ds:itemID="{953990ED-1B5C-4487-81BE-A06FE56208E3}">
-  <ds:schemaRefs>
-    <ds:schemaRef ds:uri="http://schemas.microsoft.com/VisualStudio/2011/storyboarding/control"/>
-  </ds:schemaRefs>
-</ds:datastoreItem>
-</file>
-
-<file path=customXml/itemProps67.xml><?xml version="1.0" encoding="utf-8"?>
-<ds:datastoreItem xmlns:ds="http://schemas.openxmlformats.org/officeDocument/2006/customXml" ds:itemID="{967BE90E-8B6F-4D1A-8151-633D9433B606}">
-  <ds:schemaRefs>
-    <ds:schemaRef ds:uri="http://schemas.microsoft.com/VisualStudio/2011/storyboarding/control"/>
-  </ds:schemaRefs>
-</ds:datastoreItem>
-</file>
-
-<file path=customXml/itemProps68.xml><?xml version="1.0" encoding="utf-8"?>
 <ds:datastoreItem xmlns:ds="http://schemas.openxmlformats.org/officeDocument/2006/customXml" ds:itemID="{1D650C95-527E-469F-A3C7-9BCB33D9A1A8}">
   <ds:schemaRefs>
     <ds:schemaRef ds:uri="http://schemas.microsoft.com/office/2006/metadata/contentType"/>
@@ -25748,7 +26434,79 @@
 </ds:datastoreItem>
 </file>
 
-<file path=customXml/itemProps69.xml><?xml version="1.0" encoding="utf-8"?>
+<file path=customXml/itemProps20.xml><?xml version="1.0" encoding="utf-8"?>
+<ds:datastoreItem xmlns:ds="http://schemas.openxmlformats.org/officeDocument/2006/customXml" ds:itemID="{9F426529-17B7-41B9-87B3-0C47ED41A963}">
+  <ds:schemaRefs>
+    <ds:schemaRef ds:uri="http://schemas.microsoft.com/VisualStudio/2011/storyboarding/control"/>
+  </ds:schemaRefs>
+</ds:datastoreItem>
+</file>
+
+<file path=customXml/itemProps21.xml><?xml version="1.0" encoding="utf-8"?>
+<ds:datastoreItem xmlns:ds="http://schemas.openxmlformats.org/officeDocument/2006/customXml" ds:itemID="{237940BE-C4C0-476D-8844-F84ABCCD439E}">
+  <ds:schemaRefs>
+    <ds:schemaRef ds:uri="http://schemas.microsoft.com/VisualStudio/2011/storyboarding/control"/>
+  </ds:schemaRefs>
+</ds:datastoreItem>
+</file>
+
+<file path=customXml/itemProps22.xml><?xml version="1.0" encoding="utf-8"?>
+<ds:datastoreItem xmlns:ds="http://schemas.openxmlformats.org/officeDocument/2006/customXml" ds:itemID="{4D6FA079-3775-4458-918C-ACD40D7B6A78}">
+  <ds:schemaRefs>
+    <ds:schemaRef ds:uri="http://schemas.microsoft.com/VisualStudio/2011/storyboarding/control"/>
+  </ds:schemaRefs>
+</ds:datastoreItem>
+</file>
+
+<file path=customXml/itemProps23.xml><?xml version="1.0" encoding="utf-8"?>
+<ds:datastoreItem xmlns:ds="http://schemas.openxmlformats.org/officeDocument/2006/customXml" ds:itemID="{40A9D91C-CB09-435D-A52B-0F7B5993455E}">
+  <ds:schemaRefs>
+    <ds:schemaRef ds:uri="http://schemas.microsoft.com/VisualStudio/2011/storyboarding/control"/>
+  </ds:schemaRefs>
+</ds:datastoreItem>
+</file>
+
+<file path=customXml/itemProps24.xml><?xml version="1.0" encoding="utf-8"?>
+<ds:datastoreItem xmlns:ds="http://schemas.openxmlformats.org/officeDocument/2006/customXml" ds:itemID="{6738CC57-A155-4D68-B3F7-126D2558A08D}">
+  <ds:schemaRefs>
+    <ds:schemaRef ds:uri="http://schemas.microsoft.com/VisualStudio/2011/storyboarding/control"/>
+  </ds:schemaRefs>
+</ds:datastoreItem>
+</file>
+
+<file path=customXml/itemProps25.xml><?xml version="1.0" encoding="utf-8"?>
+<ds:datastoreItem xmlns:ds="http://schemas.openxmlformats.org/officeDocument/2006/customXml" ds:itemID="{C6073AC6-3AC6-4053-AF9F-0DA698749C7B}">
+  <ds:schemaRefs>
+    <ds:schemaRef ds:uri="http://schemas.microsoft.com/VisualStudio/2011/storyboarding/control"/>
+  </ds:schemaRefs>
+</ds:datastoreItem>
+</file>
+
+<file path=customXml/itemProps26.xml><?xml version="1.0" encoding="utf-8"?>
+<ds:datastoreItem xmlns:ds="http://schemas.openxmlformats.org/officeDocument/2006/customXml" ds:itemID="{C61D435D-A17D-4CDF-BF72-91398C2A2468}">
+  <ds:schemaRefs>
+    <ds:schemaRef ds:uri="http://schemas.microsoft.com/VisualStudio/2011/storyboarding/control"/>
+  </ds:schemaRefs>
+</ds:datastoreItem>
+</file>
+
+<file path=customXml/itemProps27.xml><?xml version="1.0" encoding="utf-8"?>
+<ds:datastoreItem xmlns:ds="http://schemas.openxmlformats.org/officeDocument/2006/customXml" ds:itemID="{F348A5AF-33BE-4204-BA0B-F3E07C6F1BF9}">
+  <ds:schemaRefs>
+    <ds:schemaRef ds:uri="http://schemas.microsoft.com/VisualStudio/2011/storyboarding/control"/>
+  </ds:schemaRefs>
+</ds:datastoreItem>
+</file>
+
+<file path=customXml/itemProps28.xml><?xml version="1.0" encoding="utf-8"?>
+<ds:datastoreItem xmlns:ds="http://schemas.openxmlformats.org/officeDocument/2006/customXml" ds:itemID="{2E134369-6F2D-4F65-B8F7-B9B50B2F1CC3}">
+  <ds:schemaRefs>
+    <ds:schemaRef ds:uri="http://schemas.microsoft.com/VisualStudio/2011/storyboarding/control"/>
+  </ds:schemaRefs>
+</ds:datastoreItem>
+</file>
+
+<file path=customXml/itemProps29.xml><?xml version="1.0" encoding="utf-8"?>
 <ds:datastoreItem xmlns:ds="http://schemas.openxmlformats.org/officeDocument/2006/customXml" ds:itemID="{D0EEB95F-EC46-49AB-9B55-2AC0B955227A}">
   <ds:schemaRefs>
     <ds:schemaRef ds:uri="http://schemas.microsoft.com/VisualStudio/2011/storyboarding/control"/>
@@ -25756,8 +26514,360 @@
 </ds:datastoreItem>
 </file>
 
+<file path=customXml/itemProps3.xml><?xml version="1.0" encoding="utf-8"?>
+<ds:datastoreItem xmlns:ds="http://schemas.openxmlformats.org/officeDocument/2006/customXml" ds:itemID="{B7015256-82B9-4E25-8467-DE10A9D7BED0}">
+  <ds:schemaRefs>
+    <ds:schemaRef ds:uri="http://schemas.microsoft.com/sharepoint/v3/contenttype/forms"/>
+  </ds:schemaRefs>
+</ds:datastoreItem>
+</file>
+
+<file path=customXml/itemProps30.xml><?xml version="1.0" encoding="utf-8"?>
+<ds:datastoreItem xmlns:ds="http://schemas.openxmlformats.org/officeDocument/2006/customXml" ds:itemID="{03D36120-1035-40A3-B0BB-D936200B11C5}">
+  <ds:schemaRefs>
+    <ds:schemaRef ds:uri="http://schemas.microsoft.com/VisualStudio/2011/storyboarding/control"/>
+  </ds:schemaRefs>
+</ds:datastoreItem>
+</file>
+
+<file path=customXml/itemProps31.xml><?xml version="1.0" encoding="utf-8"?>
+<ds:datastoreItem xmlns:ds="http://schemas.openxmlformats.org/officeDocument/2006/customXml" ds:itemID="{BC0C127F-50EF-4CC5-BFD5-F077D2220FCF}">
+  <ds:schemaRefs>
+    <ds:schemaRef ds:uri="http://schemas.microsoft.com/VisualStudio/2011/storyboarding/control"/>
+  </ds:schemaRefs>
+</ds:datastoreItem>
+</file>
+
+<file path=customXml/itemProps32.xml><?xml version="1.0" encoding="utf-8"?>
+<ds:datastoreItem xmlns:ds="http://schemas.openxmlformats.org/officeDocument/2006/customXml" ds:itemID="{16D74C73-9C0F-4B4D-BCBA-BE1AAFB6AA82}">
+  <ds:schemaRefs>
+    <ds:schemaRef ds:uri="http://schemas.microsoft.com/VisualStudio/2011/storyboarding/control"/>
+  </ds:schemaRefs>
+</ds:datastoreItem>
+</file>
+
+<file path=customXml/itemProps33.xml><?xml version="1.0" encoding="utf-8"?>
+<ds:datastoreItem xmlns:ds="http://schemas.openxmlformats.org/officeDocument/2006/customXml" ds:itemID="{39A2D63A-AF60-4559-9E69-EEBBBDF89C22}">
+  <ds:schemaRefs>
+    <ds:schemaRef ds:uri="http://schemas.microsoft.com/VisualStudio/2011/storyboarding/control"/>
+  </ds:schemaRefs>
+</ds:datastoreItem>
+</file>
+
+<file path=customXml/itemProps34.xml><?xml version="1.0" encoding="utf-8"?>
+<ds:datastoreItem xmlns:ds="http://schemas.openxmlformats.org/officeDocument/2006/customXml" ds:itemID="{0434DC3B-0EB6-48BA-A7A7-ADCCA91A2DEF}">
+  <ds:schemaRefs>
+    <ds:schemaRef ds:uri="http://schemas.microsoft.com/VisualStudio/2011/storyboarding/control"/>
+  </ds:schemaRefs>
+</ds:datastoreItem>
+</file>
+
+<file path=customXml/itemProps35.xml><?xml version="1.0" encoding="utf-8"?>
+<ds:datastoreItem xmlns:ds="http://schemas.openxmlformats.org/officeDocument/2006/customXml" ds:itemID="{5926F671-2034-44F7-902B-B7083CCFE0D8}">
+  <ds:schemaRefs>
+    <ds:schemaRef ds:uri="http://schemas.microsoft.com/VisualStudio/2011/storyboarding/control"/>
+  </ds:schemaRefs>
+</ds:datastoreItem>
+</file>
+
+<file path=customXml/itemProps36.xml><?xml version="1.0" encoding="utf-8"?>
+<ds:datastoreItem xmlns:ds="http://schemas.openxmlformats.org/officeDocument/2006/customXml" ds:itemID="{5855FEFB-95B1-411F-B053-D56AC988ACFA}">
+  <ds:schemaRefs>
+    <ds:schemaRef ds:uri="http://schemas.microsoft.com/VisualStudio/2011/storyboarding/control"/>
+  </ds:schemaRefs>
+</ds:datastoreItem>
+</file>
+
+<file path=customXml/itemProps37.xml><?xml version="1.0" encoding="utf-8"?>
+<ds:datastoreItem xmlns:ds="http://schemas.openxmlformats.org/officeDocument/2006/customXml" ds:itemID="{6B7F6B0D-7960-4392-8CE5-01C82A809BF3}">
+  <ds:schemaRefs>
+    <ds:schemaRef ds:uri="http://schemas.microsoft.com/VisualStudio/2011/storyboarding/control"/>
+  </ds:schemaRefs>
+</ds:datastoreItem>
+</file>
+
+<file path=customXml/itemProps38.xml><?xml version="1.0" encoding="utf-8"?>
+<ds:datastoreItem xmlns:ds="http://schemas.openxmlformats.org/officeDocument/2006/customXml" ds:itemID="{653043DB-DCAD-4FC8-8919-6AAD3D5C49C6}">
+  <ds:schemaRefs>
+    <ds:schemaRef ds:uri="http://schemas.microsoft.com/VisualStudio/2011/storyboarding/control"/>
+  </ds:schemaRefs>
+</ds:datastoreItem>
+</file>
+
+<file path=customXml/itemProps39.xml><?xml version="1.0" encoding="utf-8"?>
+<ds:datastoreItem xmlns:ds="http://schemas.openxmlformats.org/officeDocument/2006/customXml" ds:itemID="{9DCD6B8E-B2F2-4862-BB1F-E6974C7D28CA}">
+  <ds:schemaRefs>
+    <ds:schemaRef ds:uri="http://schemas.microsoft.com/VisualStudio/2011/storyboarding/control"/>
+  </ds:schemaRefs>
+</ds:datastoreItem>
+</file>
+
+<file path=customXml/itemProps4.xml><?xml version="1.0" encoding="utf-8"?>
+<ds:datastoreItem xmlns:ds="http://schemas.openxmlformats.org/officeDocument/2006/customXml" ds:itemID="{91D30638-3C1C-42B6-945D-3779B5CFC107}">
+  <ds:schemaRefs>
+    <ds:schemaRef ds:uri="http://schemas.microsoft.com/VisualStudio/2011/storyboarding/control"/>
+  </ds:schemaRefs>
+</ds:datastoreItem>
+</file>
+
+<file path=customXml/itemProps40.xml><?xml version="1.0" encoding="utf-8"?>
+<ds:datastoreItem xmlns:ds="http://schemas.openxmlformats.org/officeDocument/2006/customXml" ds:itemID="{4B7B01DA-F2DD-4B7D-A6C3-A8E5AF716022}">
+  <ds:schemaRefs>
+    <ds:schemaRef ds:uri="http://schemas.microsoft.com/VisualStudio/2011/storyboarding/control"/>
+  </ds:schemaRefs>
+</ds:datastoreItem>
+</file>
+
+<file path=customXml/itemProps41.xml><?xml version="1.0" encoding="utf-8"?>
+<ds:datastoreItem xmlns:ds="http://schemas.openxmlformats.org/officeDocument/2006/customXml" ds:itemID="{9FF7EB94-E1AA-4209-98C0-C1652B1BD202}">
+  <ds:schemaRefs>
+    <ds:schemaRef ds:uri="http://schemas.microsoft.com/VisualStudio/2011/storyboarding/control"/>
+  </ds:schemaRefs>
+</ds:datastoreItem>
+</file>
+
+<file path=customXml/itemProps42.xml><?xml version="1.0" encoding="utf-8"?>
+<ds:datastoreItem xmlns:ds="http://schemas.openxmlformats.org/officeDocument/2006/customXml" ds:itemID="{D52C4DBE-B22D-4D88-A2A2-A51F0BC53B2E}">
+  <ds:schemaRefs>
+    <ds:schemaRef ds:uri="http://schemas.microsoft.com/VisualStudio/2011/storyboarding/control"/>
+  </ds:schemaRefs>
+</ds:datastoreItem>
+</file>
+
+<file path=customXml/itemProps43.xml><?xml version="1.0" encoding="utf-8"?>
+<ds:datastoreItem xmlns:ds="http://schemas.openxmlformats.org/officeDocument/2006/customXml" ds:itemID="{8D306C08-A78F-44FB-BFC4-13528017568F}">
+  <ds:schemaRefs>
+    <ds:schemaRef ds:uri="http://schemas.microsoft.com/VisualStudio/2011/storyboarding/control"/>
+  </ds:schemaRefs>
+</ds:datastoreItem>
+</file>
+
+<file path=customXml/itemProps44.xml><?xml version="1.0" encoding="utf-8"?>
+<ds:datastoreItem xmlns:ds="http://schemas.openxmlformats.org/officeDocument/2006/customXml" ds:itemID="{C170519B-19BE-4F4F-86B2-8DEF32E04A42}">
+  <ds:schemaRefs>
+    <ds:schemaRef ds:uri="http://schemas.microsoft.com/VisualStudio/2011/storyboarding/control"/>
+  </ds:schemaRefs>
+</ds:datastoreItem>
+</file>
+
+<file path=customXml/itemProps45.xml><?xml version="1.0" encoding="utf-8"?>
+<ds:datastoreItem xmlns:ds="http://schemas.openxmlformats.org/officeDocument/2006/customXml" ds:itemID="{CEF99D9C-83CB-43BB-8365-C774E4D1A143}">
+  <ds:schemaRefs>
+    <ds:schemaRef ds:uri="http://schemas.microsoft.com/VisualStudio/2011/storyboarding/control"/>
+  </ds:schemaRefs>
+</ds:datastoreItem>
+</file>
+
+<file path=customXml/itemProps46.xml><?xml version="1.0" encoding="utf-8"?>
+<ds:datastoreItem xmlns:ds="http://schemas.openxmlformats.org/officeDocument/2006/customXml" ds:itemID="{7FCB62AB-11CB-48EE-90C0-29BFAA53AE60}">
+  <ds:schemaRefs>
+    <ds:schemaRef ds:uri="http://schemas.microsoft.com/VisualStudio/2011/storyboarding/control"/>
+  </ds:schemaRefs>
+</ds:datastoreItem>
+</file>
+
+<file path=customXml/itemProps47.xml><?xml version="1.0" encoding="utf-8"?>
+<ds:datastoreItem xmlns:ds="http://schemas.openxmlformats.org/officeDocument/2006/customXml" ds:itemID="{A51403EB-C942-460A-B56B-107F6FF0E63E}">
+  <ds:schemaRefs>
+    <ds:schemaRef ds:uri="http://schemas.microsoft.com/VisualStudio/2011/storyboarding/control"/>
+  </ds:schemaRefs>
+</ds:datastoreItem>
+</file>
+
+<file path=customXml/itemProps48.xml><?xml version="1.0" encoding="utf-8"?>
+<ds:datastoreItem xmlns:ds="http://schemas.openxmlformats.org/officeDocument/2006/customXml" ds:itemID="{EFE33596-3B04-4569-9CEB-E02E085FDFCF}">
+  <ds:schemaRefs>
+    <ds:schemaRef ds:uri="http://schemas.microsoft.com/VisualStudio/2011/storyboarding/control"/>
+  </ds:schemaRefs>
+</ds:datastoreItem>
+</file>
+
+<file path=customXml/itemProps49.xml><?xml version="1.0" encoding="utf-8"?>
+<ds:datastoreItem xmlns:ds="http://schemas.openxmlformats.org/officeDocument/2006/customXml" ds:itemID="{92D2FCF6-C487-42E5-A43F-1605668A3540}">
+  <ds:schemaRefs>
+    <ds:schemaRef ds:uri="http://schemas.microsoft.com/VisualStudio/2011/storyboarding/control"/>
+  </ds:schemaRefs>
+</ds:datastoreItem>
+</file>
+
+<file path=customXml/itemProps5.xml><?xml version="1.0" encoding="utf-8"?>
+<ds:datastoreItem xmlns:ds="http://schemas.openxmlformats.org/officeDocument/2006/customXml" ds:itemID="{316C99AA-0AAE-40AD-9975-7B4236321B6E}">
+  <ds:schemaRefs>
+    <ds:schemaRef ds:uri="http://schemas.microsoft.com/VisualStudio/2011/storyboarding/control"/>
+  </ds:schemaRefs>
+</ds:datastoreItem>
+</file>
+
+<file path=customXml/itemProps50.xml><?xml version="1.0" encoding="utf-8"?>
+<ds:datastoreItem xmlns:ds="http://schemas.openxmlformats.org/officeDocument/2006/customXml" ds:itemID="{A7C827E0-C782-41F8-AACE-72C1D0CE02BD}">
+  <ds:schemaRefs>
+    <ds:schemaRef ds:uri="http://schemas.microsoft.com/VisualStudio/2011/storyboarding/control"/>
+  </ds:schemaRefs>
+</ds:datastoreItem>
+</file>
+
+<file path=customXml/itemProps51.xml><?xml version="1.0" encoding="utf-8"?>
+<ds:datastoreItem xmlns:ds="http://schemas.openxmlformats.org/officeDocument/2006/customXml" ds:itemID="{FF6D44D0-85A6-42D8-9BD1-7A1AFFA38BD9}">
+  <ds:schemaRefs>
+    <ds:schemaRef ds:uri="http://schemas.microsoft.com/VisualStudio/2011/storyboarding/control"/>
+  </ds:schemaRefs>
+</ds:datastoreItem>
+</file>
+
+<file path=customXml/itemProps52.xml><?xml version="1.0" encoding="utf-8"?>
+<ds:datastoreItem xmlns:ds="http://schemas.openxmlformats.org/officeDocument/2006/customXml" ds:itemID="{42CBDBB6-16F1-415E-9616-B6E80C51BC14}">
+  <ds:schemaRefs>
+    <ds:schemaRef ds:uri="http://schemas.microsoft.com/VisualStudio/2011/storyboarding/control"/>
+  </ds:schemaRefs>
+</ds:datastoreItem>
+</file>
+
+<file path=customXml/itemProps53.xml><?xml version="1.0" encoding="utf-8"?>
+<ds:datastoreItem xmlns:ds="http://schemas.openxmlformats.org/officeDocument/2006/customXml" ds:itemID="{29F88608-560C-4F1A-970A-42C7BA93CAD0}">
+  <ds:schemaRefs>
+    <ds:schemaRef ds:uri="http://schemas.microsoft.com/VisualStudio/2011/storyboarding/control"/>
+  </ds:schemaRefs>
+</ds:datastoreItem>
+</file>
+
+<file path=customXml/itemProps54.xml><?xml version="1.0" encoding="utf-8"?>
+<ds:datastoreItem xmlns:ds="http://schemas.openxmlformats.org/officeDocument/2006/customXml" ds:itemID="{1A0D6E66-364F-4DE0-A3F6-46BF686E7FAB}">
+  <ds:schemaRefs>
+    <ds:schemaRef ds:uri="http://schemas.microsoft.com/VisualStudio/2011/storyboarding/control"/>
+  </ds:schemaRefs>
+</ds:datastoreItem>
+</file>
+
+<file path=customXml/itemProps55.xml><?xml version="1.0" encoding="utf-8"?>
+<ds:datastoreItem xmlns:ds="http://schemas.openxmlformats.org/officeDocument/2006/customXml" ds:itemID="{7507913C-72A6-4D4A-B4C7-4EE9CFA0A512}">
+  <ds:schemaRefs>
+    <ds:schemaRef ds:uri="http://schemas.microsoft.com/VisualStudio/2011/storyboarding/control"/>
+  </ds:schemaRefs>
+</ds:datastoreItem>
+</file>
+
+<file path=customXml/itemProps56.xml><?xml version="1.0" encoding="utf-8"?>
+<ds:datastoreItem xmlns:ds="http://schemas.openxmlformats.org/officeDocument/2006/customXml" ds:itemID="{50E880FA-7ACA-4914-BE57-492563439B7C}">
+  <ds:schemaRefs>
+    <ds:schemaRef ds:uri="http://schemas.microsoft.com/VisualStudio/2011/storyboarding/control"/>
+  </ds:schemaRefs>
+</ds:datastoreItem>
+</file>
+
+<file path=customXml/itemProps57.xml><?xml version="1.0" encoding="utf-8"?>
+<ds:datastoreItem xmlns:ds="http://schemas.openxmlformats.org/officeDocument/2006/customXml" ds:itemID="{9EB5736F-435C-4547-A528-CF37A572C846}">
+  <ds:schemaRefs>
+    <ds:schemaRef ds:uri="http://schemas.microsoft.com/VisualStudio/2011/storyboarding/control"/>
+  </ds:schemaRefs>
+</ds:datastoreItem>
+</file>
+
+<file path=customXml/itemProps58.xml><?xml version="1.0" encoding="utf-8"?>
+<ds:datastoreItem xmlns:ds="http://schemas.openxmlformats.org/officeDocument/2006/customXml" ds:itemID="{915B4FB5-1C52-42B7-BE76-91F36AC133E9}">
+  <ds:schemaRefs>
+    <ds:schemaRef ds:uri="http://schemas.microsoft.com/VisualStudio/2011/storyboarding/control"/>
+  </ds:schemaRefs>
+</ds:datastoreItem>
+</file>
+
+<file path=customXml/itemProps59.xml><?xml version="1.0" encoding="utf-8"?>
+<ds:datastoreItem xmlns:ds="http://schemas.openxmlformats.org/officeDocument/2006/customXml" ds:itemID="{542D3781-7277-45C2-A7BE-BCFFC1B3B2C2}">
+  <ds:schemaRefs>
+    <ds:schemaRef ds:uri="http://schemas.microsoft.com/VisualStudio/2011/storyboarding/control"/>
+  </ds:schemaRefs>
+</ds:datastoreItem>
+</file>
+
+<file path=customXml/itemProps6.xml><?xml version="1.0" encoding="utf-8"?>
+<ds:datastoreItem xmlns:ds="http://schemas.openxmlformats.org/officeDocument/2006/customXml" ds:itemID="{2042CB66-327D-4A2E-9460-63B72B0281D1}">
+  <ds:schemaRefs>
+    <ds:schemaRef ds:uri="http://schemas.microsoft.com/VisualStudio/2011/storyboarding/control"/>
+  </ds:schemaRefs>
+</ds:datastoreItem>
+</file>
+
+<file path=customXml/itemProps60.xml><?xml version="1.0" encoding="utf-8"?>
+<ds:datastoreItem xmlns:ds="http://schemas.openxmlformats.org/officeDocument/2006/customXml" ds:itemID="{E62CF221-909A-44EC-B63B-E2465643E163}">
+  <ds:schemaRefs>
+    <ds:schemaRef ds:uri="http://schemas.microsoft.com/VisualStudio/2011/storyboarding/control"/>
+  </ds:schemaRefs>
+</ds:datastoreItem>
+</file>
+
+<file path=customXml/itemProps61.xml><?xml version="1.0" encoding="utf-8"?>
+<ds:datastoreItem xmlns:ds="http://schemas.openxmlformats.org/officeDocument/2006/customXml" ds:itemID="{4A2098C0-CAE2-424B-B95A-0BC00D919BF6}">
+  <ds:schemaRefs>
+    <ds:schemaRef ds:uri="http://schemas.microsoft.com/VisualStudio/2011/storyboarding/control"/>
+  </ds:schemaRefs>
+</ds:datastoreItem>
+</file>
+
+<file path=customXml/itemProps62.xml><?xml version="1.0" encoding="utf-8"?>
+<ds:datastoreItem xmlns:ds="http://schemas.openxmlformats.org/officeDocument/2006/customXml" ds:itemID="{6637330C-6677-4A84-AB1A-01F539624967}">
+  <ds:schemaRefs>
+    <ds:schemaRef ds:uri="http://schemas.microsoft.com/VisualStudio/2011/storyboarding/control"/>
+  </ds:schemaRefs>
+</ds:datastoreItem>
+</file>
+
+<file path=customXml/itemProps63.xml><?xml version="1.0" encoding="utf-8"?>
+<ds:datastoreItem xmlns:ds="http://schemas.openxmlformats.org/officeDocument/2006/customXml" ds:itemID="{91F471D5-19F2-4DD1-925B-2849EFFB2CA5}">
+  <ds:schemaRefs>
+    <ds:schemaRef ds:uri="http://schemas.microsoft.com/VisualStudio/2011/storyboarding/control"/>
+  </ds:schemaRefs>
+</ds:datastoreItem>
+</file>
+
+<file path=customXml/itemProps64.xml><?xml version="1.0" encoding="utf-8"?>
+<ds:datastoreItem xmlns:ds="http://schemas.openxmlformats.org/officeDocument/2006/customXml" ds:itemID="{8633C0D5-9315-4231-B133-7D4F7E7CF421}">
+  <ds:schemaRefs>
+    <ds:schemaRef ds:uri="http://schemas.microsoft.com/VisualStudio/2011/storyboarding/control"/>
+  </ds:schemaRefs>
+</ds:datastoreItem>
+</file>
+
+<file path=customXml/itemProps65.xml><?xml version="1.0" encoding="utf-8"?>
+<ds:datastoreItem xmlns:ds="http://schemas.openxmlformats.org/officeDocument/2006/customXml" ds:itemID="{CABF4EB4-557F-48F7-91D1-65FCAC52ED94}">
+  <ds:schemaRefs>
+    <ds:schemaRef ds:uri="http://schemas.microsoft.com/VisualStudio/2011/storyboarding/control"/>
+  </ds:schemaRefs>
+</ds:datastoreItem>
+</file>
+
+<file path=customXml/itemProps66.xml><?xml version="1.0" encoding="utf-8"?>
+<ds:datastoreItem xmlns:ds="http://schemas.openxmlformats.org/officeDocument/2006/customXml" ds:itemID="{D21F02FB-5DB1-4DBA-BD13-D2862FBE9DF2}">
+  <ds:schemaRefs>
+    <ds:schemaRef ds:uri="http://schemas.microsoft.com/VisualStudio/2011/storyboarding/control"/>
+  </ds:schemaRefs>
+</ds:datastoreItem>
+</file>
+
+<file path=customXml/itemProps67.xml><?xml version="1.0" encoding="utf-8"?>
+<ds:datastoreItem xmlns:ds="http://schemas.openxmlformats.org/officeDocument/2006/customXml" ds:itemID="{8D141F9C-E5D3-4A6C-B5C2-AE41F207CD4F}">
+  <ds:schemaRefs>
+    <ds:schemaRef ds:uri="http://schemas.microsoft.com/VisualStudio/2011/storyboarding/control"/>
+  </ds:schemaRefs>
+</ds:datastoreItem>
+</file>
+
+<file path=customXml/itemProps68.xml><?xml version="1.0" encoding="utf-8"?>
+<ds:datastoreItem xmlns:ds="http://schemas.openxmlformats.org/officeDocument/2006/customXml" ds:itemID="{D7DF3B9B-42F3-49B4-8896-8C4B48B73E93}">
+  <ds:schemaRefs>
+    <ds:schemaRef ds:uri="http://schemas.microsoft.com/VisualStudio/2011/storyboarding/control"/>
+  </ds:schemaRefs>
+</ds:datastoreItem>
+</file>
+
+<file path=customXml/itemProps69.xml><?xml version="1.0" encoding="utf-8"?>
+<ds:datastoreItem xmlns:ds="http://schemas.openxmlformats.org/officeDocument/2006/customXml" ds:itemID="{953990ED-1B5C-4487-81BE-A06FE56208E3}">
+  <ds:schemaRefs>
+    <ds:schemaRef ds:uri="http://schemas.microsoft.com/VisualStudio/2011/storyboarding/control"/>
+  </ds:schemaRefs>
+</ds:datastoreItem>
+</file>
+
 <file path=customXml/itemProps7.xml><?xml version="1.0" encoding="utf-8"?>
-<ds:datastoreItem xmlns:ds="http://schemas.openxmlformats.org/officeDocument/2006/customXml" ds:itemID="{D7C75009-0A94-427F-9A6E-7BF7BF340D46}">
+<ds:datastoreItem xmlns:ds="http://schemas.openxmlformats.org/officeDocument/2006/customXml" ds:itemID="{B27791F4-83BC-4C80-A521-00228DBEB355}">
   <ds:schemaRefs>
     <ds:schemaRef ds:uri="http://schemas.microsoft.com/VisualStudio/2011/storyboarding/control"/>
   </ds:schemaRefs>
@@ -25765,7 +26875,7 @@
 </file>
 
 <file path=customXml/itemProps70.xml><?xml version="1.0" encoding="utf-8"?>
-<ds:datastoreItem xmlns:ds="http://schemas.openxmlformats.org/officeDocument/2006/customXml" ds:itemID="{C6073AC6-3AC6-4053-AF9F-0DA698749C7B}">
+<ds:datastoreItem xmlns:ds="http://schemas.openxmlformats.org/officeDocument/2006/customXml" ds:itemID="{D68B2FF2-28C3-499B-8281-24BF4ABE96F2}">
   <ds:schemaRefs>
     <ds:schemaRef ds:uri="http://schemas.microsoft.com/VisualStudio/2011/storyboarding/control"/>
   </ds:schemaRefs>
@@ -25773,7 +26883,7 @@
 </file>
 
 <file path=customXml/itemProps71.xml><?xml version="1.0" encoding="utf-8"?>
-<ds:datastoreItem xmlns:ds="http://schemas.openxmlformats.org/officeDocument/2006/customXml" ds:itemID="{4B7B01DA-F2DD-4B7D-A6C3-A8E5AF716022}">
+<ds:datastoreItem xmlns:ds="http://schemas.openxmlformats.org/officeDocument/2006/customXml" ds:itemID="{5257C525-80EC-4AFB-AAC4-72BDB405FEE7}">
   <ds:schemaRefs>
     <ds:schemaRef ds:uri="http://schemas.microsoft.com/VisualStudio/2011/storyboarding/control"/>
   </ds:schemaRefs>
@@ -25781,7 +26891,7 @@
 </file>
 
 <file path=customXml/itemProps72.xml><?xml version="1.0" encoding="utf-8"?>
-<ds:datastoreItem xmlns:ds="http://schemas.openxmlformats.org/officeDocument/2006/customXml" ds:itemID="{7FCB62AB-11CB-48EE-90C0-29BFAA53AE60}">
+<ds:datastoreItem xmlns:ds="http://schemas.openxmlformats.org/officeDocument/2006/customXml" ds:itemID="{8F225A31-B18F-4547-AB85-A029F9540F29}">
   <ds:schemaRefs>
     <ds:schemaRef ds:uri="http://schemas.microsoft.com/VisualStudio/2011/storyboarding/control"/>
   </ds:schemaRefs>
@@ -25789,7 +26899,7 @@
 </file>
 
 <file path=customXml/itemProps73.xml><?xml version="1.0" encoding="utf-8"?>
-<ds:datastoreItem xmlns:ds="http://schemas.openxmlformats.org/officeDocument/2006/customXml" ds:itemID="{8633C0D5-9315-4231-B133-7D4F7E7CF421}">
+<ds:datastoreItem xmlns:ds="http://schemas.openxmlformats.org/officeDocument/2006/customXml" ds:itemID="{9BCCF8C9-269C-41CB-8569-328A0B68649E}">
   <ds:schemaRefs>
     <ds:schemaRef ds:uri="http://schemas.microsoft.com/VisualStudio/2011/storyboarding/control"/>
   </ds:schemaRefs>
@@ -25797,6 +26907,94 @@
 </file>
 
 <file path=customXml/itemProps74.xml><?xml version="1.0" encoding="utf-8"?>
+<ds:datastoreItem xmlns:ds="http://schemas.openxmlformats.org/officeDocument/2006/customXml" ds:itemID="{5ED3A7E7-82A7-496E-81C2-82BDA053DD8D}">
+  <ds:schemaRefs>
+    <ds:schemaRef ds:uri="http://schemas.microsoft.com/VisualStudio/2011/storyboarding/control"/>
+  </ds:schemaRefs>
+</ds:datastoreItem>
+</file>
+
+<file path=customXml/itemProps75.xml><?xml version="1.0" encoding="utf-8"?>
+<ds:datastoreItem xmlns:ds="http://schemas.openxmlformats.org/officeDocument/2006/customXml" ds:itemID="{FF4832D1-127B-4626-8C46-E0ED4C57D1B0}">
+  <ds:schemaRefs>
+    <ds:schemaRef ds:uri="http://schemas.microsoft.com/VisualStudio/2011/storyboarding/control"/>
+  </ds:schemaRefs>
+</ds:datastoreItem>
+</file>
+
+<file path=customXml/itemProps76.xml><?xml version="1.0" encoding="utf-8"?>
+<ds:datastoreItem xmlns:ds="http://schemas.openxmlformats.org/officeDocument/2006/customXml" ds:itemID="{661AFA96-4209-4986-942C-0DACF461EB44}">
+  <ds:schemaRefs>
+    <ds:schemaRef ds:uri="http://schemas.microsoft.com/VisualStudio/2011/storyboarding/control"/>
+  </ds:schemaRefs>
+</ds:datastoreItem>
+</file>
+
+<file path=customXml/itemProps77.xml><?xml version="1.0" encoding="utf-8"?>
+<ds:datastoreItem xmlns:ds="http://schemas.openxmlformats.org/officeDocument/2006/customXml" ds:itemID="{053B253E-E961-4CF6-939E-DCD3A52C6253}">
+  <ds:schemaRefs>
+    <ds:schemaRef ds:uri="http://schemas.microsoft.com/VisualStudio/2011/storyboarding/control"/>
+  </ds:schemaRefs>
+</ds:datastoreItem>
+</file>
+
+<file path=customXml/itemProps78.xml><?xml version="1.0" encoding="utf-8"?>
+<ds:datastoreItem xmlns:ds="http://schemas.openxmlformats.org/officeDocument/2006/customXml" ds:itemID="{642CB40A-AA85-491B-A9C0-B10CA9772E18}">
+  <ds:schemaRefs>
+    <ds:schemaRef ds:uri="http://schemas.microsoft.com/VisualStudio/2011/storyboarding/control"/>
+  </ds:schemaRefs>
+</ds:datastoreItem>
+</file>
+
+<file path=customXml/itemProps79.xml><?xml version="1.0" encoding="utf-8"?>
+<ds:datastoreItem xmlns:ds="http://schemas.openxmlformats.org/officeDocument/2006/customXml" ds:itemID="{CADB8207-2C24-491C-8843-FCF39EB8F98B}">
+  <ds:schemaRefs>
+    <ds:schemaRef ds:uri="http://schemas.microsoft.com/VisualStudio/2011/storyboarding/control"/>
+  </ds:schemaRefs>
+</ds:datastoreItem>
+</file>
+
+<file path=customXml/itemProps8.xml><?xml version="1.0" encoding="utf-8"?>
+<ds:datastoreItem xmlns:ds="http://schemas.openxmlformats.org/officeDocument/2006/customXml" ds:itemID="{849EE3D6-B167-4D4D-AFE6-FED4C093B524}">
+  <ds:schemaRefs>
+    <ds:schemaRef ds:uri="http://schemas.microsoft.com/VisualStudio/2011/storyboarding/control"/>
+  </ds:schemaRefs>
+</ds:datastoreItem>
+</file>
+
+<file path=customXml/itemProps80.xml><?xml version="1.0" encoding="utf-8"?>
+<ds:datastoreItem xmlns:ds="http://schemas.openxmlformats.org/officeDocument/2006/customXml" ds:itemID="{8730DC7C-9427-4E7E-8E5D-1A17BBC23A27}">
+  <ds:schemaRefs>
+    <ds:schemaRef ds:uri="http://schemas.microsoft.com/VisualStudio/2011/storyboarding/control"/>
+  </ds:schemaRefs>
+</ds:datastoreItem>
+</file>
+
+<file path=customXml/itemProps81.xml><?xml version="1.0" encoding="utf-8"?>
+<ds:datastoreItem xmlns:ds="http://schemas.openxmlformats.org/officeDocument/2006/customXml" ds:itemID="{B2675522-B349-4DFE-8CFB-5767140985C1}">
+  <ds:schemaRefs>
+    <ds:schemaRef ds:uri="http://schemas.microsoft.com/VisualStudio/2011/storyboarding/control"/>
+  </ds:schemaRefs>
+</ds:datastoreItem>
+</file>
+
+<file path=customXml/itemProps82.xml><?xml version="1.0" encoding="utf-8"?>
+<ds:datastoreItem xmlns:ds="http://schemas.openxmlformats.org/officeDocument/2006/customXml" ds:itemID="{15D48E4A-DBDF-4078-A9CD-66DB78FBDBCB}">
+  <ds:schemaRefs>
+    <ds:schemaRef ds:uri="http://schemas.microsoft.com/VisualStudio/2011/storyboarding/control"/>
+  </ds:schemaRefs>
+</ds:datastoreItem>
+</file>
+
+<file path=customXml/itemProps83.xml><?xml version="1.0" encoding="utf-8"?>
+<ds:datastoreItem xmlns:ds="http://schemas.openxmlformats.org/officeDocument/2006/customXml" ds:itemID="{B6053901-4DC9-40C2-9D30-515169322164}">
+  <ds:schemaRefs>
+    <ds:schemaRef ds:uri="http://schemas.microsoft.com/VisualStudio/2011/storyboarding/control"/>
+  </ds:schemaRefs>
+</ds:datastoreItem>
+</file>
+
+<file path=customXml/itemProps84.xml><?xml version="1.0" encoding="utf-8"?>
 <ds:datastoreItem xmlns:ds="http://schemas.openxmlformats.org/officeDocument/2006/customXml" ds:itemID="{1E44D625-282D-42EC-A4B6-07A6095BE783}">
   <ds:schemaRefs>
     <ds:schemaRef ds:uri="http://schemas.microsoft.com/VisualStudio/2011/storyboarding/control"/>
@@ -25804,15 +27002,23 @@
 </ds:datastoreItem>
 </file>
 
-<file path=customXml/itemProps75.xml><?xml version="1.0" encoding="utf-8"?>
-<ds:datastoreItem xmlns:ds="http://schemas.openxmlformats.org/officeDocument/2006/customXml" ds:itemID="{E62CF221-909A-44EC-B63B-E2465643E163}">
+<file path=customXml/itemProps85.xml><?xml version="1.0" encoding="utf-8"?>
+<ds:datastoreItem xmlns:ds="http://schemas.openxmlformats.org/officeDocument/2006/customXml" ds:itemID="{A7FA8622-FB93-4433-BD8F-7501DE44378A}">
   <ds:schemaRefs>
     <ds:schemaRef ds:uri="http://schemas.microsoft.com/VisualStudio/2011/storyboarding/control"/>
   </ds:schemaRefs>
 </ds:datastoreItem>
 </file>
 
-<file path=customXml/itemProps76.xml><?xml version="1.0" encoding="utf-8"?>
+<file path=customXml/itemProps86.xml><?xml version="1.0" encoding="utf-8"?>
+<ds:datastoreItem xmlns:ds="http://schemas.openxmlformats.org/officeDocument/2006/customXml" ds:itemID="{43147EBE-FAF7-4241-A91D-F05E4A30F17C}">
+  <ds:schemaRefs>
+    <ds:schemaRef ds:uri="http://schemas.microsoft.com/VisualStudio/2011/storyboarding/control"/>
+  </ds:schemaRefs>
+</ds:datastoreItem>
+</file>
+
+<file path=customXml/itemProps87.xml><?xml version="1.0" encoding="utf-8"?>
 <ds:datastoreItem xmlns:ds="http://schemas.openxmlformats.org/officeDocument/2006/customXml" ds:itemID="{2E8B6638-50D8-41E2-B508-3DD4EF69819C}">
   <ds:schemaRefs>
     <ds:schemaRef ds:uri="http://schemas.microsoft.com/VisualStudio/2011/storyboarding/control"/>
@@ -25820,95 +27026,87 @@
 </ds:datastoreItem>
 </file>
 
-<file path=customXml/itemProps77.xml><?xml version="1.0" encoding="utf-8"?>
-<ds:datastoreItem xmlns:ds="http://schemas.openxmlformats.org/officeDocument/2006/customXml" ds:itemID="{5613B52C-138F-4433-93A2-8E22310B10BA}">
+<file path=customXml/itemProps88.xml><?xml version="1.0" encoding="utf-8"?>
+<ds:datastoreItem xmlns:ds="http://schemas.openxmlformats.org/officeDocument/2006/customXml" ds:itemID="{B1FA27C5-7C08-4312-A644-DD5732C8B520}">
   <ds:schemaRefs>
     <ds:schemaRef ds:uri="http://schemas.microsoft.com/VisualStudio/2011/storyboarding/control"/>
   </ds:schemaRefs>
 </ds:datastoreItem>
 </file>
 
-<file path=customXml/itemProps78.xml><?xml version="1.0" encoding="utf-8"?>
-<ds:datastoreItem xmlns:ds="http://schemas.openxmlformats.org/officeDocument/2006/customXml" ds:itemID="{CB00F8A8-CC68-41D5-B532-53DA211787AF}">
+<file path=customXml/itemProps89.xml><?xml version="1.0" encoding="utf-8"?>
+<ds:datastoreItem xmlns:ds="http://schemas.openxmlformats.org/officeDocument/2006/customXml" ds:itemID="{E044AAA4-E7E2-4035-BC90-73B06AD25910}">
   <ds:schemaRefs>
     <ds:schemaRef ds:uri="http://schemas.microsoft.com/VisualStudio/2011/storyboarding/control"/>
   </ds:schemaRefs>
 </ds:datastoreItem>
 </file>
 
-<file path=customXml/itemProps79.xml><?xml version="1.0" encoding="utf-8"?>
-<ds:datastoreItem xmlns:ds="http://schemas.openxmlformats.org/officeDocument/2006/customXml" ds:itemID="{03D36120-1035-40A3-B0BB-D936200B11C5}">
+<file path=customXml/itemProps9.xml><?xml version="1.0" encoding="utf-8"?>
+<ds:datastoreItem xmlns:ds="http://schemas.openxmlformats.org/officeDocument/2006/customXml" ds:itemID="{B11D23D9-EA0D-4757-A03C-E7F510283FC4}">
   <ds:schemaRefs>
     <ds:schemaRef ds:uri="http://schemas.microsoft.com/VisualStudio/2011/storyboarding/control"/>
   </ds:schemaRefs>
 </ds:datastoreItem>
 </file>
 
-<file path=customXml/itemProps8.xml><?xml version="1.0" encoding="utf-8"?>
-<ds:datastoreItem xmlns:ds="http://schemas.openxmlformats.org/officeDocument/2006/customXml" ds:itemID="{6B7F6B0D-7960-4392-8CE5-01C82A809BF3}">
+<file path=customXml/itemProps90.xml><?xml version="1.0" encoding="utf-8"?>
+<ds:datastoreItem xmlns:ds="http://schemas.openxmlformats.org/officeDocument/2006/customXml" ds:itemID="{EBFDA17D-D03A-4ABC-B7F6-765EC09D4F42}">
   <ds:schemaRefs>
     <ds:schemaRef ds:uri="http://schemas.microsoft.com/VisualStudio/2011/storyboarding/control"/>
   </ds:schemaRefs>
 </ds:datastoreItem>
 </file>
 
-<file path=customXml/itemProps80.xml><?xml version="1.0" encoding="utf-8"?>
-<ds:datastoreItem xmlns:ds="http://schemas.openxmlformats.org/officeDocument/2006/customXml" ds:itemID="{16D74C73-9C0F-4B4D-BCBA-BE1AAFB6AA82}">
+<file path=customXml/itemProps91.xml><?xml version="1.0" encoding="utf-8"?>
+<ds:datastoreItem xmlns:ds="http://schemas.openxmlformats.org/officeDocument/2006/customXml" ds:itemID="{3B6E51D0-65DC-44C7-AEB6-AE0EE55ECA02}">
   <ds:schemaRefs>
     <ds:schemaRef ds:uri="http://schemas.microsoft.com/VisualStudio/2011/storyboarding/control"/>
   </ds:schemaRefs>
 </ds:datastoreItem>
 </file>
 
-<file path=customXml/itemProps81.xml><?xml version="1.0" encoding="utf-8"?>
-<ds:datastoreItem xmlns:ds="http://schemas.openxmlformats.org/officeDocument/2006/customXml" ds:itemID="{82899BF1-D444-43E6-9A6F-7917F4E7C5B2}">
+<file path=customXml/itemProps92.xml><?xml version="1.0" encoding="utf-8"?>
+<ds:datastoreItem xmlns:ds="http://schemas.openxmlformats.org/officeDocument/2006/customXml" ds:itemID="{42B99A03-7B2A-4958-A399-3D4E65A957D8}">
   <ds:schemaRefs>
     <ds:schemaRef ds:uri="http://schemas.microsoft.com/VisualStudio/2011/storyboarding/control"/>
   </ds:schemaRefs>
 </ds:datastoreItem>
 </file>
 
-<file path=customXml/itemProps82.xml><?xml version="1.0" encoding="utf-8"?>
-<ds:datastoreItem xmlns:ds="http://schemas.openxmlformats.org/officeDocument/2006/customXml" ds:itemID="{8F225A31-B18F-4547-AB85-A029F9540F29}">
+<file path=customXml/itemProps93.xml><?xml version="1.0" encoding="utf-8"?>
+<ds:datastoreItem xmlns:ds="http://schemas.openxmlformats.org/officeDocument/2006/customXml" ds:itemID="{D3C199F2-3435-4F38-9729-F31F3FD6089C}">
   <ds:schemaRefs>
     <ds:schemaRef ds:uri="http://schemas.microsoft.com/VisualStudio/2011/storyboarding/control"/>
   </ds:schemaRefs>
 </ds:datastoreItem>
 </file>
 
-<file path=customXml/itemProps83.xml><?xml version="1.0" encoding="utf-8"?>
-<ds:datastoreItem xmlns:ds="http://schemas.openxmlformats.org/officeDocument/2006/customXml" ds:itemID="{642CB40A-AA85-491B-A9C0-B10CA9772E18}">
+<file path=customXml/itemProps94.xml><?xml version="1.0" encoding="utf-8"?>
+<ds:datastoreItem xmlns:ds="http://schemas.openxmlformats.org/officeDocument/2006/customXml" ds:itemID="{CB5DB83F-1AF1-4253-878C-B66311C1BD1A}">
   <ds:schemaRefs>
     <ds:schemaRef ds:uri="http://schemas.microsoft.com/VisualStudio/2011/storyboarding/control"/>
   </ds:schemaRefs>
 </ds:datastoreItem>
 </file>
 
-<file path=customXml/itemProps84.xml><?xml version="1.0" encoding="utf-8"?>
-<ds:datastoreItem xmlns:ds="http://schemas.openxmlformats.org/officeDocument/2006/customXml" ds:itemID="{B27791F4-83BC-4C80-A521-00228DBEB355}">
+<file path=customXml/itemProps95.xml><?xml version="1.0" encoding="utf-8"?>
+<ds:datastoreItem xmlns:ds="http://schemas.openxmlformats.org/officeDocument/2006/customXml" ds:itemID="{7BBD9B0B-5467-4F7F-87B2-226F6000CB08}">
   <ds:schemaRefs>
     <ds:schemaRef ds:uri="http://schemas.microsoft.com/VisualStudio/2011/storyboarding/control"/>
   </ds:schemaRefs>
 </ds:datastoreItem>
 </file>
 
-<file path=customXml/itemProps85.xml><?xml version="1.0" encoding="utf-8"?>
-<ds:datastoreItem xmlns:ds="http://schemas.openxmlformats.org/officeDocument/2006/customXml" ds:itemID="{A7C827E0-C782-41F8-AACE-72C1D0CE02BD}">
+<file path=customXml/itemProps96.xml><?xml version="1.0" encoding="utf-8"?>
+<ds:datastoreItem xmlns:ds="http://schemas.openxmlformats.org/officeDocument/2006/customXml" ds:itemID="{C6B7B63F-C48F-4718-AA06-F4FB2B4E543E}">
   <ds:schemaRefs>
     <ds:schemaRef ds:uri="http://schemas.microsoft.com/VisualStudio/2011/storyboarding/control"/>
   </ds:schemaRefs>
 </ds:datastoreItem>
 </file>
 
-<file path=customXml/itemProps86.xml><?xml version="1.0" encoding="utf-8"?>
-<ds:datastoreItem xmlns:ds="http://schemas.openxmlformats.org/officeDocument/2006/customXml" ds:itemID="{FF4832D1-127B-4626-8C46-E0ED4C57D1B0}">
-  <ds:schemaRefs>
-    <ds:schemaRef ds:uri="http://schemas.microsoft.com/VisualStudio/2011/storyboarding/control"/>
-  </ds:schemaRefs>
-</ds:datastoreItem>
-</file>
-
-<file path=customXml/itemProps87.xml><?xml version="1.0" encoding="utf-8"?>
+<file path=customXml/itemProps97.xml><?xml version="1.0" encoding="utf-8"?>
 <ds:datastoreItem xmlns:ds="http://schemas.openxmlformats.org/officeDocument/2006/customXml" ds:itemID="{9CDF5475-8A3E-44F4-BEDC-B82B204E6E41}">
   <ds:schemaRefs>
     <ds:schemaRef ds:uri="http://schemas.microsoft.com/VisualStudio/2011/storyboarding/control"/>
@@ -25916,114 +27114,8 @@
 </ds:datastoreItem>
 </file>
 
-<file path=customXml/itemProps88.xml><?xml version="1.0" encoding="utf-8"?>
-<ds:datastoreItem xmlns:ds="http://schemas.openxmlformats.org/officeDocument/2006/customXml" ds:itemID="{7BBD9B0B-5467-4F7F-87B2-226F6000CB08}">
-  <ds:schemaRefs>
-    <ds:schemaRef ds:uri="http://schemas.microsoft.com/VisualStudio/2011/storyboarding/control"/>
-  </ds:schemaRefs>
-</ds:datastoreItem>
-</file>
-
-<file path=customXml/itemProps89.xml><?xml version="1.0" encoding="utf-8"?>
-<ds:datastoreItem xmlns:ds="http://schemas.openxmlformats.org/officeDocument/2006/customXml" ds:itemID="{DED51774-C402-4C04-B6DB-6BA97942E023}">
-  <ds:schemaRefs>
-    <ds:schemaRef ds:uri="http://www.w3.org/XML/1998/namespace"/>
-    <ds:schemaRef ds:uri="http://schemas.microsoft.com/office/2006/metadata/properties"/>
-    <ds:schemaRef ds:uri="http://schemas.openxmlformats.org/package/2006/metadata/core-properties"/>
-    <ds:schemaRef ds:uri="http://purl.org/dc/elements/1.1/"/>
-    <ds:schemaRef ds:uri="http://purl.org/dc/dcmitype/"/>
-    <ds:schemaRef ds:uri="http://purl.org/dc/terms/"/>
-    <ds:schemaRef ds:uri="http://schemas.microsoft.com/office/infopath/2007/PartnerControls"/>
-    <ds:schemaRef ds:uri="11a788af-2a95-4add-a4b4-a60d70c1a184"/>
-    <ds:schemaRef ds:uri="http://schemas.microsoft.com/office/2006/documentManagement/types"/>
-    <ds:schemaRef ds:uri="ed4f1a8c-625d-41bf-9ea8-bf9abed4eeb2"/>
-    <ds:schemaRef ds:uri="57b46829-05be-45b5-b819-0a162c331775"/>
-  </ds:schemaRefs>
-</ds:datastoreItem>
-</file>
-
-<file path=customXml/itemProps9.xml><?xml version="1.0" encoding="utf-8"?>
-<ds:datastoreItem xmlns:ds="http://schemas.openxmlformats.org/officeDocument/2006/customXml" ds:itemID="{0434DC3B-0EB6-48BA-A7A7-ADCCA91A2DEF}">
-  <ds:schemaRefs>
-    <ds:schemaRef ds:uri="http://schemas.microsoft.com/VisualStudio/2011/storyboarding/control"/>
-  </ds:schemaRefs>
-</ds:datastoreItem>
-</file>
-
-<file path=customXml/itemProps90.xml><?xml version="1.0" encoding="utf-8"?>
-<ds:datastoreItem xmlns:ds="http://schemas.openxmlformats.org/officeDocument/2006/customXml" ds:itemID="{C61D435D-A17D-4CDF-BF72-91398C2A2468}">
-  <ds:schemaRefs>
-    <ds:schemaRef ds:uri="http://schemas.microsoft.com/VisualStudio/2011/storyboarding/control"/>
-  </ds:schemaRefs>
-</ds:datastoreItem>
-</file>
-
-<file path=customXml/itemProps91.xml><?xml version="1.0" encoding="utf-8"?>
-<ds:datastoreItem xmlns:ds="http://schemas.openxmlformats.org/officeDocument/2006/customXml" ds:itemID="{29F88608-560C-4F1A-970A-42C7BA93CAD0}">
-  <ds:schemaRefs>
-    <ds:schemaRef ds:uri="http://schemas.microsoft.com/VisualStudio/2011/storyboarding/control"/>
-  </ds:schemaRefs>
-</ds:datastoreItem>
-</file>
-
-<file path=customXml/itemProps92.xml><?xml version="1.0" encoding="utf-8"?>
-<ds:datastoreItem xmlns:ds="http://schemas.openxmlformats.org/officeDocument/2006/customXml" ds:itemID="{CABF4EB4-557F-48F7-91D1-65FCAC52ED94}">
-  <ds:schemaRefs>
-    <ds:schemaRef ds:uri="http://schemas.microsoft.com/VisualStudio/2011/storyboarding/control"/>
-  </ds:schemaRefs>
-</ds:datastoreItem>
-</file>
-
-<file path=customXml/itemProps93.xml><?xml version="1.0" encoding="utf-8"?>
-<ds:datastoreItem xmlns:ds="http://schemas.openxmlformats.org/officeDocument/2006/customXml" ds:itemID="{237940BE-C4C0-476D-8844-F84ABCCD439E}">
-  <ds:schemaRefs>
-    <ds:schemaRef ds:uri="http://schemas.microsoft.com/VisualStudio/2011/storyboarding/control"/>
-  </ds:schemaRefs>
-</ds:datastoreItem>
-</file>
-
-<file path=customXml/itemProps94.xml><?xml version="1.0" encoding="utf-8"?>
-<ds:datastoreItem xmlns:ds="http://schemas.openxmlformats.org/officeDocument/2006/customXml" ds:itemID="{9FF7EB94-E1AA-4209-98C0-C1652B1BD202}">
-  <ds:schemaRefs>
-    <ds:schemaRef ds:uri="http://schemas.microsoft.com/VisualStudio/2011/storyboarding/control"/>
-  </ds:schemaRefs>
-</ds:datastoreItem>
-</file>
-
-<file path=customXml/itemProps95.xml><?xml version="1.0" encoding="utf-8"?>
-<ds:datastoreItem xmlns:ds="http://schemas.openxmlformats.org/officeDocument/2006/customXml" ds:itemID="{915B4FB5-1C52-42B7-BE76-91F36AC133E9}">
-  <ds:schemaRefs>
-    <ds:schemaRef ds:uri="http://schemas.microsoft.com/VisualStudio/2011/storyboarding/control"/>
-  </ds:schemaRefs>
-</ds:datastoreItem>
-</file>
-
-<file path=customXml/itemProps96.xml><?xml version="1.0" encoding="utf-8"?>
-<ds:datastoreItem xmlns:ds="http://schemas.openxmlformats.org/officeDocument/2006/customXml" ds:itemID="{B1FA27C5-7C08-4312-A644-DD5732C8B520}">
-  <ds:schemaRefs>
-    <ds:schemaRef ds:uri="http://schemas.microsoft.com/VisualStudio/2011/storyboarding/control"/>
-  </ds:schemaRefs>
-</ds:datastoreItem>
-</file>
-
-<file path=customXml/itemProps97.xml><?xml version="1.0" encoding="utf-8"?>
-<ds:datastoreItem xmlns:ds="http://schemas.openxmlformats.org/officeDocument/2006/customXml" ds:itemID="{A7FA8622-FB93-4433-BD8F-7501DE44378A}">
-  <ds:schemaRefs>
-    <ds:schemaRef ds:uri="http://schemas.microsoft.com/VisualStudio/2011/storyboarding/control"/>
-  </ds:schemaRefs>
-</ds:datastoreItem>
-</file>
-
 <file path=customXml/itemProps98.xml><?xml version="1.0" encoding="utf-8"?>
-<ds:datastoreItem xmlns:ds="http://schemas.openxmlformats.org/officeDocument/2006/customXml" ds:itemID="{F348A5AF-33BE-4204-BA0B-F3E07C6F1BF9}">
-  <ds:schemaRefs>
-    <ds:schemaRef ds:uri="http://schemas.microsoft.com/VisualStudio/2011/storyboarding/control"/>
-  </ds:schemaRefs>
-</ds:datastoreItem>
-</file>
-
-<file path=customXml/itemProps99.xml><?xml version="1.0" encoding="utf-8"?>
-<ds:datastoreItem xmlns:ds="http://schemas.openxmlformats.org/officeDocument/2006/customXml" ds:itemID="{FC31C350-9FC4-4E25-81F6-FB9A920B8D57}">
+<ds:datastoreItem xmlns:ds="http://schemas.openxmlformats.org/officeDocument/2006/customXml" ds:itemID="{967BE90E-8B6F-4D1A-8151-633D9433B606}">
   <ds:schemaRefs>
     <ds:schemaRef ds:uri="http://schemas.microsoft.com/VisualStudio/2011/storyboarding/control"/>
   </ds:schemaRefs>

</xml_diff>